<commit_message>
updated experimental flow diagram and updated input and graph files to enable migration to multiple trusted Auths
</commit_message>
<xml_diff>
--- a/experiments/ccs2017/figures/exp_flow.pptx
+++ b/experiments/ccs2017/figures/exp_flow.pptx
@@ -4,6 +4,9 @@
   <p:sldMasterIdLst>
     <p:sldMasterId id="2147483648" r:id="rId1"/>
   </p:sldMasterIdLst>
+  <p:notesMasterIdLst>
+    <p:notesMasterId r:id="rId3"/>
+  </p:notesMasterIdLst>
   <p:sldIdLst>
     <p:sldId id="256" r:id="rId2"/>
   </p:sldIdLst>
@@ -112,6 +115,440 @@
 </p:presentation>
 </file>
 
+<file path=ppt/notesMasters/notesMaster1.xml><?xml version="1.0" encoding="utf-8"?>
+<p:notesMaster xmlns:a="http://schemas.openxmlformats.org/drawingml/2006/main" xmlns:r="http://schemas.openxmlformats.org/officeDocument/2006/relationships" xmlns:p="http://schemas.openxmlformats.org/presentationml/2006/main">
+  <p:cSld>
+    <p:bg>
+      <p:bgRef idx="1001">
+        <a:schemeClr val="bg1"/>
+      </p:bgRef>
+    </p:bg>
+    <p:spTree>
+      <p:nvGrpSpPr>
+        <p:cNvPr id="1" name=""/>
+        <p:cNvGrpSpPr/>
+        <p:nvPr/>
+      </p:nvGrpSpPr>
+      <p:grpSpPr>
+        <a:xfrm>
+          <a:off x="0" y="0"/>
+          <a:ext cx="0" cy="0"/>
+          <a:chOff x="0" y="0"/>
+          <a:chExt cx="0" cy="0"/>
+        </a:xfrm>
+      </p:grpSpPr>
+      <p:sp>
+        <p:nvSpPr>
+          <p:cNvPr id="2" name="Header Placeholder 1"/>
+          <p:cNvSpPr>
+            <a:spLocks noGrp="1"/>
+          </p:cNvSpPr>
+          <p:nvPr>
+            <p:ph type="hdr" sz="quarter"/>
+          </p:nvPr>
+        </p:nvSpPr>
+        <p:spPr>
+          <a:xfrm>
+            <a:off x="0" y="0"/>
+            <a:ext cx="2971800" cy="458788"/>
+          </a:xfrm>
+          <a:prstGeom prst="rect">
+            <a:avLst/>
+          </a:prstGeom>
+        </p:spPr>
+        <p:txBody>
+          <a:bodyPr vert="horz" lIns="91440" tIns="45720" rIns="91440" bIns="45720" rtlCol="0"/>
+          <a:lstStyle>
+            <a:lvl1pPr algn="l">
+              <a:defRPr sz="1200"/>
+            </a:lvl1pPr>
+          </a:lstStyle>
+          <a:p>
+            <a:endParaRPr lang="en-US"/>
+          </a:p>
+        </p:txBody>
+      </p:sp>
+      <p:sp>
+        <p:nvSpPr>
+          <p:cNvPr id="3" name="Date Placeholder 2"/>
+          <p:cNvSpPr>
+            <a:spLocks noGrp="1"/>
+          </p:cNvSpPr>
+          <p:nvPr>
+            <p:ph type="dt" idx="1"/>
+          </p:nvPr>
+        </p:nvSpPr>
+        <p:spPr>
+          <a:xfrm>
+            <a:off x="3884613" y="0"/>
+            <a:ext cx="2971800" cy="458788"/>
+          </a:xfrm>
+          <a:prstGeom prst="rect">
+            <a:avLst/>
+          </a:prstGeom>
+        </p:spPr>
+        <p:txBody>
+          <a:bodyPr vert="horz" lIns="91440" tIns="45720" rIns="91440" bIns="45720" rtlCol="0"/>
+          <a:lstStyle>
+            <a:lvl1pPr algn="r">
+              <a:defRPr sz="1200"/>
+            </a:lvl1pPr>
+          </a:lstStyle>
+          <a:p>
+            <a:fld id="{6258ECF3-EDD8-D04A-90B6-1BE14B16AF69}" type="datetimeFigureOut">
+              <a:rPr lang="en-US" smtClean="0"/>
+              <a:t>7/26/17</a:t>
+            </a:fld>
+            <a:endParaRPr lang="en-US"/>
+          </a:p>
+        </p:txBody>
+      </p:sp>
+      <p:sp>
+        <p:nvSpPr>
+          <p:cNvPr id="4" name="Slide Image Placeholder 3"/>
+          <p:cNvSpPr>
+            <a:spLocks noGrp="1" noRot="1" noChangeAspect="1"/>
+          </p:cNvSpPr>
+          <p:nvPr>
+            <p:ph type="sldImg" idx="2"/>
+          </p:nvPr>
+        </p:nvSpPr>
+        <p:spPr>
+          <a:xfrm>
+            <a:off x="685800" y="1143000"/>
+            <a:ext cx="5486400" cy="3086100"/>
+          </a:xfrm>
+          <a:prstGeom prst="rect">
+            <a:avLst/>
+          </a:prstGeom>
+          <a:noFill/>
+          <a:ln w="12700">
+            <a:solidFill>
+              <a:prstClr val="black"/>
+            </a:solidFill>
+          </a:ln>
+        </p:spPr>
+        <p:txBody>
+          <a:bodyPr vert="horz" lIns="91440" tIns="45720" rIns="91440" bIns="45720" rtlCol="0" anchor="ctr"/>
+          <a:lstStyle/>
+          <a:p>
+            <a:endParaRPr lang="en-US"/>
+          </a:p>
+        </p:txBody>
+      </p:sp>
+      <p:sp>
+        <p:nvSpPr>
+          <p:cNvPr id="5" name="Notes Placeholder 4"/>
+          <p:cNvSpPr>
+            <a:spLocks noGrp="1"/>
+          </p:cNvSpPr>
+          <p:nvPr>
+            <p:ph type="body" sz="quarter" idx="3"/>
+          </p:nvPr>
+        </p:nvSpPr>
+        <p:spPr>
+          <a:xfrm>
+            <a:off x="685800" y="4400550"/>
+            <a:ext cx="5486400" cy="3600450"/>
+          </a:xfrm>
+          <a:prstGeom prst="rect">
+            <a:avLst/>
+          </a:prstGeom>
+        </p:spPr>
+        <p:txBody>
+          <a:bodyPr vert="horz" lIns="91440" tIns="45720" rIns="91440" bIns="45720" rtlCol="0"/>
+          <a:lstStyle/>
+          <a:p>
+            <a:pPr lvl="0"/>
+            <a:r>
+              <a:rPr lang="en-US" smtClean="0"/>
+              <a:t>Click to edit Master text styles</a:t>
+            </a:r>
+          </a:p>
+          <a:p>
+            <a:pPr lvl="1"/>
+            <a:r>
+              <a:rPr lang="en-US" smtClean="0"/>
+              <a:t>Second level</a:t>
+            </a:r>
+          </a:p>
+          <a:p>
+            <a:pPr lvl="2"/>
+            <a:r>
+              <a:rPr lang="en-US" smtClean="0"/>
+              <a:t>Third level</a:t>
+            </a:r>
+          </a:p>
+          <a:p>
+            <a:pPr lvl="3"/>
+            <a:r>
+              <a:rPr lang="en-US" smtClean="0"/>
+              <a:t>Fourth level</a:t>
+            </a:r>
+          </a:p>
+          <a:p>
+            <a:pPr lvl="4"/>
+            <a:r>
+              <a:rPr lang="en-US" smtClean="0"/>
+              <a:t>Fifth level</a:t>
+            </a:r>
+            <a:endParaRPr lang="en-US"/>
+          </a:p>
+        </p:txBody>
+      </p:sp>
+      <p:sp>
+        <p:nvSpPr>
+          <p:cNvPr id="6" name="Footer Placeholder 5"/>
+          <p:cNvSpPr>
+            <a:spLocks noGrp="1"/>
+          </p:cNvSpPr>
+          <p:nvPr>
+            <p:ph type="ftr" sz="quarter" idx="4"/>
+          </p:nvPr>
+        </p:nvSpPr>
+        <p:spPr>
+          <a:xfrm>
+            <a:off x="0" y="8685213"/>
+            <a:ext cx="2971800" cy="458787"/>
+          </a:xfrm>
+          <a:prstGeom prst="rect">
+            <a:avLst/>
+          </a:prstGeom>
+        </p:spPr>
+        <p:txBody>
+          <a:bodyPr vert="horz" lIns="91440" tIns="45720" rIns="91440" bIns="45720" rtlCol="0" anchor="b"/>
+          <a:lstStyle>
+            <a:lvl1pPr algn="l">
+              <a:defRPr sz="1200"/>
+            </a:lvl1pPr>
+          </a:lstStyle>
+          <a:p>
+            <a:endParaRPr lang="en-US"/>
+          </a:p>
+        </p:txBody>
+      </p:sp>
+      <p:sp>
+        <p:nvSpPr>
+          <p:cNvPr id="7" name="Slide Number Placeholder 6"/>
+          <p:cNvSpPr>
+            <a:spLocks noGrp="1"/>
+          </p:cNvSpPr>
+          <p:nvPr>
+            <p:ph type="sldNum" sz="quarter" idx="5"/>
+          </p:nvPr>
+        </p:nvSpPr>
+        <p:spPr>
+          <a:xfrm>
+            <a:off x="3884613" y="8685213"/>
+            <a:ext cx="2971800" cy="458787"/>
+          </a:xfrm>
+          <a:prstGeom prst="rect">
+            <a:avLst/>
+          </a:prstGeom>
+        </p:spPr>
+        <p:txBody>
+          <a:bodyPr vert="horz" lIns="91440" tIns="45720" rIns="91440" bIns="45720" rtlCol="0" anchor="b"/>
+          <a:lstStyle>
+            <a:lvl1pPr algn="r">
+              <a:defRPr sz="1200"/>
+            </a:lvl1pPr>
+          </a:lstStyle>
+          <a:p>
+            <a:fld id="{3157810A-E08F-B540-90FD-5ECCA829842A}" type="slidenum">
+              <a:rPr lang="en-US" smtClean="0"/>
+              <a:t>‹#›</a:t>
+            </a:fld>
+            <a:endParaRPr lang="en-US"/>
+          </a:p>
+        </p:txBody>
+      </p:sp>
+    </p:spTree>
+    <p:extLst>
+      <p:ext uri="{BB962C8B-B14F-4D97-AF65-F5344CB8AC3E}">
+        <p14:creationId xmlns:p14="http://schemas.microsoft.com/office/powerpoint/2010/main" val="1072736474"/>
+      </p:ext>
+    </p:extLst>
+  </p:cSld>
+  <p:clrMap bg1="lt1" tx1="dk1" bg2="lt2" tx2="dk2" accent1="accent1" accent2="accent2" accent3="accent3" accent4="accent4" accent5="accent5" accent6="accent6" hlink="hlink" folHlink="folHlink"/>
+  <p:notesStyle>
+    <a:lvl1pPr marL="0" algn="l" defTabSz="914400" rtl="0" eaLnBrk="1" latinLnBrk="0" hangingPunct="1">
+      <a:defRPr sz="1200" kern="1200">
+        <a:solidFill>
+          <a:schemeClr val="tx1"/>
+        </a:solidFill>
+        <a:latin typeface="+mn-lt"/>
+        <a:ea typeface="+mn-ea"/>
+        <a:cs typeface="+mn-cs"/>
+      </a:defRPr>
+    </a:lvl1pPr>
+    <a:lvl2pPr marL="457200" algn="l" defTabSz="914400" rtl="0" eaLnBrk="1" latinLnBrk="0" hangingPunct="1">
+      <a:defRPr sz="1200" kern="1200">
+        <a:solidFill>
+          <a:schemeClr val="tx1"/>
+        </a:solidFill>
+        <a:latin typeface="+mn-lt"/>
+        <a:ea typeface="+mn-ea"/>
+        <a:cs typeface="+mn-cs"/>
+      </a:defRPr>
+    </a:lvl2pPr>
+    <a:lvl3pPr marL="914400" algn="l" defTabSz="914400" rtl="0" eaLnBrk="1" latinLnBrk="0" hangingPunct="1">
+      <a:defRPr sz="1200" kern="1200">
+        <a:solidFill>
+          <a:schemeClr val="tx1"/>
+        </a:solidFill>
+        <a:latin typeface="+mn-lt"/>
+        <a:ea typeface="+mn-ea"/>
+        <a:cs typeface="+mn-cs"/>
+      </a:defRPr>
+    </a:lvl3pPr>
+    <a:lvl4pPr marL="1371600" algn="l" defTabSz="914400" rtl="0" eaLnBrk="1" latinLnBrk="0" hangingPunct="1">
+      <a:defRPr sz="1200" kern="1200">
+        <a:solidFill>
+          <a:schemeClr val="tx1"/>
+        </a:solidFill>
+        <a:latin typeface="+mn-lt"/>
+        <a:ea typeface="+mn-ea"/>
+        <a:cs typeface="+mn-cs"/>
+      </a:defRPr>
+    </a:lvl4pPr>
+    <a:lvl5pPr marL="1828800" algn="l" defTabSz="914400" rtl="0" eaLnBrk="1" latinLnBrk="0" hangingPunct="1">
+      <a:defRPr sz="1200" kern="1200">
+        <a:solidFill>
+          <a:schemeClr val="tx1"/>
+        </a:solidFill>
+        <a:latin typeface="+mn-lt"/>
+        <a:ea typeface="+mn-ea"/>
+        <a:cs typeface="+mn-cs"/>
+      </a:defRPr>
+    </a:lvl5pPr>
+    <a:lvl6pPr marL="2286000" algn="l" defTabSz="914400" rtl="0" eaLnBrk="1" latinLnBrk="0" hangingPunct="1">
+      <a:defRPr sz="1200" kern="1200">
+        <a:solidFill>
+          <a:schemeClr val="tx1"/>
+        </a:solidFill>
+        <a:latin typeface="+mn-lt"/>
+        <a:ea typeface="+mn-ea"/>
+        <a:cs typeface="+mn-cs"/>
+      </a:defRPr>
+    </a:lvl6pPr>
+    <a:lvl7pPr marL="2743200" algn="l" defTabSz="914400" rtl="0" eaLnBrk="1" latinLnBrk="0" hangingPunct="1">
+      <a:defRPr sz="1200" kern="1200">
+        <a:solidFill>
+          <a:schemeClr val="tx1"/>
+        </a:solidFill>
+        <a:latin typeface="+mn-lt"/>
+        <a:ea typeface="+mn-ea"/>
+        <a:cs typeface="+mn-cs"/>
+      </a:defRPr>
+    </a:lvl7pPr>
+    <a:lvl8pPr marL="3200400" algn="l" defTabSz="914400" rtl="0" eaLnBrk="1" latinLnBrk="0" hangingPunct="1">
+      <a:defRPr sz="1200" kern="1200">
+        <a:solidFill>
+          <a:schemeClr val="tx1"/>
+        </a:solidFill>
+        <a:latin typeface="+mn-lt"/>
+        <a:ea typeface="+mn-ea"/>
+        <a:cs typeface="+mn-cs"/>
+      </a:defRPr>
+    </a:lvl8pPr>
+    <a:lvl9pPr marL="3657600" algn="l" defTabSz="914400" rtl="0" eaLnBrk="1" latinLnBrk="0" hangingPunct="1">
+      <a:defRPr sz="1200" kern="1200">
+        <a:solidFill>
+          <a:schemeClr val="tx1"/>
+        </a:solidFill>
+        <a:latin typeface="+mn-lt"/>
+        <a:ea typeface="+mn-ea"/>
+        <a:cs typeface="+mn-cs"/>
+      </a:defRPr>
+    </a:lvl9pPr>
+  </p:notesStyle>
+</p:notesMaster>
+</file>
+
+<file path=ppt/notesSlides/notesSlide1.xml><?xml version="1.0" encoding="utf-8"?>
+<p:notes xmlns:a="http://schemas.openxmlformats.org/drawingml/2006/main" xmlns:r="http://schemas.openxmlformats.org/officeDocument/2006/relationships" xmlns:p="http://schemas.openxmlformats.org/presentationml/2006/main">
+  <p:cSld>
+    <p:spTree>
+      <p:nvGrpSpPr>
+        <p:cNvPr id="1" name=""/>
+        <p:cNvGrpSpPr/>
+        <p:nvPr/>
+      </p:nvGrpSpPr>
+      <p:grpSpPr>
+        <a:xfrm>
+          <a:off x="0" y="0"/>
+          <a:ext cx="0" cy="0"/>
+          <a:chOff x="0" y="0"/>
+          <a:chExt cx="0" cy="0"/>
+        </a:xfrm>
+      </p:grpSpPr>
+      <p:sp>
+        <p:nvSpPr>
+          <p:cNvPr id="2" name="Slide Image Placeholder 1"/>
+          <p:cNvSpPr>
+            <a:spLocks noGrp="1" noRot="1" noChangeAspect="1"/>
+          </p:cNvSpPr>
+          <p:nvPr>
+            <p:ph type="sldImg"/>
+          </p:nvPr>
+        </p:nvSpPr>
+        <p:spPr/>
+      </p:sp>
+      <p:sp>
+        <p:nvSpPr>
+          <p:cNvPr id="3" name="Notes Placeholder 2"/>
+          <p:cNvSpPr>
+            <a:spLocks noGrp="1"/>
+          </p:cNvSpPr>
+          <p:nvPr>
+            <p:ph type="body" idx="1"/>
+          </p:nvPr>
+        </p:nvSpPr>
+        <p:spPr/>
+        <p:txBody>
+          <a:bodyPr/>
+          <a:lstStyle/>
+          <a:p>
+            <a:endParaRPr lang="en-US" dirty="0"/>
+          </a:p>
+        </p:txBody>
+      </p:sp>
+      <p:sp>
+        <p:nvSpPr>
+          <p:cNvPr id="4" name="Slide Number Placeholder 3"/>
+          <p:cNvSpPr>
+            <a:spLocks noGrp="1"/>
+          </p:cNvSpPr>
+          <p:nvPr>
+            <p:ph type="sldNum" sz="quarter" idx="10"/>
+          </p:nvPr>
+        </p:nvSpPr>
+        <p:spPr/>
+        <p:txBody>
+          <a:bodyPr/>
+          <a:lstStyle/>
+          <a:p>
+            <a:fld id="{3157810A-E08F-B540-90FD-5ECCA829842A}" type="slidenum">
+              <a:rPr lang="en-US" smtClean="0"/>
+              <a:t>1</a:t>
+            </a:fld>
+            <a:endParaRPr lang="en-US"/>
+          </a:p>
+        </p:txBody>
+      </p:sp>
+    </p:spTree>
+    <p:extLst>
+      <p:ext uri="{BB962C8B-B14F-4D97-AF65-F5344CB8AC3E}">
+        <p14:creationId xmlns:p14="http://schemas.microsoft.com/office/powerpoint/2010/main" val="1356701953"/>
+      </p:ext>
+    </p:extLst>
+  </p:cSld>
+  <p:clrMapOvr>
+    <a:masterClrMapping/>
+  </p:clrMapOvr>
+</p:notes>
+</file>
+
 <file path=ppt/slideLayouts/slideLayout1.xml><?xml version="1.0" encoding="utf-8"?>
 <p:sldLayout xmlns:a="http://schemas.openxmlformats.org/drawingml/2006/main" xmlns:r="http://schemas.openxmlformats.org/officeDocument/2006/relationships" xmlns:p="http://schemas.openxmlformats.org/presentationml/2006/main" type="title" preserve="1">
   <p:cSld name="Title Slide">
@@ -243,7 +680,7 @@
           <a:p>
             <a:fld id="{53D6C1FA-00A9-4142-A80A-0CB384F9F4AC}" type="datetimeFigureOut">
               <a:rPr lang="en-US" smtClean="0"/>
-              <a:t>7/18/17</a:t>
+              <a:t>7/26/17</a:t>
             </a:fld>
             <a:endParaRPr lang="en-US"/>
           </a:p>
@@ -413,7 +850,7 @@
           <a:p>
             <a:fld id="{53D6C1FA-00A9-4142-A80A-0CB384F9F4AC}" type="datetimeFigureOut">
               <a:rPr lang="en-US" smtClean="0"/>
-              <a:t>7/18/17</a:t>
+              <a:t>7/26/17</a:t>
             </a:fld>
             <a:endParaRPr lang="en-US"/>
           </a:p>
@@ -593,7 +1030,7 @@
           <a:p>
             <a:fld id="{53D6C1FA-00A9-4142-A80A-0CB384F9F4AC}" type="datetimeFigureOut">
               <a:rPr lang="en-US" smtClean="0"/>
-              <a:t>7/18/17</a:t>
+              <a:t>7/26/17</a:t>
             </a:fld>
             <a:endParaRPr lang="en-US"/>
           </a:p>
@@ -763,7 +1200,7 @@
           <a:p>
             <a:fld id="{53D6C1FA-00A9-4142-A80A-0CB384F9F4AC}" type="datetimeFigureOut">
               <a:rPr lang="en-US" smtClean="0"/>
-              <a:t>7/18/17</a:t>
+              <a:t>7/26/17</a:t>
             </a:fld>
             <a:endParaRPr lang="en-US"/>
           </a:p>
@@ -1009,7 +1446,7 @@
           <a:p>
             <a:fld id="{53D6C1FA-00A9-4142-A80A-0CB384F9F4AC}" type="datetimeFigureOut">
               <a:rPr lang="en-US" smtClean="0"/>
-              <a:t>7/18/17</a:t>
+              <a:t>7/26/17</a:t>
             </a:fld>
             <a:endParaRPr lang="en-US"/>
           </a:p>
@@ -1241,7 +1678,7 @@
           <a:p>
             <a:fld id="{53D6C1FA-00A9-4142-A80A-0CB384F9F4AC}" type="datetimeFigureOut">
               <a:rPr lang="en-US" smtClean="0"/>
-              <a:t>7/18/17</a:t>
+              <a:t>7/26/17</a:t>
             </a:fld>
             <a:endParaRPr lang="en-US"/>
           </a:p>
@@ -1608,7 +2045,7 @@
           <a:p>
             <a:fld id="{53D6C1FA-00A9-4142-A80A-0CB384F9F4AC}" type="datetimeFigureOut">
               <a:rPr lang="en-US" smtClean="0"/>
-              <a:t>7/18/17</a:t>
+              <a:t>7/26/17</a:t>
             </a:fld>
             <a:endParaRPr lang="en-US"/>
           </a:p>
@@ -1726,7 +2163,7 @@
           <a:p>
             <a:fld id="{53D6C1FA-00A9-4142-A80A-0CB384F9F4AC}" type="datetimeFigureOut">
               <a:rPr lang="en-US" smtClean="0"/>
-              <a:t>7/18/17</a:t>
+              <a:t>7/26/17</a:t>
             </a:fld>
             <a:endParaRPr lang="en-US"/>
           </a:p>
@@ -1821,7 +2258,7 @@
           <a:p>
             <a:fld id="{53D6C1FA-00A9-4142-A80A-0CB384F9F4AC}" type="datetimeFigureOut">
               <a:rPr lang="en-US" smtClean="0"/>
-              <a:t>7/18/17</a:t>
+              <a:t>7/26/17</a:t>
             </a:fld>
             <a:endParaRPr lang="en-US"/>
           </a:p>
@@ -2098,7 +2535,7 @@
           <a:p>
             <a:fld id="{53D6C1FA-00A9-4142-A80A-0CB384F9F4AC}" type="datetimeFigureOut">
               <a:rPr lang="en-US" smtClean="0"/>
-              <a:t>7/18/17</a:t>
+              <a:t>7/26/17</a:t>
             </a:fld>
             <a:endParaRPr lang="en-US"/>
           </a:p>
@@ -2351,7 +2788,7 @@
           <a:p>
             <a:fld id="{53D6C1FA-00A9-4142-A80A-0CB384F9F4AC}" type="datetimeFigureOut">
               <a:rPr lang="en-US" smtClean="0"/>
-              <a:t>7/18/17</a:t>
+              <a:t>7/26/17</a:t>
             </a:fld>
             <a:endParaRPr lang="en-US"/>
           </a:p>
@@ -2564,7 +3001,7 @@
           <a:p>
             <a:fld id="{53D6C1FA-00A9-4142-A80A-0CB384F9F4AC}" type="datetimeFigureOut">
               <a:rPr lang="en-US" smtClean="0"/>
-              <a:t>7/18/17</a:t>
+              <a:t>7/26/17</a:t>
             </a:fld>
             <a:endParaRPr lang="en-US"/>
           </a:p>
@@ -2977,7 +3414,7 @@
         </p:nvSpPr>
         <p:spPr>
           <a:xfrm>
-            <a:off x="1204790" y="1006025"/>
+            <a:off x="556584" y="1605144"/>
             <a:ext cx="913007" cy="505547"/>
           </a:xfrm>
           <a:prstGeom prst="snip1Rect">
@@ -3027,8 +3464,8 @@
         </p:nvSpPr>
         <p:spPr>
           <a:xfrm>
-            <a:off x="870014" y="1815396"/>
-            <a:ext cx="1592934" cy="758321"/>
+            <a:off x="771525" y="2353876"/>
+            <a:ext cx="1975903" cy="758321"/>
           </a:xfrm>
           <a:prstGeom prst="rect">
             <a:avLst/>
@@ -3128,7 +3565,7 @@
         </p:nvSpPr>
         <p:spPr>
           <a:xfrm>
-            <a:off x="2828100" y="2251708"/>
+            <a:off x="3112580" y="2790188"/>
             <a:ext cx="954975" cy="505547"/>
           </a:xfrm>
           <a:prstGeom prst="snip1Rect">
@@ -3179,7 +3616,7 @@
         </p:nvSpPr>
         <p:spPr>
           <a:xfrm>
-            <a:off x="4186227" y="908039"/>
+            <a:off x="4470707" y="1446519"/>
             <a:ext cx="1749517" cy="998080"/>
           </a:xfrm>
           <a:prstGeom prst="rect">
@@ -3299,8 +3736,8 @@
         </p:nvSpPr>
         <p:spPr>
           <a:xfrm>
-            <a:off x="2828099" y="1152333"/>
-            <a:ext cx="954975" cy="505547"/>
+            <a:off x="3108353" y="1690813"/>
+            <a:ext cx="1001428" cy="774474"/>
           </a:xfrm>
           <a:prstGeom prst="snip1Rect">
             <a:avLst>
@@ -3338,6 +3775,13 @@
               <a:rPr lang="en-US" sz="1200" dirty="0" smtClean="0"/>
               <a:t>ns3Exp.graph</a:t>
             </a:r>
+          </a:p>
+          <a:p>
+            <a:pPr algn="ctr"/>
+            <a:r>
+              <a:rPr lang="en-US" sz="1200" dirty="0" smtClean="0"/>
+              <a:t>cory5th.graph</a:t>
+            </a:r>
             <a:endParaRPr lang="en-US" sz="1200" dirty="0"/>
           </a:p>
         </p:txBody>
@@ -3350,7 +3794,7 @@
         </p:nvSpPr>
         <p:spPr>
           <a:xfrm>
-            <a:off x="2828099" y="2953634"/>
+            <a:off x="3112579" y="3492114"/>
             <a:ext cx="954975" cy="505547"/>
           </a:xfrm>
           <a:prstGeom prst="snip1Rect">
@@ -3401,7 +3845,7 @@
         </p:nvSpPr>
         <p:spPr>
           <a:xfrm>
-            <a:off x="4186228" y="2504481"/>
+            <a:off x="4470708" y="3042961"/>
             <a:ext cx="1749517" cy="758321"/>
           </a:xfrm>
           <a:prstGeom prst="rect">
@@ -3477,42 +3921,6 @@
       </p:sp>
       <p:cxnSp>
         <p:nvCxnSpPr>
-          <p:cNvPr id="12" name="Straight Arrow Connector 11"/>
-          <p:cNvCxnSpPr>
-            <a:stCxn id="4" idx="1"/>
-            <a:endCxn id="5" idx="0"/>
-          </p:cNvCxnSpPr>
-          <p:nvPr/>
-        </p:nvCxnSpPr>
-        <p:spPr>
-          <a:xfrm>
-            <a:off x="1661294" y="1511572"/>
-            <a:ext cx="5187" cy="303824"/>
-          </a:xfrm>
-          <a:prstGeom prst="straightConnector1">
-            <a:avLst/>
-          </a:prstGeom>
-          <a:ln w="57150">
-            <a:tailEnd type="triangle"/>
-          </a:ln>
-        </p:spPr>
-        <p:style>
-          <a:lnRef idx="1">
-            <a:schemeClr val="accent1"/>
-          </a:lnRef>
-          <a:fillRef idx="0">
-            <a:schemeClr val="accent1"/>
-          </a:fillRef>
-          <a:effectRef idx="0">
-            <a:schemeClr val="accent1"/>
-          </a:effectRef>
-          <a:fontRef idx="minor">
-            <a:schemeClr val="tx1"/>
-          </a:fontRef>
-        </p:style>
-      </p:cxnSp>
-      <p:cxnSp>
-        <p:nvCxnSpPr>
           <p:cNvPr id="13" name="Straight Arrow Connector 12"/>
           <p:cNvCxnSpPr>
             <a:stCxn id="5" idx="3"/>
@@ -3522,8 +3930,8 @@
         </p:nvCxnSpPr>
         <p:spPr>
           <a:xfrm flipV="1">
-            <a:off x="2462948" y="1405107"/>
-            <a:ext cx="365151" cy="789450"/>
+            <a:off x="2747428" y="2078050"/>
+            <a:ext cx="360925" cy="654987"/>
           </a:xfrm>
           <a:prstGeom prst="straightConnector1">
             <a:avLst/>
@@ -3558,7 +3966,7 @@
         </p:nvCxnSpPr>
         <p:spPr>
           <a:xfrm>
-            <a:off x="2462948" y="2194557"/>
+            <a:off x="2747428" y="2733037"/>
             <a:ext cx="365152" cy="309925"/>
           </a:xfrm>
           <a:prstGeom prst="straightConnector1">
@@ -3594,7 +4002,7 @@
         </p:nvCxnSpPr>
         <p:spPr>
           <a:xfrm>
-            <a:off x="2462948" y="2194557"/>
+            <a:off x="2747428" y="2733037"/>
             <a:ext cx="365151" cy="1011851"/>
           </a:xfrm>
           <a:prstGeom prst="straightConnector1">
@@ -3630,7 +4038,7 @@
         </p:nvCxnSpPr>
         <p:spPr>
           <a:xfrm flipV="1">
-            <a:off x="3783074" y="2883642"/>
+            <a:off x="4067554" y="3422122"/>
             <a:ext cx="403154" cy="322766"/>
           </a:xfrm>
           <a:prstGeom prst="straightConnector1">
@@ -3666,7 +4074,7 @@
         </p:nvCxnSpPr>
         <p:spPr>
           <a:xfrm>
-            <a:off x="3783075" y="2504482"/>
+            <a:off x="4067555" y="3042962"/>
             <a:ext cx="403153" cy="379160"/>
           </a:xfrm>
           <a:prstGeom prst="straightConnector1">
@@ -3701,9 +4109,9 @@
           <p:nvPr/>
         </p:nvCxnSpPr>
         <p:spPr>
-          <a:xfrm>
-            <a:off x="3783074" y="1405107"/>
-            <a:ext cx="403153" cy="1972"/>
+          <a:xfrm flipV="1">
+            <a:off x="4109781" y="1945559"/>
+            <a:ext cx="360926" cy="132491"/>
           </a:xfrm>
           <a:prstGeom prst="straightConnector1">
             <a:avLst/>
@@ -3735,7 +4143,7 @@
         </p:nvSpPr>
         <p:spPr>
           <a:xfrm>
-            <a:off x="6296670" y="2226024"/>
+            <a:off x="6581150" y="2764504"/>
             <a:ext cx="1612890" cy="505547"/>
           </a:xfrm>
           <a:prstGeom prst="snip1Rect">
@@ -3789,7 +4197,7 @@
         </p:nvCxnSpPr>
         <p:spPr>
           <a:xfrm flipV="1">
-            <a:off x="5935745" y="2478798"/>
+            <a:off x="6220225" y="3017278"/>
             <a:ext cx="360925" cy="404844"/>
           </a:xfrm>
           <a:prstGeom prst="straightConnector1">
@@ -3822,7 +4230,7 @@
         </p:nvSpPr>
         <p:spPr>
           <a:xfrm>
-            <a:off x="6296670" y="349264"/>
+            <a:off x="6581150" y="887744"/>
             <a:ext cx="1612890" cy="321408"/>
           </a:xfrm>
           <a:prstGeom prst="snip1Rect">
@@ -3873,7 +4281,7 @@
         </p:nvSpPr>
         <p:spPr>
           <a:xfrm>
-            <a:off x="6296670" y="1159618"/>
+            <a:off x="6581150" y="1698098"/>
             <a:ext cx="1612890" cy="321408"/>
           </a:xfrm>
           <a:prstGeom prst="snip1Rect">
@@ -3916,7 +4324,7 @@
         </p:nvSpPr>
         <p:spPr>
           <a:xfrm>
-            <a:off x="6296670" y="1584711"/>
+            <a:off x="6581150" y="2123191"/>
             <a:ext cx="1612890" cy="321408"/>
           </a:xfrm>
           <a:prstGeom prst="snip1Rect">
@@ -3967,7 +4375,7 @@
         </p:nvSpPr>
         <p:spPr>
           <a:xfrm>
-            <a:off x="6296670" y="746142"/>
+            <a:off x="6581150" y="1284622"/>
             <a:ext cx="1612890" cy="321408"/>
           </a:xfrm>
           <a:prstGeom prst="snip1Rect">
@@ -4021,7 +4429,7 @@
         </p:nvCxnSpPr>
         <p:spPr>
           <a:xfrm>
-            <a:off x="5935745" y="2883642"/>
+            <a:off x="6220225" y="3422122"/>
             <a:ext cx="360924" cy="168673"/>
           </a:xfrm>
           <a:prstGeom prst="straightConnector1">
@@ -4054,7 +4462,7 @@
         </p:nvSpPr>
         <p:spPr>
           <a:xfrm>
-            <a:off x="6296669" y="2836591"/>
+            <a:off x="6581149" y="3375071"/>
             <a:ext cx="1612891" cy="431448"/>
           </a:xfrm>
           <a:prstGeom prst="snip1Rect">
@@ -4113,7 +4521,7 @@
         </p:nvSpPr>
         <p:spPr>
           <a:xfrm>
-            <a:off x="8423519" y="1513644"/>
+            <a:off x="8707999" y="2052124"/>
             <a:ext cx="2615929" cy="1169366"/>
           </a:xfrm>
           <a:prstGeom prst="rect">
@@ -4325,7 +4733,7 @@
         </p:nvCxnSpPr>
         <p:spPr>
           <a:xfrm flipV="1">
-            <a:off x="7909560" y="2098327"/>
+            <a:off x="8194040" y="2636807"/>
             <a:ext cx="513959" cy="380471"/>
           </a:xfrm>
           <a:prstGeom prst="straightConnector1">
@@ -4361,7 +4769,7 @@
         </p:nvCxnSpPr>
         <p:spPr>
           <a:xfrm flipV="1">
-            <a:off x="5935744" y="509968"/>
+            <a:off x="6220224" y="1048448"/>
             <a:ext cx="360926" cy="897111"/>
           </a:xfrm>
           <a:prstGeom prst="straightConnector1">
@@ -4397,7 +4805,7 @@
         </p:nvCxnSpPr>
         <p:spPr>
           <a:xfrm flipV="1">
-            <a:off x="5935744" y="906846"/>
+            <a:off x="6220224" y="1445326"/>
             <a:ext cx="360926" cy="500233"/>
           </a:xfrm>
           <a:prstGeom prst="straightConnector1">
@@ -4433,7 +4841,7 @@
         </p:nvCxnSpPr>
         <p:spPr>
           <a:xfrm flipV="1">
-            <a:off x="5935744" y="1320322"/>
+            <a:off x="6220224" y="1858802"/>
             <a:ext cx="360926" cy="86757"/>
           </a:xfrm>
           <a:prstGeom prst="straightConnector1">
@@ -4469,7 +4877,7 @@
         </p:nvCxnSpPr>
         <p:spPr>
           <a:xfrm>
-            <a:off x="5935744" y="1407079"/>
+            <a:off x="6220224" y="1945559"/>
             <a:ext cx="360926" cy="338336"/>
           </a:xfrm>
           <a:prstGeom prst="straightConnector1">
@@ -4502,7 +4910,7 @@
         </p:nvSpPr>
         <p:spPr>
           <a:xfrm>
-            <a:off x="8423519" y="2889273"/>
+            <a:off x="8707999" y="3427753"/>
             <a:ext cx="1863482" cy="1405202"/>
           </a:xfrm>
           <a:prstGeom prst="rect">
@@ -4712,7 +5120,7 @@
         </p:nvCxnSpPr>
         <p:spPr>
           <a:xfrm>
-            <a:off x="7909560" y="1745415"/>
+            <a:off x="8194040" y="2283895"/>
             <a:ext cx="513959" cy="1846459"/>
           </a:xfrm>
           <a:prstGeom prst="straightConnector1">
@@ -4751,7 +5159,7 @@
         </p:nvCxnSpPr>
         <p:spPr>
           <a:xfrm>
-            <a:off x="7909560" y="906846"/>
+            <a:off x="8194040" y="1445326"/>
             <a:ext cx="513959" cy="2685028"/>
           </a:xfrm>
           <a:prstGeom prst="straightConnector1">
@@ -4790,7 +5198,7 @@
         </p:nvCxnSpPr>
         <p:spPr>
           <a:xfrm>
-            <a:off x="7909560" y="3052315"/>
+            <a:off x="8194040" y="3590795"/>
             <a:ext cx="513959" cy="539559"/>
           </a:xfrm>
           <a:prstGeom prst="straightConnector1">
@@ -4825,7 +5233,7 @@
         </p:nvCxnSpPr>
         <p:spPr>
           <a:xfrm>
-            <a:off x="9355260" y="4294475"/>
+            <a:off x="9639740" y="4832955"/>
             <a:ext cx="0" cy="844089"/>
           </a:xfrm>
           <a:prstGeom prst="straightConnector1">
@@ -4858,7 +5266,7 @@
         </p:nvCxnSpPr>
         <p:spPr>
           <a:xfrm>
-            <a:off x="10518583" y="2683010"/>
+            <a:off x="10803063" y="3221490"/>
             <a:ext cx="0" cy="2455554"/>
           </a:xfrm>
           <a:prstGeom prst="straightConnector1">
@@ -4891,7 +5299,7 @@
         </p:nvSpPr>
         <p:spPr>
           <a:xfrm>
-            <a:off x="6296669" y="5128918"/>
+            <a:off x="6581149" y="5667398"/>
             <a:ext cx="1612891" cy="456600"/>
           </a:xfrm>
           <a:prstGeom prst="rect">
@@ -4960,7 +5368,7 @@
         </p:nvCxnSpPr>
         <p:spPr>
           <a:xfrm flipH="1">
-            <a:off x="7909560" y="5354288"/>
+            <a:off x="8194040" y="5892768"/>
             <a:ext cx="2211187" cy="2930"/>
           </a:xfrm>
           <a:prstGeom prst="straightConnector1">
@@ -4999,7 +5407,7 @@
         </p:nvCxnSpPr>
         <p:spPr>
           <a:xfrm flipH="1" flipV="1">
-            <a:off x="5909002" y="4898329"/>
+            <a:off x="6193482" y="5436809"/>
             <a:ext cx="387667" cy="458889"/>
           </a:xfrm>
           <a:prstGeom prst="straightConnector1">
@@ -5035,7 +5443,7 @@
         </p:nvSpPr>
         <p:spPr>
           <a:xfrm>
-            <a:off x="1296040" y="4973074"/>
+            <a:off x="1580520" y="5511554"/>
             <a:ext cx="1612891" cy="727363"/>
           </a:xfrm>
           <a:prstGeom prst="rect">
@@ -5142,7 +5550,7 @@
         </p:nvCxnSpPr>
         <p:spPr>
           <a:xfrm flipH="1">
-            <a:off x="2908931" y="4898329"/>
+            <a:off x="3193411" y="5436809"/>
             <a:ext cx="806446" cy="438427"/>
           </a:xfrm>
           <a:prstGeom prst="straightConnector1">
@@ -5178,7 +5586,7 @@
         </p:nvSpPr>
         <p:spPr>
           <a:xfrm>
-            <a:off x="10120747" y="5138564"/>
+            <a:off x="10405227" y="5677044"/>
             <a:ext cx="918702" cy="431448"/>
           </a:xfrm>
           <a:prstGeom prst="snip1Rect">
@@ -5226,7 +5634,7 @@
         </p:nvSpPr>
         <p:spPr>
           <a:xfrm>
-            <a:off x="8423520" y="5138564"/>
+            <a:off x="8708000" y="5677044"/>
             <a:ext cx="1553374" cy="431448"/>
           </a:xfrm>
           <a:prstGeom prst="snip1Rect">
@@ -5281,7 +5689,7 @@
         </p:nvSpPr>
         <p:spPr>
           <a:xfrm>
-            <a:off x="1070041" y="6043604"/>
+            <a:off x="1354521" y="6582084"/>
             <a:ext cx="2086082" cy="665763"/>
           </a:xfrm>
           <a:prstGeom prst="snip1Rect">
@@ -5348,7 +5756,7 @@
         </p:nvSpPr>
         <p:spPr>
           <a:xfrm>
-            <a:off x="3715377" y="4486008"/>
+            <a:off x="3999857" y="5024488"/>
             <a:ext cx="2193625" cy="824641"/>
           </a:xfrm>
           <a:prstGeom prst="snip1Rect">
@@ -5422,7 +5830,7 @@
         </p:nvSpPr>
         <p:spPr>
           <a:xfrm>
-            <a:off x="3715377" y="5471375"/>
+            <a:off x="3999857" y="6009855"/>
             <a:ext cx="2193625" cy="503189"/>
           </a:xfrm>
           <a:prstGeom prst="snip1Rect">
@@ -5488,7 +5896,7 @@
         </p:nvCxnSpPr>
         <p:spPr>
           <a:xfrm flipH="1">
-            <a:off x="5909002" y="5357218"/>
+            <a:off x="6193482" y="5895698"/>
             <a:ext cx="387667" cy="365752"/>
           </a:xfrm>
           <a:prstGeom prst="straightConnector1">
@@ -5527,7 +5935,7 @@
         </p:nvCxnSpPr>
         <p:spPr>
           <a:xfrm flipH="1" flipV="1">
-            <a:off x="2908931" y="5336756"/>
+            <a:off x="3193411" y="5875236"/>
             <a:ext cx="806446" cy="386214"/>
           </a:xfrm>
           <a:prstGeom prst="straightConnector1">
@@ -5566,7 +5974,7 @@
         </p:nvCxnSpPr>
         <p:spPr>
           <a:xfrm>
-            <a:off x="2102486" y="5700437"/>
+            <a:off x="2386966" y="6238917"/>
             <a:ext cx="10596" cy="343167"/>
           </a:xfrm>
           <a:prstGeom prst="straightConnector1">
@@ -5602,7 +6010,7 @@
         </p:nvSpPr>
         <p:spPr>
           <a:xfrm>
-            <a:off x="898287" y="192435"/>
+            <a:off x="1538679" y="-620625"/>
             <a:ext cx="1526012" cy="472138"/>
           </a:xfrm>
           <a:prstGeom prst="rect">
@@ -5665,14 +6073,14 @@
           <p:cNvPr id="52" name="Straight Arrow Connector 51"/>
           <p:cNvCxnSpPr>
             <a:stCxn id="49" idx="2"/>
-            <a:endCxn id="4" idx="3"/>
+            <a:endCxn id="65" idx="3"/>
           </p:cNvCxnSpPr>
           <p:nvPr/>
         </p:nvCxnSpPr>
         <p:spPr>
           <a:xfrm>
-            <a:off x="1661293" y="664573"/>
-            <a:ext cx="1" cy="341452"/>
+            <a:off x="2301685" y="-148487"/>
+            <a:ext cx="0" cy="230698"/>
           </a:xfrm>
           <a:prstGeom prst="straightConnector1">
             <a:avLst/>
@@ -5704,7 +6112,7 @@
         </p:nvSpPr>
         <p:spPr>
           <a:xfrm>
-            <a:off x="6296670" y="3973410"/>
+            <a:off x="6581150" y="4511890"/>
             <a:ext cx="1612890" cy="321408"/>
           </a:xfrm>
           <a:prstGeom prst="snip1Rect">
@@ -5752,7 +6160,7 @@
         </p:nvSpPr>
         <p:spPr>
           <a:xfrm>
-            <a:off x="5637320" y="3541819"/>
+            <a:off x="5921800" y="4080299"/>
             <a:ext cx="2272240" cy="321408"/>
           </a:xfrm>
           <a:prstGeom prst="snip1Rect">
@@ -5812,7 +6220,7 @@
         </p:nvSpPr>
         <p:spPr>
           <a:xfrm>
-            <a:off x="6296670" y="4405002"/>
+            <a:off x="6581150" y="4943482"/>
             <a:ext cx="1612890" cy="321408"/>
           </a:xfrm>
           <a:prstGeom prst="snip1Rect">
@@ -5863,7 +6271,7 @@
         </p:nvCxnSpPr>
         <p:spPr>
           <a:xfrm flipV="1">
-            <a:off x="7909560" y="3591874"/>
+            <a:off x="8194040" y="4130354"/>
             <a:ext cx="513959" cy="110649"/>
           </a:xfrm>
           <a:prstGeom prst="straightConnector1">
@@ -5899,7 +6307,7 @@
         </p:nvCxnSpPr>
         <p:spPr>
           <a:xfrm flipV="1">
-            <a:off x="7909560" y="3591874"/>
+            <a:off x="8194040" y="4130354"/>
             <a:ext cx="513959" cy="542240"/>
           </a:xfrm>
           <a:prstGeom prst="straightConnector1">
@@ -5935,7 +6343,7 @@
         </p:nvCxnSpPr>
         <p:spPr>
           <a:xfrm flipV="1">
-            <a:off x="7909560" y="3591874"/>
+            <a:off x="8194040" y="4130354"/>
             <a:ext cx="513959" cy="973832"/>
           </a:xfrm>
           <a:prstGeom prst="straightConnector1">
@@ -5960,6 +6368,362 @@
           </a:fontRef>
         </p:style>
       </p:cxnSp>
+      <p:sp>
+        <p:nvSpPr>
+          <p:cNvPr id="65" name="Snip Single Corner Rectangle 64"/>
+          <p:cNvSpPr/>
+          <p:nvPr/>
+        </p:nvSpPr>
+        <p:spPr>
+          <a:xfrm>
+            <a:off x="1433294" y="82211"/>
+            <a:ext cx="1736782" cy="598046"/>
+          </a:xfrm>
+          <a:prstGeom prst="snip1Rect">
+            <a:avLst>
+              <a:gd name="adj" fmla="val 15368"/>
+            </a:avLst>
+          </a:prstGeom>
+        </p:spPr>
+        <p:style>
+          <a:lnRef idx="2">
+            <a:schemeClr val="dk1"/>
+          </a:lnRef>
+          <a:fillRef idx="1">
+            <a:schemeClr val="lt1"/>
+          </a:fillRef>
+          <a:effectRef idx="0">
+            <a:schemeClr val="dk1"/>
+          </a:effectRef>
+          <a:fontRef idx="minor">
+            <a:schemeClr val="dk1"/>
+          </a:fontRef>
+        </p:style>
+        <p:txBody>
+          <a:bodyPr lIns="45720" tIns="0" rIns="0" bIns="0" rtlCol="0" anchor="ctr"/>
+          <a:lstStyle/>
+          <a:p>
+            <a:pPr algn="ctr"/>
+            <a:r>
+              <a:rPr lang="en-US" sz="1200" b="1" dirty="0" smtClean="0"/>
+              <a:t>cory5th.txt</a:t>
+            </a:r>
+          </a:p>
+          <a:p>
+            <a:pPr marL="171450" indent="-171450">
+              <a:buFont typeface="Arial" charset="0"/>
+              <a:buChar char="•"/>
+            </a:pPr>
+            <a:r>
+              <a:rPr lang="en-US" sz="1200" dirty="0" smtClean="0"/>
+              <a:t>Pairs of</a:t>
+            </a:r>
+          </a:p>
+          <a:p>
+            <a:r>
+              <a:rPr lang="en-US" sz="1200" dirty="0" smtClean="0"/>
+              <a:t>[entity name : coordinate]</a:t>
+            </a:r>
+            <a:endParaRPr lang="en-US" sz="1200" dirty="0"/>
+          </a:p>
+        </p:txBody>
+      </p:sp>
+      <p:sp>
+        <p:nvSpPr>
+          <p:cNvPr id="86" name="Rectangle 85"/>
+          <p:cNvSpPr/>
+          <p:nvPr/>
+        </p:nvSpPr>
+        <p:spPr>
+          <a:xfrm>
+            <a:off x="1655945" y="913669"/>
+            <a:ext cx="1291480" cy="466767"/>
+          </a:xfrm>
+          <a:prstGeom prst="rect">
+            <a:avLst/>
+          </a:prstGeom>
+          <a:solidFill>
+            <a:schemeClr val="accent4">
+              <a:lumMod val="75000"/>
+            </a:schemeClr>
+          </a:solidFill>
+        </p:spPr>
+        <p:style>
+          <a:lnRef idx="2">
+            <a:schemeClr val="accent5">
+              <a:shade val="50000"/>
+            </a:schemeClr>
+          </a:lnRef>
+          <a:fillRef idx="1">
+            <a:schemeClr val="accent5"/>
+          </a:fillRef>
+          <a:effectRef idx="0">
+            <a:schemeClr val="accent5"/>
+          </a:effectRef>
+          <a:fontRef idx="minor">
+            <a:schemeClr val="lt1"/>
+          </a:fontRef>
+        </p:style>
+        <p:txBody>
+          <a:bodyPr lIns="45720" tIns="0" rIns="0" bIns="0" rtlCol="0" anchor="ctr"/>
+          <a:lstStyle/>
+          <a:p>
+            <a:pPr algn="ctr"/>
+            <a:r>
+              <a:rPr lang="en-US" sz="1200" b="1" dirty="0" smtClean="0">
+                <a:solidFill>
+                  <a:schemeClr val="tx1"/>
+                </a:solidFill>
+              </a:rPr>
+              <a:t>$CCS/</a:t>
+            </a:r>
+          </a:p>
+          <a:p>
+            <a:pPr algn="ctr"/>
+            <a:r>
+              <a:rPr lang="en-US" sz="1200" b="1" dirty="0" err="1" smtClean="0">
+                <a:solidFill>
+                  <a:schemeClr val="tx1"/>
+                </a:solidFill>
+              </a:rPr>
+              <a:t>floorPlanToInput.js</a:t>
+            </a:r>
+            <a:endParaRPr lang="en-US" sz="1200" dirty="0">
+              <a:solidFill>
+                <a:schemeClr val="tx1"/>
+              </a:solidFill>
+            </a:endParaRPr>
+          </a:p>
+        </p:txBody>
+      </p:sp>
+      <p:cxnSp>
+        <p:nvCxnSpPr>
+          <p:cNvPr id="87" name="Straight Arrow Connector 86"/>
+          <p:cNvCxnSpPr>
+            <a:stCxn id="86" idx="2"/>
+            <a:endCxn id="101" idx="3"/>
+          </p:cNvCxnSpPr>
+          <p:nvPr/>
+        </p:nvCxnSpPr>
+        <p:spPr>
+          <a:xfrm>
+            <a:off x="2301685" y="1380436"/>
+            <a:ext cx="6300" cy="225592"/>
+          </a:xfrm>
+          <a:prstGeom prst="straightConnector1">
+            <a:avLst/>
+          </a:prstGeom>
+          <a:ln w="57150">
+            <a:tailEnd type="triangle"/>
+          </a:ln>
+        </p:spPr>
+        <p:style>
+          <a:lnRef idx="1">
+            <a:schemeClr val="accent1"/>
+          </a:lnRef>
+          <a:fillRef idx="0">
+            <a:schemeClr val="accent1"/>
+          </a:fillRef>
+          <a:effectRef idx="0">
+            <a:schemeClr val="accent1"/>
+          </a:effectRef>
+          <a:fontRef idx="minor">
+            <a:schemeClr val="tx1"/>
+          </a:fontRef>
+        </p:style>
+      </p:cxnSp>
+      <p:sp>
+        <p:nvSpPr>
+          <p:cNvPr id="101" name="Snip Single Corner Rectangle 100"/>
+          <p:cNvSpPr/>
+          <p:nvPr/>
+        </p:nvSpPr>
+        <p:spPr>
+          <a:xfrm>
+            <a:off x="1720076" y="1606028"/>
+            <a:ext cx="1175817" cy="505547"/>
+          </a:xfrm>
+          <a:prstGeom prst="snip1Rect">
+            <a:avLst>
+              <a:gd name="adj" fmla="val 15368"/>
+            </a:avLst>
+          </a:prstGeom>
+        </p:spPr>
+        <p:style>
+          <a:lnRef idx="2">
+            <a:schemeClr val="dk1"/>
+          </a:lnRef>
+          <a:fillRef idx="1">
+            <a:schemeClr val="lt1"/>
+          </a:fillRef>
+          <a:effectRef idx="0">
+            <a:schemeClr val="dk1"/>
+          </a:effectRef>
+          <a:fontRef idx="minor">
+            <a:schemeClr val="dk1"/>
+          </a:fontRef>
+        </p:style>
+        <p:txBody>
+          <a:bodyPr lIns="45720" tIns="0" rIns="0" bIns="0" rtlCol="0" anchor="ctr"/>
+          <a:lstStyle/>
+          <a:p>
+            <a:pPr algn="ctr"/>
+            <a:r>
+              <a:rPr lang="en-US" sz="1200" dirty="0" smtClean="0"/>
+              <a:t>$CCS/</a:t>
+            </a:r>
+            <a:r>
+              <a:rPr lang="en-US" sz="1200" dirty="0" err="1" smtClean="0"/>
+              <a:t>floorPlans</a:t>
+            </a:r>
+            <a:r>
+              <a:rPr lang="en-US" sz="1200" dirty="0" smtClean="0"/>
+              <a:t>/</a:t>
+            </a:r>
+          </a:p>
+          <a:p>
+            <a:pPr algn="ctr"/>
+            <a:r>
+              <a:rPr lang="en-US" sz="1200" dirty="0"/>
+              <a:t>cory5th.input</a:t>
+            </a:r>
+          </a:p>
+        </p:txBody>
+      </p:sp>
+      <p:cxnSp>
+        <p:nvCxnSpPr>
+          <p:cNvPr id="107" name="Straight Arrow Connector 106"/>
+          <p:cNvCxnSpPr>
+            <a:stCxn id="101" idx="1"/>
+          </p:cNvCxnSpPr>
+          <p:nvPr/>
+        </p:nvCxnSpPr>
+        <p:spPr>
+          <a:xfrm>
+            <a:off x="2307985" y="2111575"/>
+            <a:ext cx="0" cy="242301"/>
+          </a:xfrm>
+          <a:prstGeom prst="straightConnector1">
+            <a:avLst/>
+          </a:prstGeom>
+          <a:ln w="57150">
+            <a:tailEnd type="triangle"/>
+          </a:ln>
+        </p:spPr>
+        <p:style>
+          <a:lnRef idx="1">
+            <a:schemeClr val="accent1"/>
+          </a:lnRef>
+          <a:fillRef idx="0">
+            <a:schemeClr val="accent1"/>
+          </a:fillRef>
+          <a:effectRef idx="0">
+            <a:schemeClr val="accent1"/>
+          </a:effectRef>
+          <a:fontRef idx="minor">
+            <a:schemeClr val="tx1"/>
+          </a:fontRef>
+        </p:style>
+      </p:cxnSp>
+      <p:cxnSp>
+        <p:nvCxnSpPr>
+          <p:cNvPr id="114" name="Straight Arrow Connector 113"/>
+          <p:cNvCxnSpPr>
+            <a:stCxn id="65" idx="1"/>
+            <a:endCxn id="86" idx="0"/>
+          </p:cNvCxnSpPr>
+          <p:nvPr/>
+        </p:nvCxnSpPr>
+        <p:spPr>
+          <a:xfrm>
+            <a:off x="2301685" y="680257"/>
+            <a:ext cx="0" cy="233412"/>
+          </a:xfrm>
+          <a:prstGeom prst="straightConnector1">
+            <a:avLst/>
+          </a:prstGeom>
+          <a:ln w="57150">
+            <a:tailEnd type="triangle"/>
+          </a:ln>
+        </p:spPr>
+        <p:style>
+          <a:lnRef idx="1">
+            <a:schemeClr val="accent1"/>
+          </a:lnRef>
+          <a:fillRef idx="0">
+            <a:schemeClr val="accent1"/>
+          </a:fillRef>
+          <a:effectRef idx="0">
+            <a:schemeClr val="accent1"/>
+          </a:effectRef>
+          <a:fontRef idx="minor">
+            <a:schemeClr val="tx1"/>
+          </a:fontRef>
+        </p:style>
+      </p:cxnSp>
+      <p:cxnSp>
+        <p:nvCxnSpPr>
+          <p:cNvPr id="133" name="Straight Arrow Connector 132"/>
+          <p:cNvCxnSpPr/>
+          <p:nvPr/>
+        </p:nvCxnSpPr>
+        <p:spPr>
+          <a:xfrm>
+            <a:off x="1059506" y="2111575"/>
+            <a:ext cx="0" cy="242301"/>
+          </a:xfrm>
+          <a:prstGeom prst="straightConnector1">
+            <a:avLst/>
+          </a:prstGeom>
+          <a:ln w="57150">
+            <a:tailEnd type="triangle"/>
+          </a:ln>
+        </p:spPr>
+        <p:style>
+          <a:lnRef idx="1">
+            <a:schemeClr val="accent1"/>
+          </a:lnRef>
+          <a:fillRef idx="0">
+            <a:schemeClr val="accent1"/>
+          </a:fillRef>
+          <a:effectRef idx="0">
+            <a:schemeClr val="accent1"/>
+          </a:effectRef>
+          <a:fontRef idx="minor">
+            <a:schemeClr val="tx1"/>
+          </a:fontRef>
+        </p:style>
+      </p:cxnSp>
+      <p:sp>
+        <p:nvSpPr>
+          <p:cNvPr id="111" name="TextBox 110"/>
+          <p:cNvSpPr txBox="1"/>
+          <p:nvPr/>
+        </p:nvSpPr>
+        <p:spPr>
+          <a:xfrm>
+            <a:off x="1503390" y="1758920"/>
+            <a:ext cx="197173" cy="184666"/>
+          </a:xfrm>
+          <a:prstGeom prst="rect">
+            <a:avLst/>
+          </a:prstGeom>
+          <a:noFill/>
+        </p:spPr>
+        <p:txBody>
+          <a:bodyPr wrap="square" lIns="0" tIns="0" rIns="0" bIns="0" rtlCol="0">
+            <a:spAutoFit/>
+          </a:bodyPr>
+          <a:lstStyle/>
+          <a:p>
+            <a:r>
+              <a:rPr lang="en-US" sz="1200" b="1" dirty="0" smtClean="0"/>
+              <a:t>OR</a:t>
+            </a:r>
+            <a:endParaRPr lang="en-US" sz="1200" b="1" dirty="0"/>
+          </a:p>
+        </p:txBody>
+      </p:sp>
     </p:spTree>
     <p:extLst>
       <p:ext uri="{BB962C8B-B14F-4D97-AF65-F5344CB8AC3E}">
@@ -6232,4 +6996,265 @@
     </a:ext>
   </a:extLst>
 </a:theme>
+</file>
+
+<file path=ppt/theme/theme2.xml><?xml version="1.0" encoding="utf-8"?>
+<a:theme xmlns:a="http://schemas.openxmlformats.org/drawingml/2006/main" name="Office Theme">
+  <a:themeElements>
+    <a:clrScheme name="Office">
+      <a:dk1>
+        <a:sysClr val="windowText" lastClr="000000"/>
+      </a:dk1>
+      <a:lt1>
+        <a:sysClr val="window" lastClr="FFFFFF"/>
+      </a:lt1>
+      <a:dk2>
+        <a:srgbClr val="44546A"/>
+      </a:dk2>
+      <a:lt2>
+        <a:srgbClr val="E7E6E6"/>
+      </a:lt2>
+      <a:accent1>
+        <a:srgbClr val="4472C4"/>
+      </a:accent1>
+      <a:accent2>
+        <a:srgbClr val="ED7D31"/>
+      </a:accent2>
+      <a:accent3>
+        <a:srgbClr val="A5A5A5"/>
+      </a:accent3>
+      <a:accent4>
+        <a:srgbClr val="FFC000"/>
+      </a:accent4>
+      <a:accent5>
+        <a:srgbClr val="5B9BD5"/>
+      </a:accent5>
+      <a:accent6>
+        <a:srgbClr val="70AD47"/>
+      </a:accent6>
+      <a:hlink>
+        <a:srgbClr val="0563C1"/>
+      </a:hlink>
+      <a:folHlink>
+        <a:srgbClr val="954F72"/>
+      </a:folHlink>
+    </a:clrScheme>
+    <a:fontScheme name="Office">
+      <a:majorFont>
+        <a:latin typeface="Calibri Light" panose="020F0302020204030204"/>
+        <a:ea typeface=""/>
+        <a:cs typeface=""/>
+        <a:font script="Jpan" typeface="Yu Gothic Light"/>
+        <a:font script="Hang" typeface="맑은 고딕"/>
+        <a:font script="Hans" typeface="DengXian Light"/>
+        <a:font script="Hant" typeface="新細明體"/>
+        <a:font script="Arab" typeface="Times New Roman"/>
+        <a:font script="Hebr" typeface="Times New Roman"/>
+        <a:font script="Thai" typeface="Angsana New"/>
+        <a:font script="Ethi" typeface="Nyala"/>
+        <a:font script="Beng" typeface="Vrinda"/>
+        <a:font script="Gujr" typeface="Shruti"/>
+        <a:font script="Khmr" typeface="MoolBoran"/>
+        <a:font script="Knda" typeface="Tunga"/>
+        <a:font script="Guru" typeface="Raavi"/>
+        <a:font script="Cans" typeface="Euphemia"/>
+        <a:font script="Cher" typeface="Plantagenet Cherokee"/>
+        <a:font script="Yiii" typeface="Microsoft Yi Baiti"/>
+        <a:font script="Tibt" typeface="Microsoft Himalaya"/>
+        <a:font script="Thaa" typeface="MV Boli"/>
+        <a:font script="Deva" typeface="Mangal"/>
+        <a:font script="Telu" typeface="Gautami"/>
+        <a:font script="Taml" typeface="Latha"/>
+        <a:font script="Syrc" typeface="Estrangelo Edessa"/>
+        <a:font script="Orya" typeface="Kalinga"/>
+        <a:font script="Mlym" typeface="Kartika"/>
+        <a:font script="Laoo" typeface="DokChampa"/>
+        <a:font script="Sinh" typeface="Iskoola Pota"/>
+        <a:font script="Mong" typeface="Mongolian Baiti"/>
+        <a:font script="Viet" typeface="Times New Roman"/>
+        <a:font script="Uigh" typeface="Microsoft Uighur"/>
+        <a:font script="Geor" typeface="Sylfaen"/>
+      </a:majorFont>
+      <a:minorFont>
+        <a:latin typeface="Calibri" panose="020F0502020204030204"/>
+        <a:ea typeface=""/>
+        <a:cs typeface=""/>
+        <a:font script="Jpan" typeface="Yu Gothic"/>
+        <a:font script="Hang" typeface="맑은 고딕"/>
+        <a:font script="Hans" typeface="DengXian"/>
+        <a:font script="Hant" typeface="新細明體"/>
+        <a:font script="Arab" typeface="Arial"/>
+        <a:font script="Hebr" typeface="Arial"/>
+        <a:font script="Thai" typeface="Cordia New"/>
+        <a:font script="Ethi" typeface="Nyala"/>
+        <a:font script="Beng" typeface="Vrinda"/>
+        <a:font script="Gujr" typeface="Shruti"/>
+        <a:font script="Khmr" typeface="DaunPenh"/>
+        <a:font script="Knda" typeface="Tunga"/>
+        <a:font script="Guru" typeface="Raavi"/>
+        <a:font script="Cans" typeface="Euphemia"/>
+        <a:font script="Cher" typeface="Plantagenet Cherokee"/>
+        <a:font script="Yiii" typeface="Microsoft Yi Baiti"/>
+        <a:font script="Tibt" typeface="Microsoft Himalaya"/>
+        <a:font script="Thaa" typeface="MV Boli"/>
+        <a:font script="Deva" typeface="Mangal"/>
+        <a:font script="Telu" typeface="Gautami"/>
+        <a:font script="Taml" typeface="Latha"/>
+        <a:font script="Syrc" typeface="Estrangelo Edessa"/>
+        <a:font script="Orya" typeface="Kalinga"/>
+        <a:font script="Mlym" typeface="Kartika"/>
+        <a:font script="Laoo" typeface="DokChampa"/>
+        <a:font script="Sinh" typeface="Iskoola Pota"/>
+        <a:font script="Mong" typeface="Mongolian Baiti"/>
+        <a:font script="Viet" typeface="Arial"/>
+        <a:font script="Uigh" typeface="Microsoft Uighur"/>
+        <a:font script="Geor" typeface="Sylfaen"/>
+      </a:minorFont>
+    </a:fontScheme>
+    <a:fmtScheme name="Office">
+      <a:fillStyleLst>
+        <a:solidFill>
+          <a:schemeClr val="phClr"/>
+        </a:solidFill>
+        <a:gradFill rotWithShape="1">
+          <a:gsLst>
+            <a:gs pos="0">
+              <a:schemeClr val="phClr">
+                <a:lumMod val="110000"/>
+                <a:satMod val="105000"/>
+                <a:tint val="67000"/>
+              </a:schemeClr>
+            </a:gs>
+            <a:gs pos="50000">
+              <a:schemeClr val="phClr">
+                <a:lumMod val="105000"/>
+                <a:satMod val="103000"/>
+                <a:tint val="73000"/>
+              </a:schemeClr>
+            </a:gs>
+            <a:gs pos="100000">
+              <a:schemeClr val="phClr">
+                <a:lumMod val="105000"/>
+                <a:satMod val="109000"/>
+                <a:tint val="81000"/>
+              </a:schemeClr>
+            </a:gs>
+          </a:gsLst>
+          <a:lin ang="5400000" scaled="0"/>
+        </a:gradFill>
+        <a:gradFill rotWithShape="1">
+          <a:gsLst>
+            <a:gs pos="0">
+              <a:schemeClr val="phClr">
+                <a:satMod val="103000"/>
+                <a:lumMod val="102000"/>
+                <a:tint val="94000"/>
+              </a:schemeClr>
+            </a:gs>
+            <a:gs pos="50000">
+              <a:schemeClr val="phClr">
+                <a:satMod val="110000"/>
+                <a:lumMod val="100000"/>
+                <a:shade val="100000"/>
+              </a:schemeClr>
+            </a:gs>
+            <a:gs pos="100000">
+              <a:schemeClr val="phClr">
+                <a:lumMod val="99000"/>
+                <a:satMod val="120000"/>
+                <a:shade val="78000"/>
+              </a:schemeClr>
+            </a:gs>
+          </a:gsLst>
+          <a:lin ang="5400000" scaled="0"/>
+        </a:gradFill>
+      </a:fillStyleLst>
+      <a:lnStyleLst>
+        <a:ln w="6350" cap="flat" cmpd="sng" algn="ctr">
+          <a:solidFill>
+            <a:schemeClr val="phClr"/>
+          </a:solidFill>
+          <a:prstDash val="solid"/>
+          <a:miter lim="800000"/>
+        </a:ln>
+        <a:ln w="12700" cap="flat" cmpd="sng" algn="ctr">
+          <a:solidFill>
+            <a:schemeClr val="phClr"/>
+          </a:solidFill>
+          <a:prstDash val="solid"/>
+          <a:miter lim="800000"/>
+        </a:ln>
+        <a:ln w="19050" cap="flat" cmpd="sng" algn="ctr">
+          <a:solidFill>
+            <a:schemeClr val="phClr"/>
+          </a:solidFill>
+          <a:prstDash val="solid"/>
+          <a:miter lim="800000"/>
+        </a:ln>
+      </a:lnStyleLst>
+      <a:effectStyleLst>
+        <a:effectStyle>
+          <a:effectLst/>
+        </a:effectStyle>
+        <a:effectStyle>
+          <a:effectLst/>
+        </a:effectStyle>
+        <a:effectStyle>
+          <a:effectLst>
+            <a:outerShdw blurRad="57150" dist="19050" dir="5400000" algn="ctr" rotWithShape="0">
+              <a:srgbClr val="000000">
+                <a:alpha val="63000"/>
+              </a:srgbClr>
+            </a:outerShdw>
+          </a:effectLst>
+        </a:effectStyle>
+      </a:effectStyleLst>
+      <a:bgFillStyleLst>
+        <a:solidFill>
+          <a:schemeClr val="phClr"/>
+        </a:solidFill>
+        <a:solidFill>
+          <a:schemeClr val="phClr">
+            <a:tint val="95000"/>
+            <a:satMod val="170000"/>
+          </a:schemeClr>
+        </a:solidFill>
+        <a:gradFill rotWithShape="1">
+          <a:gsLst>
+            <a:gs pos="0">
+              <a:schemeClr val="phClr">
+                <a:tint val="93000"/>
+                <a:satMod val="150000"/>
+                <a:shade val="98000"/>
+                <a:lumMod val="102000"/>
+              </a:schemeClr>
+            </a:gs>
+            <a:gs pos="50000">
+              <a:schemeClr val="phClr">
+                <a:tint val="98000"/>
+                <a:satMod val="130000"/>
+                <a:shade val="90000"/>
+                <a:lumMod val="103000"/>
+              </a:schemeClr>
+            </a:gs>
+            <a:gs pos="100000">
+              <a:schemeClr val="phClr">
+                <a:shade val="63000"/>
+                <a:satMod val="120000"/>
+              </a:schemeClr>
+            </a:gs>
+          </a:gsLst>
+          <a:lin ang="5400000" scaled="0"/>
+        </a:gradFill>
+      </a:bgFillStyleLst>
+    </a:fmtScheme>
+  </a:themeElements>
+  <a:objectDefaults/>
+  <a:extraClrSchemeLst/>
+  <a:extLst>
+    <a:ext uri="{05A4C25C-085E-4340-85A3-A5531E510DB2}">
+      <thm15:themeFamily xmlns:thm15="http://schemas.microsoft.com/office/thememl/2012/main" name="Office Theme" id="{62F939B6-93AF-4DB8-9C6B-D6C7DFDC589F}" vid="{4A3C46E8-61CC-4603-A589-7422A47A8E4A}"/>
+    </a:ext>
+  </a:extLst>
+</a:theme>
 </file>
</xml_diff>

<commit_message>
added Auth capacity config for experiments
</commit_message>
<xml_diff>
--- a/experiments/ccs2017/figures/exp_flow.pptx
+++ b/experiments/ccs2017/figures/exp_flow.pptx
@@ -197,7 +197,7 @@
           <a:p>
             <a:fld id="{6258ECF3-EDD8-D04A-90B6-1BE14B16AF69}" type="datetimeFigureOut">
               <a:rPr lang="en-US" smtClean="0"/>
-              <a:t>7/26/17</a:t>
+              <a:t>2/25/18</a:t>
             </a:fld>
             <a:endParaRPr lang="en-US"/>
           </a:p>
@@ -261,38 +261,37 @@
           <a:p>
             <a:pPr lvl="0"/>
             <a:r>
-              <a:rPr lang="en-US" smtClean="0"/>
+              <a:rPr lang="en-US"/>
               <a:t>Click to edit Master text styles</a:t>
             </a:r>
           </a:p>
           <a:p>
             <a:pPr lvl="1"/>
             <a:r>
-              <a:rPr lang="en-US" smtClean="0"/>
+              <a:rPr lang="en-US"/>
               <a:t>Second level</a:t>
             </a:r>
           </a:p>
           <a:p>
             <a:pPr lvl="2"/>
             <a:r>
-              <a:rPr lang="en-US" smtClean="0"/>
+              <a:rPr lang="en-US"/>
               <a:t>Third level</a:t>
             </a:r>
           </a:p>
           <a:p>
             <a:pPr lvl="3"/>
             <a:r>
-              <a:rPr lang="en-US" smtClean="0"/>
+              <a:rPr lang="en-US"/>
               <a:t>Fourth level</a:t>
             </a:r>
           </a:p>
           <a:p>
             <a:pPr lvl="4"/>
             <a:r>
-              <a:rPr lang="en-US" smtClean="0"/>
+              <a:rPr lang="en-US"/>
               <a:t>Fifth level</a:t>
             </a:r>
-            <a:endParaRPr lang="en-US"/>
           </a:p>
         </p:txBody>
       </p:sp>
@@ -591,10 +590,9 @@
           </a:lstStyle>
           <a:p>
             <a:r>
-              <a:rPr lang="en-US" smtClean="0"/>
+              <a:rPr lang="en-US"/>
               <a:t>Click to edit Master title style</a:t>
             </a:r>
-            <a:endParaRPr lang="en-US"/>
           </a:p>
         </p:txBody>
       </p:sp>
@@ -656,10 +654,9 @@
           </a:lstStyle>
           <a:p>
             <a:r>
-              <a:rPr lang="en-US" smtClean="0"/>
+              <a:rPr lang="en-US"/>
               <a:t>Click to edit Master subtitle style</a:t>
             </a:r>
-            <a:endParaRPr lang="en-US"/>
           </a:p>
         </p:txBody>
       </p:sp>
@@ -680,7 +677,7 @@
           <a:p>
             <a:fld id="{53D6C1FA-00A9-4142-A80A-0CB384F9F4AC}" type="datetimeFigureOut">
               <a:rPr lang="en-US" smtClean="0"/>
-              <a:t>7/26/17</a:t>
+              <a:t>2/25/18</a:t>
             </a:fld>
             <a:endParaRPr lang="en-US"/>
           </a:p>
@@ -774,10 +771,9 @@
           <a:lstStyle/>
           <a:p>
             <a:r>
-              <a:rPr lang="en-US" smtClean="0"/>
+              <a:rPr lang="en-US"/>
               <a:t>Click to edit Master title style</a:t>
             </a:r>
-            <a:endParaRPr lang="en-US"/>
           </a:p>
         </p:txBody>
       </p:sp>
@@ -798,38 +794,37 @@
           <a:p>
             <a:pPr lvl="0"/>
             <a:r>
-              <a:rPr lang="en-US" smtClean="0"/>
+              <a:rPr lang="en-US"/>
               <a:t>Click to edit Master text styles</a:t>
             </a:r>
           </a:p>
           <a:p>
             <a:pPr lvl="1"/>
             <a:r>
-              <a:rPr lang="en-US" smtClean="0"/>
+              <a:rPr lang="en-US"/>
               <a:t>Second level</a:t>
             </a:r>
           </a:p>
           <a:p>
             <a:pPr lvl="2"/>
             <a:r>
-              <a:rPr lang="en-US" smtClean="0"/>
+              <a:rPr lang="en-US"/>
               <a:t>Third level</a:t>
             </a:r>
           </a:p>
           <a:p>
             <a:pPr lvl="3"/>
             <a:r>
-              <a:rPr lang="en-US" smtClean="0"/>
+              <a:rPr lang="en-US"/>
               <a:t>Fourth level</a:t>
             </a:r>
           </a:p>
           <a:p>
             <a:pPr lvl="4"/>
             <a:r>
-              <a:rPr lang="en-US" smtClean="0"/>
+              <a:rPr lang="en-US"/>
               <a:t>Fifth level</a:t>
             </a:r>
-            <a:endParaRPr lang="en-US"/>
           </a:p>
         </p:txBody>
       </p:sp>
@@ -850,7 +845,7 @@
           <a:p>
             <a:fld id="{53D6C1FA-00A9-4142-A80A-0CB384F9F4AC}" type="datetimeFigureOut">
               <a:rPr lang="en-US" smtClean="0"/>
-              <a:t>7/26/17</a:t>
+              <a:t>2/25/18</a:t>
             </a:fld>
             <a:endParaRPr lang="en-US"/>
           </a:p>
@@ -949,10 +944,9 @@
           <a:lstStyle/>
           <a:p>
             <a:r>
-              <a:rPr lang="en-US" smtClean="0"/>
+              <a:rPr lang="en-US"/>
               <a:t>Click to edit Master title style</a:t>
             </a:r>
-            <a:endParaRPr lang="en-US"/>
           </a:p>
         </p:txBody>
       </p:sp>
@@ -978,38 +972,37 @@
           <a:p>
             <a:pPr lvl="0"/>
             <a:r>
-              <a:rPr lang="en-US" smtClean="0"/>
+              <a:rPr lang="en-US"/>
               <a:t>Click to edit Master text styles</a:t>
             </a:r>
           </a:p>
           <a:p>
             <a:pPr lvl="1"/>
             <a:r>
-              <a:rPr lang="en-US" smtClean="0"/>
+              <a:rPr lang="en-US"/>
               <a:t>Second level</a:t>
             </a:r>
           </a:p>
           <a:p>
             <a:pPr lvl="2"/>
             <a:r>
-              <a:rPr lang="en-US" smtClean="0"/>
+              <a:rPr lang="en-US"/>
               <a:t>Third level</a:t>
             </a:r>
           </a:p>
           <a:p>
             <a:pPr lvl="3"/>
             <a:r>
-              <a:rPr lang="en-US" smtClean="0"/>
+              <a:rPr lang="en-US"/>
               <a:t>Fourth level</a:t>
             </a:r>
           </a:p>
           <a:p>
             <a:pPr lvl="4"/>
             <a:r>
-              <a:rPr lang="en-US" smtClean="0"/>
+              <a:rPr lang="en-US"/>
               <a:t>Fifth level</a:t>
             </a:r>
-            <a:endParaRPr lang="en-US"/>
           </a:p>
         </p:txBody>
       </p:sp>
@@ -1030,7 +1023,7 @@
           <a:p>
             <a:fld id="{53D6C1FA-00A9-4142-A80A-0CB384F9F4AC}" type="datetimeFigureOut">
               <a:rPr lang="en-US" smtClean="0"/>
-              <a:t>7/26/17</a:t>
+              <a:t>2/25/18</a:t>
             </a:fld>
             <a:endParaRPr lang="en-US"/>
           </a:p>
@@ -1124,10 +1117,9 @@
           <a:lstStyle/>
           <a:p>
             <a:r>
-              <a:rPr lang="en-US" smtClean="0"/>
+              <a:rPr lang="en-US"/>
               <a:t>Click to edit Master title style</a:t>
             </a:r>
-            <a:endParaRPr lang="en-US"/>
           </a:p>
         </p:txBody>
       </p:sp>
@@ -1148,38 +1140,37 @@
           <a:p>
             <a:pPr lvl="0"/>
             <a:r>
-              <a:rPr lang="en-US" smtClean="0"/>
+              <a:rPr lang="en-US"/>
               <a:t>Click to edit Master text styles</a:t>
             </a:r>
           </a:p>
           <a:p>
             <a:pPr lvl="1"/>
             <a:r>
-              <a:rPr lang="en-US" smtClean="0"/>
+              <a:rPr lang="en-US"/>
               <a:t>Second level</a:t>
             </a:r>
           </a:p>
           <a:p>
             <a:pPr lvl="2"/>
             <a:r>
-              <a:rPr lang="en-US" smtClean="0"/>
+              <a:rPr lang="en-US"/>
               <a:t>Third level</a:t>
             </a:r>
           </a:p>
           <a:p>
             <a:pPr lvl="3"/>
             <a:r>
-              <a:rPr lang="en-US" smtClean="0"/>
+              <a:rPr lang="en-US"/>
               <a:t>Fourth level</a:t>
             </a:r>
           </a:p>
           <a:p>
             <a:pPr lvl="4"/>
             <a:r>
-              <a:rPr lang="en-US" smtClean="0"/>
+              <a:rPr lang="en-US"/>
               <a:t>Fifth level</a:t>
             </a:r>
-            <a:endParaRPr lang="en-US"/>
           </a:p>
         </p:txBody>
       </p:sp>
@@ -1200,7 +1191,7 @@
           <a:p>
             <a:fld id="{53D6C1FA-00A9-4142-A80A-0CB384F9F4AC}" type="datetimeFigureOut">
               <a:rPr lang="en-US" smtClean="0"/>
-              <a:t>7/26/17</a:t>
+              <a:t>2/25/18</a:t>
             </a:fld>
             <a:endParaRPr lang="en-US"/>
           </a:p>
@@ -1303,10 +1294,9 @@
           </a:lstStyle>
           <a:p>
             <a:r>
-              <a:rPr lang="en-US" smtClean="0"/>
+              <a:rPr lang="en-US"/>
               <a:t>Click to edit Master title style</a:t>
             </a:r>
-            <a:endParaRPr lang="en-US"/>
           </a:p>
         </p:txBody>
       </p:sp>
@@ -1423,7 +1413,7 @@
           <a:p>
             <a:pPr lvl="0"/>
             <a:r>
-              <a:rPr lang="en-US" smtClean="0"/>
+              <a:rPr lang="en-US"/>
               <a:t>Click to edit Master text styles</a:t>
             </a:r>
           </a:p>
@@ -1446,7 +1436,7 @@
           <a:p>
             <a:fld id="{53D6C1FA-00A9-4142-A80A-0CB384F9F4AC}" type="datetimeFigureOut">
               <a:rPr lang="en-US" smtClean="0"/>
-              <a:t>7/26/17</a:t>
+              <a:t>2/25/18</a:t>
             </a:fld>
             <a:endParaRPr lang="en-US"/>
           </a:p>
@@ -1540,10 +1530,9 @@
           <a:lstStyle/>
           <a:p>
             <a:r>
-              <a:rPr lang="en-US" smtClean="0"/>
+              <a:rPr lang="en-US"/>
               <a:t>Click to edit Master title style</a:t>
             </a:r>
-            <a:endParaRPr lang="en-US"/>
           </a:p>
         </p:txBody>
       </p:sp>
@@ -1569,38 +1558,37 @@
           <a:p>
             <a:pPr lvl="0"/>
             <a:r>
-              <a:rPr lang="en-US" smtClean="0"/>
+              <a:rPr lang="en-US"/>
               <a:t>Click to edit Master text styles</a:t>
             </a:r>
           </a:p>
           <a:p>
             <a:pPr lvl="1"/>
             <a:r>
-              <a:rPr lang="en-US" smtClean="0"/>
+              <a:rPr lang="en-US"/>
               <a:t>Second level</a:t>
             </a:r>
           </a:p>
           <a:p>
             <a:pPr lvl="2"/>
             <a:r>
-              <a:rPr lang="en-US" smtClean="0"/>
+              <a:rPr lang="en-US"/>
               <a:t>Third level</a:t>
             </a:r>
           </a:p>
           <a:p>
             <a:pPr lvl="3"/>
             <a:r>
-              <a:rPr lang="en-US" smtClean="0"/>
+              <a:rPr lang="en-US"/>
               <a:t>Fourth level</a:t>
             </a:r>
           </a:p>
           <a:p>
             <a:pPr lvl="4"/>
             <a:r>
-              <a:rPr lang="en-US" smtClean="0"/>
+              <a:rPr lang="en-US"/>
               <a:t>Fifth level</a:t>
             </a:r>
-            <a:endParaRPr lang="en-US"/>
           </a:p>
         </p:txBody>
       </p:sp>
@@ -1626,38 +1614,37 @@
           <a:p>
             <a:pPr lvl="0"/>
             <a:r>
-              <a:rPr lang="en-US" smtClean="0"/>
+              <a:rPr lang="en-US"/>
               <a:t>Click to edit Master text styles</a:t>
             </a:r>
           </a:p>
           <a:p>
             <a:pPr lvl="1"/>
             <a:r>
-              <a:rPr lang="en-US" smtClean="0"/>
+              <a:rPr lang="en-US"/>
               <a:t>Second level</a:t>
             </a:r>
           </a:p>
           <a:p>
             <a:pPr lvl="2"/>
             <a:r>
-              <a:rPr lang="en-US" smtClean="0"/>
+              <a:rPr lang="en-US"/>
               <a:t>Third level</a:t>
             </a:r>
           </a:p>
           <a:p>
             <a:pPr lvl="3"/>
             <a:r>
-              <a:rPr lang="en-US" smtClean="0"/>
+              <a:rPr lang="en-US"/>
               <a:t>Fourth level</a:t>
             </a:r>
           </a:p>
           <a:p>
             <a:pPr lvl="4"/>
             <a:r>
-              <a:rPr lang="en-US" smtClean="0"/>
+              <a:rPr lang="en-US"/>
               <a:t>Fifth level</a:t>
             </a:r>
-            <a:endParaRPr lang="en-US"/>
           </a:p>
         </p:txBody>
       </p:sp>
@@ -1678,7 +1665,7 @@
           <a:p>
             <a:fld id="{53D6C1FA-00A9-4142-A80A-0CB384F9F4AC}" type="datetimeFigureOut">
               <a:rPr lang="en-US" smtClean="0"/>
-              <a:t>7/26/17</a:t>
+              <a:t>2/25/18</a:t>
             </a:fld>
             <a:endParaRPr lang="en-US"/>
           </a:p>
@@ -1777,10 +1764,9 @@
           <a:lstStyle/>
           <a:p>
             <a:r>
-              <a:rPr lang="en-US" smtClean="0"/>
+              <a:rPr lang="en-US"/>
               <a:t>Click to edit Master title style</a:t>
             </a:r>
-            <a:endParaRPr lang="en-US"/>
           </a:p>
         </p:txBody>
       </p:sp>
@@ -1843,7 +1829,7 @@
           <a:p>
             <a:pPr lvl="0"/>
             <a:r>
-              <a:rPr lang="en-US" smtClean="0"/>
+              <a:rPr lang="en-US"/>
               <a:t>Click to edit Master text styles</a:t>
             </a:r>
           </a:p>
@@ -1871,38 +1857,37 @@
           <a:p>
             <a:pPr lvl="0"/>
             <a:r>
-              <a:rPr lang="en-US" smtClean="0"/>
+              <a:rPr lang="en-US"/>
               <a:t>Click to edit Master text styles</a:t>
             </a:r>
           </a:p>
           <a:p>
             <a:pPr lvl="1"/>
             <a:r>
-              <a:rPr lang="en-US" smtClean="0"/>
+              <a:rPr lang="en-US"/>
               <a:t>Second level</a:t>
             </a:r>
           </a:p>
           <a:p>
             <a:pPr lvl="2"/>
             <a:r>
-              <a:rPr lang="en-US" smtClean="0"/>
+              <a:rPr lang="en-US"/>
               <a:t>Third level</a:t>
             </a:r>
           </a:p>
           <a:p>
             <a:pPr lvl="3"/>
             <a:r>
-              <a:rPr lang="en-US" smtClean="0"/>
+              <a:rPr lang="en-US"/>
               <a:t>Fourth level</a:t>
             </a:r>
           </a:p>
           <a:p>
             <a:pPr lvl="4"/>
             <a:r>
-              <a:rPr lang="en-US" smtClean="0"/>
+              <a:rPr lang="en-US"/>
               <a:t>Fifth level</a:t>
             </a:r>
-            <a:endParaRPr lang="en-US"/>
           </a:p>
         </p:txBody>
       </p:sp>
@@ -1965,7 +1950,7 @@
           <a:p>
             <a:pPr lvl="0"/>
             <a:r>
-              <a:rPr lang="en-US" smtClean="0"/>
+              <a:rPr lang="en-US"/>
               <a:t>Click to edit Master text styles</a:t>
             </a:r>
           </a:p>
@@ -1993,38 +1978,37 @@
           <a:p>
             <a:pPr lvl="0"/>
             <a:r>
-              <a:rPr lang="en-US" smtClean="0"/>
+              <a:rPr lang="en-US"/>
               <a:t>Click to edit Master text styles</a:t>
             </a:r>
           </a:p>
           <a:p>
             <a:pPr lvl="1"/>
             <a:r>
-              <a:rPr lang="en-US" smtClean="0"/>
+              <a:rPr lang="en-US"/>
               <a:t>Second level</a:t>
             </a:r>
           </a:p>
           <a:p>
             <a:pPr lvl="2"/>
             <a:r>
-              <a:rPr lang="en-US" smtClean="0"/>
+              <a:rPr lang="en-US"/>
               <a:t>Third level</a:t>
             </a:r>
           </a:p>
           <a:p>
             <a:pPr lvl="3"/>
             <a:r>
-              <a:rPr lang="en-US" smtClean="0"/>
+              <a:rPr lang="en-US"/>
               <a:t>Fourth level</a:t>
             </a:r>
           </a:p>
           <a:p>
             <a:pPr lvl="4"/>
             <a:r>
-              <a:rPr lang="en-US" smtClean="0"/>
+              <a:rPr lang="en-US"/>
               <a:t>Fifth level</a:t>
             </a:r>
-            <a:endParaRPr lang="en-US"/>
           </a:p>
         </p:txBody>
       </p:sp>
@@ -2045,7 +2029,7 @@
           <a:p>
             <a:fld id="{53D6C1FA-00A9-4142-A80A-0CB384F9F4AC}" type="datetimeFigureOut">
               <a:rPr lang="en-US" smtClean="0"/>
-              <a:t>7/26/17</a:t>
+              <a:t>2/25/18</a:t>
             </a:fld>
             <a:endParaRPr lang="en-US"/>
           </a:p>
@@ -2139,10 +2123,9 @@
           <a:lstStyle/>
           <a:p>
             <a:r>
-              <a:rPr lang="en-US" smtClean="0"/>
+              <a:rPr lang="en-US"/>
               <a:t>Click to edit Master title style</a:t>
             </a:r>
-            <a:endParaRPr lang="en-US"/>
           </a:p>
         </p:txBody>
       </p:sp>
@@ -2163,7 +2146,7 @@
           <a:p>
             <a:fld id="{53D6C1FA-00A9-4142-A80A-0CB384F9F4AC}" type="datetimeFigureOut">
               <a:rPr lang="en-US" smtClean="0"/>
-              <a:t>7/26/17</a:t>
+              <a:t>2/25/18</a:t>
             </a:fld>
             <a:endParaRPr lang="en-US"/>
           </a:p>
@@ -2258,7 +2241,7 @@
           <a:p>
             <a:fld id="{53D6C1FA-00A9-4142-A80A-0CB384F9F4AC}" type="datetimeFigureOut">
               <a:rPr lang="en-US" smtClean="0"/>
-              <a:t>7/26/17</a:t>
+              <a:t>2/25/18</a:t>
             </a:fld>
             <a:endParaRPr lang="en-US"/>
           </a:p>
@@ -2361,10 +2344,9 @@
           </a:lstStyle>
           <a:p>
             <a:r>
-              <a:rPr lang="en-US" smtClean="0"/>
+              <a:rPr lang="en-US"/>
               <a:t>Click to edit Master title style</a:t>
             </a:r>
-            <a:endParaRPr lang="en-US"/>
           </a:p>
         </p:txBody>
       </p:sp>
@@ -2418,38 +2400,37 @@
           <a:p>
             <a:pPr lvl="0"/>
             <a:r>
-              <a:rPr lang="en-US" smtClean="0"/>
+              <a:rPr lang="en-US"/>
               <a:t>Click to edit Master text styles</a:t>
             </a:r>
           </a:p>
           <a:p>
             <a:pPr lvl="1"/>
             <a:r>
-              <a:rPr lang="en-US" smtClean="0"/>
+              <a:rPr lang="en-US"/>
               <a:t>Second level</a:t>
             </a:r>
           </a:p>
           <a:p>
             <a:pPr lvl="2"/>
             <a:r>
-              <a:rPr lang="en-US" smtClean="0"/>
+              <a:rPr lang="en-US"/>
               <a:t>Third level</a:t>
             </a:r>
           </a:p>
           <a:p>
             <a:pPr lvl="3"/>
             <a:r>
-              <a:rPr lang="en-US" smtClean="0"/>
+              <a:rPr lang="en-US"/>
               <a:t>Fourth level</a:t>
             </a:r>
           </a:p>
           <a:p>
             <a:pPr lvl="4"/>
             <a:r>
-              <a:rPr lang="en-US" smtClean="0"/>
+              <a:rPr lang="en-US"/>
               <a:t>Fifth level</a:t>
             </a:r>
-            <a:endParaRPr lang="en-US"/>
           </a:p>
         </p:txBody>
       </p:sp>
@@ -2512,7 +2493,7 @@
           <a:p>
             <a:pPr lvl="0"/>
             <a:r>
-              <a:rPr lang="en-US" smtClean="0"/>
+              <a:rPr lang="en-US"/>
               <a:t>Click to edit Master text styles</a:t>
             </a:r>
           </a:p>
@@ -2535,7 +2516,7 @@
           <a:p>
             <a:fld id="{53D6C1FA-00A9-4142-A80A-0CB384F9F4AC}" type="datetimeFigureOut">
               <a:rPr lang="en-US" smtClean="0"/>
-              <a:t>7/26/17</a:t>
+              <a:t>2/25/18</a:t>
             </a:fld>
             <a:endParaRPr lang="en-US"/>
           </a:p>
@@ -2638,10 +2619,9 @@
           </a:lstStyle>
           <a:p>
             <a:r>
-              <a:rPr lang="en-US" smtClean="0"/>
+              <a:rPr lang="en-US"/>
               <a:t>Click to edit Master title style</a:t>
             </a:r>
-            <a:endParaRPr lang="en-US"/>
           </a:p>
         </p:txBody>
       </p:sp>
@@ -2765,7 +2745,7 @@
           <a:p>
             <a:pPr lvl="0"/>
             <a:r>
-              <a:rPr lang="en-US" smtClean="0"/>
+              <a:rPr lang="en-US"/>
               <a:t>Click to edit Master text styles</a:t>
             </a:r>
           </a:p>
@@ -2788,7 +2768,7 @@
           <a:p>
             <a:fld id="{53D6C1FA-00A9-4142-A80A-0CB384F9F4AC}" type="datetimeFigureOut">
               <a:rPr lang="en-US" smtClean="0"/>
-              <a:t>7/26/17</a:t>
+              <a:t>2/25/18</a:t>
             </a:fld>
             <a:endParaRPr lang="en-US"/>
           </a:p>
@@ -2897,10 +2877,9 @@
           <a:lstStyle/>
           <a:p>
             <a:r>
-              <a:rPr lang="en-US" smtClean="0"/>
+              <a:rPr lang="en-US"/>
               <a:t>Click to edit Master title style</a:t>
             </a:r>
-            <a:endParaRPr lang="en-US"/>
           </a:p>
         </p:txBody>
       </p:sp>
@@ -2931,38 +2910,37 @@
           <a:p>
             <a:pPr lvl="0"/>
             <a:r>
-              <a:rPr lang="en-US" smtClean="0"/>
+              <a:rPr lang="en-US"/>
               <a:t>Click to edit Master text styles</a:t>
             </a:r>
           </a:p>
           <a:p>
             <a:pPr lvl="1"/>
             <a:r>
-              <a:rPr lang="en-US" smtClean="0"/>
+              <a:rPr lang="en-US"/>
               <a:t>Second level</a:t>
             </a:r>
           </a:p>
           <a:p>
             <a:pPr lvl="2"/>
             <a:r>
-              <a:rPr lang="en-US" smtClean="0"/>
+              <a:rPr lang="en-US"/>
               <a:t>Third level</a:t>
             </a:r>
           </a:p>
           <a:p>
             <a:pPr lvl="3"/>
             <a:r>
-              <a:rPr lang="en-US" smtClean="0"/>
+              <a:rPr lang="en-US"/>
               <a:t>Fourth level</a:t>
             </a:r>
           </a:p>
           <a:p>
             <a:pPr lvl="4"/>
             <a:r>
-              <a:rPr lang="en-US" smtClean="0"/>
+              <a:rPr lang="en-US"/>
               <a:t>Fifth level</a:t>
             </a:r>
-            <a:endParaRPr lang="en-US"/>
           </a:p>
         </p:txBody>
       </p:sp>
@@ -3001,7 +2979,7 @@
           <a:p>
             <a:fld id="{53D6C1FA-00A9-4142-A80A-0CB384F9F4AC}" type="datetimeFigureOut">
               <a:rPr lang="en-US" smtClean="0"/>
-              <a:t>7/26/17</a:t>
+              <a:t>2/25/18</a:t>
             </a:fld>
             <a:endParaRPr lang="en-US"/>
           </a:p>
@@ -3414,8 +3392,8 @@
         </p:nvSpPr>
         <p:spPr>
           <a:xfrm>
-            <a:off x="556584" y="1605144"/>
-            <a:ext cx="913007" cy="505547"/>
+            <a:off x="621948" y="1605144"/>
+            <a:ext cx="937967" cy="505547"/>
           </a:xfrm>
           <a:prstGeom prst="snip1Rect">
             <a:avLst>
@@ -3443,7 +3421,7 @@
           <a:p>
             <a:pPr algn="ctr"/>
             <a:r>
-              <a:rPr lang="en-US" sz="1200" dirty="0" smtClean="0"/>
+              <a:rPr lang="en-US" sz="1200" dirty="0"/>
               <a:t>$CONF/</a:t>
             </a:r>
           </a:p>
@@ -3464,7 +3442,7 @@
         </p:nvSpPr>
         <p:spPr>
           <a:xfrm>
-            <a:off x="771525" y="2353876"/>
+            <a:off x="802005" y="2353876"/>
             <a:ext cx="1975903" cy="758321"/>
           </a:xfrm>
           <a:prstGeom prst="rect">
@@ -3493,7 +3471,7 @@
           <a:p>
             <a:pPr algn="ctr"/>
             <a:r>
-              <a:rPr lang="en-US" sz="1200" b="1" dirty="0" smtClean="0">
+              <a:rPr lang="en-US" sz="1200" b="1" dirty="0">
                 <a:solidFill>
                   <a:schemeClr val="tx1"/>
                 </a:solidFill>
@@ -3504,14 +3482,14 @@
           <a:p>
             <a:pPr algn="ctr"/>
             <a:r>
-              <a:rPr lang="en-US" sz="1200" b="1" dirty="0" err="1" smtClean="0">
+              <a:rPr lang="en-US" sz="1200" b="1" dirty="0" err="1">
                 <a:solidFill>
                   <a:schemeClr val="tx1"/>
                 </a:solidFill>
               </a:rPr>
               <a:t>generateAll.sh</a:t>
             </a:r>
-            <a:endParaRPr lang="en-US" sz="1200" b="1" dirty="0" smtClean="0">
+            <a:endParaRPr lang="en-US" sz="1200" b="1" dirty="0">
               <a:solidFill>
                 <a:schemeClr val="tx1"/>
               </a:solidFill>
@@ -3542,7 +3520,7 @@
               <a:buChar char="•"/>
             </a:pPr>
             <a:r>
-              <a:rPr lang="en-US" sz="1200" dirty="0" err="1" smtClean="0">
+              <a:rPr lang="en-US" sz="1200" dirty="0" err="1">
                 <a:solidFill>
                   <a:schemeClr val="tx1"/>
                 </a:solidFill>
@@ -3565,7 +3543,7 @@
         </p:nvSpPr>
         <p:spPr>
           <a:xfrm>
-            <a:off x="3112580" y="2790188"/>
+            <a:off x="3196400" y="2790188"/>
             <a:ext cx="954975" cy="505547"/>
           </a:xfrm>
           <a:prstGeom prst="snip1Rect">
@@ -3594,14 +3572,14 @@
           <a:p>
             <a:pPr algn="ctr"/>
             <a:r>
-              <a:rPr lang="en-US" sz="1200" dirty="0" smtClean="0"/>
+              <a:rPr lang="en-US" sz="1200" dirty="0"/>
               <a:t>$CONF/</a:t>
             </a:r>
           </a:p>
           <a:p>
             <a:pPr algn="ctr"/>
             <a:r>
-              <a:rPr lang="en-US" sz="1200" dirty="0" err="1" smtClean="0"/>
+              <a:rPr lang="en-US" sz="1200" dirty="0" err="1"/>
               <a:t>devList.txt</a:t>
             </a:r>
             <a:endParaRPr lang="en-US" sz="1200" dirty="0"/>
@@ -3616,8 +3594,8 @@
         </p:nvSpPr>
         <p:spPr>
           <a:xfrm>
-            <a:off x="4470707" y="1446519"/>
-            <a:ext cx="1749517" cy="998080"/>
+            <a:off x="4470707" y="1390117"/>
+            <a:ext cx="1749517" cy="1106938"/>
           </a:xfrm>
           <a:prstGeom prst="rect">
             <a:avLst/>
@@ -3645,7 +3623,7 @@
           <a:p>
             <a:pPr algn="ctr"/>
             <a:r>
-              <a:rPr lang="en-US" sz="1200" b="1" dirty="0" smtClean="0">
+              <a:rPr lang="en-US" sz="1200" b="1" dirty="0">
                 <a:solidFill>
                   <a:schemeClr val="tx1"/>
                 </a:solidFill>
@@ -3656,14 +3634,14 @@
           <a:p>
             <a:pPr algn="ctr"/>
             <a:r>
-              <a:rPr lang="en-US" sz="1200" b="1" dirty="0" err="1" smtClean="0">
+              <a:rPr lang="en-US" sz="1200" b="1" dirty="0" err="1">
                 <a:solidFill>
                   <a:schemeClr val="tx1"/>
                 </a:solidFill>
               </a:rPr>
               <a:t>generateAll.sh</a:t>
             </a:r>
-            <a:endParaRPr lang="en-US" sz="1200" b="1" dirty="0" smtClean="0">
+            <a:endParaRPr lang="en-US" sz="1200" b="1" dirty="0">
               <a:solidFill>
                 <a:schemeClr val="tx1"/>
               </a:solidFill>
@@ -3675,14 +3653,14 @@
               <a:buChar char="•"/>
             </a:pPr>
             <a:r>
-              <a:rPr lang="en-US" sz="1200" dirty="0" err="1" smtClean="0">
+              <a:rPr lang="en-US" sz="1200" dirty="0" err="1">
                 <a:solidFill>
                   <a:schemeClr val="tx1"/>
                 </a:solidFill>
               </a:rPr>
               <a:t>credentialGenerator.js</a:t>
             </a:r>
-            <a:endParaRPr lang="en-US" sz="1200" dirty="0" smtClean="0">
+            <a:endParaRPr lang="en-US" sz="1200" dirty="0">
               <a:solidFill>
                 <a:schemeClr val="tx1"/>
               </a:solidFill>
@@ -3694,14 +3672,14 @@
               <a:buChar char="•"/>
             </a:pPr>
             <a:r>
-              <a:rPr lang="en-US" sz="1200" dirty="0" err="1" smtClean="0">
+              <a:rPr lang="en-US" sz="1200" dirty="0" err="1">
                 <a:solidFill>
                   <a:schemeClr val="tx1"/>
                 </a:solidFill>
               </a:rPr>
               <a:t>entityConfigGenerator.js</a:t>
             </a:r>
-            <a:endParaRPr lang="en-US" sz="1200" dirty="0" smtClean="0">
+            <a:endParaRPr lang="en-US" sz="1200" dirty="0">
               <a:solidFill>
                 <a:schemeClr val="tx1"/>
               </a:solidFill>
@@ -3713,7 +3691,26 @@
               <a:buChar char="•"/>
             </a:pPr>
             <a:r>
-              <a:rPr lang="en-US" sz="1200" dirty="0" err="1" smtClean="0">
+              <a:rPr lang="en-US" sz="1200" dirty="0" err="1">
+                <a:solidFill>
+                  <a:schemeClr val="tx1"/>
+                </a:solidFill>
+              </a:rPr>
+              <a:t>authConfigGenerator.js</a:t>
+            </a:r>
+            <a:endParaRPr lang="en-US" sz="1200" dirty="0">
+              <a:solidFill>
+                <a:schemeClr val="tx1"/>
+              </a:solidFill>
+            </a:endParaRPr>
+          </a:p>
+          <a:p>
+            <a:pPr marL="171450" indent="-171450">
+              <a:buFont typeface="Arial" charset="0"/>
+              <a:buChar char="•"/>
+            </a:pPr>
+            <a:r>
+              <a:rPr lang="en-US" sz="1200" dirty="0" err="1">
                 <a:solidFill>
                   <a:schemeClr val="tx1"/>
                 </a:solidFill>
@@ -3736,7 +3733,7 @@
         </p:nvSpPr>
         <p:spPr>
           <a:xfrm>
-            <a:off x="3108353" y="1690813"/>
+            <a:off x="3192173" y="1690813"/>
             <a:ext cx="1001428" cy="774474"/>
           </a:xfrm>
           <a:prstGeom prst="snip1Rect">
@@ -3765,24 +3762,23 @@
           <a:p>
             <a:pPr algn="ctr"/>
             <a:r>
-              <a:rPr lang="en-US" sz="1200" dirty="0" smtClean="0"/>
+              <a:rPr lang="en-US" sz="1200" dirty="0"/>
               <a:t>$CONF/</a:t>
             </a:r>
           </a:p>
           <a:p>
             <a:pPr algn="ctr"/>
             <a:r>
-              <a:rPr lang="en-US" sz="1200" dirty="0" smtClean="0"/>
+              <a:rPr lang="en-US" sz="1200" dirty="0"/>
               <a:t>ns3Exp.graph</a:t>
             </a:r>
           </a:p>
           <a:p>
             <a:pPr algn="ctr"/>
             <a:r>
-              <a:rPr lang="en-US" sz="1200" dirty="0" smtClean="0"/>
+              <a:rPr lang="en-US" sz="1200" dirty="0"/>
               <a:t>cory5th.graph</a:t>
             </a:r>
-            <a:endParaRPr lang="en-US" sz="1200" dirty="0"/>
           </a:p>
         </p:txBody>
       </p:sp>
@@ -3794,7 +3790,7 @@
         </p:nvSpPr>
         <p:spPr>
           <a:xfrm>
-            <a:off x="3112579" y="3492114"/>
+            <a:off x="3196399" y="3492114"/>
             <a:ext cx="954975" cy="505547"/>
           </a:xfrm>
           <a:prstGeom prst="snip1Rect">
@@ -3823,14 +3819,14 @@
           <a:p>
             <a:pPr algn="ctr"/>
             <a:r>
-              <a:rPr lang="en-US" sz="1200" dirty="0" smtClean="0"/>
+              <a:rPr lang="en-US" sz="1200" dirty="0"/>
               <a:t>$CONF/</a:t>
             </a:r>
           </a:p>
           <a:p>
             <a:pPr algn="ctr"/>
             <a:r>
-              <a:rPr lang="en-US" sz="1200" dirty="0" err="1" smtClean="0"/>
+              <a:rPr lang="en-US" sz="1200" dirty="0" err="1"/>
               <a:t>commCost.txt</a:t>
             </a:r>
             <a:endParaRPr lang="en-US" sz="1200" dirty="0"/>
@@ -3874,7 +3870,7 @@
           <a:p>
             <a:pPr algn="ctr"/>
             <a:r>
-              <a:rPr lang="en-US" sz="1200" b="1" dirty="0" smtClean="0">
+              <a:rPr lang="en-US" sz="1200" b="1" dirty="0">
                 <a:solidFill>
                   <a:schemeClr val="tx1"/>
                 </a:solidFill>
@@ -3885,14 +3881,14 @@
           <a:p>
             <a:pPr algn="ctr"/>
             <a:r>
-              <a:rPr lang="en-US" sz="1200" b="1" dirty="0" err="1" smtClean="0">
+              <a:rPr lang="en-US" sz="1200" b="1" dirty="0" err="1">
                 <a:solidFill>
                   <a:schemeClr val="tx1"/>
                 </a:solidFill>
               </a:rPr>
               <a:t>generateAll.sh</a:t>
             </a:r>
-            <a:endParaRPr lang="en-US" sz="1200" b="1" dirty="0" smtClean="0">
+            <a:endParaRPr lang="en-US" sz="1200" b="1" dirty="0">
               <a:solidFill>
                 <a:schemeClr val="tx1"/>
               </a:solidFill>
@@ -3904,7 +3900,7 @@
               <a:buChar char="•"/>
             </a:pPr>
             <a:r>
-              <a:rPr lang="en-US" sz="1200" dirty="0" err="1" smtClean="0">
+              <a:rPr lang="en-US" sz="1200" dirty="0" err="1">
                 <a:solidFill>
                   <a:schemeClr val="tx1"/>
                 </a:solidFill>
@@ -3930,8 +3926,8 @@
         </p:nvCxnSpPr>
         <p:spPr>
           <a:xfrm flipV="1">
-            <a:off x="2747428" y="2078050"/>
-            <a:ext cx="360925" cy="654987"/>
+            <a:off x="2777908" y="2078050"/>
+            <a:ext cx="414265" cy="654987"/>
           </a:xfrm>
           <a:prstGeom prst="straightConnector1">
             <a:avLst/>
@@ -3966,8 +3962,8 @@
         </p:nvCxnSpPr>
         <p:spPr>
           <a:xfrm>
-            <a:off x="2747428" y="2733037"/>
-            <a:ext cx="365152" cy="309925"/>
+            <a:off x="2777908" y="2733037"/>
+            <a:ext cx="418492" cy="309925"/>
           </a:xfrm>
           <a:prstGeom prst="straightConnector1">
             <a:avLst/>
@@ -4002,8 +3998,8 @@
         </p:nvCxnSpPr>
         <p:spPr>
           <a:xfrm>
-            <a:off x="2747428" y="2733037"/>
-            <a:ext cx="365151" cy="1011851"/>
+            <a:off x="2777908" y="2733037"/>
+            <a:ext cx="418491" cy="1011851"/>
           </a:xfrm>
           <a:prstGeom prst="straightConnector1">
             <a:avLst/>
@@ -4038,8 +4034,8 @@
         </p:nvCxnSpPr>
         <p:spPr>
           <a:xfrm flipV="1">
-            <a:off x="4067554" y="3422122"/>
-            <a:ext cx="403154" cy="322766"/>
+            <a:off x="4151374" y="3422122"/>
+            <a:ext cx="319334" cy="322766"/>
           </a:xfrm>
           <a:prstGeom prst="straightConnector1">
             <a:avLst/>
@@ -4074,8 +4070,8 @@
         </p:nvCxnSpPr>
         <p:spPr>
           <a:xfrm>
-            <a:off x="4067555" y="3042962"/>
-            <a:ext cx="403153" cy="379160"/>
+            <a:off x="4151375" y="3042962"/>
+            <a:ext cx="319333" cy="379160"/>
           </a:xfrm>
           <a:prstGeom prst="straightConnector1">
             <a:avLst/>
@@ -4103,6 +4099,7 @@
         <p:nvCxnSpPr>
           <p:cNvPr id="35" name="Straight Arrow Connector 34"/>
           <p:cNvCxnSpPr>
+            <a:cxnSpLocks/>
             <a:stCxn id="8" idx="0"/>
             <a:endCxn id="7" idx="1"/>
           </p:cNvCxnSpPr>
@@ -4110,8 +4107,8 @@
         </p:nvCxnSpPr>
         <p:spPr>
           <a:xfrm flipV="1">
-            <a:off x="4109781" y="1945559"/>
-            <a:ext cx="360926" cy="132491"/>
+            <a:off x="4193601" y="1943586"/>
+            <a:ext cx="277106" cy="134464"/>
           </a:xfrm>
           <a:prstGeom prst="straightConnector1">
             <a:avLst/>
@@ -4172,14 +4169,14 @@
           <a:p>
             <a:pPr algn="ctr"/>
             <a:r>
-              <a:rPr lang="en-US" sz="1200" dirty="0" smtClean="0"/>
+              <a:rPr lang="en-US" sz="1200" dirty="0"/>
               <a:t>$LXC/</a:t>
             </a:r>
           </a:p>
           <a:p>
             <a:pPr algn="ctr"/>
             <a:r>
-              <a:rPr lang="en-US" sz="1200" dirty="0" err="1" smtClean="0"/>
+              <a:rPr lang="en-US" sz="1200" dirty="0" err="1"/>
               <a:t>tapConfigs.txt</a:t>
             </a:r>
             <a:endParaRPr lang="en-US" sz="1200" dirty="0"/>
@@ -4259,15 +4256,15 @@
           <a:p>
             <a:pPr algn="ctr"/>
             <a:r>
-              <a:rPr lang="en-US" sz="1200" dirty="0" smtClean="0"/>
+              <a:rPr lang="en-US" sz="1200" dirty="0"/>
               <a:t>$IOT/</a:t>
             </a:r>
             <a:r>
-              <a:rPr lang="en-US" sz="1200" dirty="0" err="1" smtClean="0"/>
+              <a:rPr lang="en-US" sz="1200" dirty="0" err="1"/>
               <a:t>auth</a:t>
             </a:r>
             <a:r>
-              <a:rPr lang="en-US" sz="1200" dirty="0" smtClean="0"/>
+              <a:rPr lang="en-US" sz="1200" dirty="0"/>
               <a:t>/databases/</a:t>
             </a:r>
           </a:p>
@@ -4310,7 +4307,7 @@
           <a:p>
             <a:pPr algn="ctr"/>
             <a:r>
-              <a:rPr lang="en-US" sz="1200" dirty="0" smtClean="0"/>
+              <a:rPr lang="en-US" sz="1200" dirty="0"/>
               <a:t>$IOT/entity/credentials/</a:t>
             </a:r>
           </a:p>
@@ -4353,15 +4350,15 @@
           <a:p>
             <a:pPr algn="ctr"/>
             <a:r>
-              <a:rPr lang="en-US" sz="1200" dirty="0" smtClean="0"/>
+              <a:rPr lang="en-US" sz="1200" dirty="0"/>
               <a:t>$ENTITY/</a:t>
             </a:r>
             <a:r>
-              <a:rPr lang="en-US" sz="1200" dirty="0" err="1" smtClean="0"/>
+              <a:rPr lang="en-US" sz="1200" dirty="0" err="1"/>
               <a:t>configs</a:t>
             </a:r>
             <a:r>
-              <a:rPr lang="en-US" sz="1200" dirty="0" smtClean="0"/>
+              <a:rPr lang="en-US" sz="1200" dirty="0"/>
               <a:t>/</a:t>
             </a:r>
           </a:p>
@@ -4404,15 +4401,15 @@
           <a:p>
             <a:pPr algn="ctr"/>
             <a:r>
-              <a:rPr lang="en-US" sz="1200" dirty="0" smtClean="0"/>
+              <a:rPr lang="en-US" sz="1200" dirty="0"/>
               <a:t>$IOT/</a:t>
             </a:r>
             <a:r>
-              <a:rPr lang="en-US" sz="1200" dirty="0" err="1" smtClean="0"/>
+              <a:rPr lang="en-US" sz="1200" dirty="0" err="1"/>
               <a:t>auth</a:t>
             </a:r>
             <a:r>
-              <a:rPr lang="en-US" sz="1200" dirty="0" smtClean="0"/>
+              <a:rPr lang="en-US" sz="1200" dirty="0"/>
               <a:t>/properties/</a:t>
             </a:r>
           </a:p>
@@ -4491,25 +4488,25 @@
           <a:p>
             <a:pPr algn="ctr"/>
             <a:r>
-              <a:rPr lang="en-US" sz="1200" dirty="0" smtClean="0"/>
+              <a:rPr lang="en-US" sz="1200" dirty="0"/>
               <a:t>$LXC/</a:t>
             </a:r>
           </a:p>
           <a:p>
             <a:pPr algn="ctr"/>
             <a:r>
-              <a:rPr lang="en-US" sz="1200" dirty="0" err="1" smtClean="0"/>
+              <a:rPr lang="en-US" sz="1200" dirty="0" err="1"/>
               <a:t>lxc</a:t>
             </a:r>
             <a:r>
-              <a:rPr lang="en-US" sz="1200" dirty="0" smtClean="0"/>
+              <a:rPr lang="en-US" sz="1200" dirty="0"/>
               <a:t>-*.</a:t>
             </a:r>
             <a:r>
-              <a:rPr lang="en-US" sz="1200" dirty="0" err="1" smtClean="0"/>
+              <a:rPr lang="en-US" sz="1200" dirty="0" err="1"/>
               <a:t>conf</a:t>
             </a:r>
-            <a:endParaRPr lang="en-US" sz="1200" dirty="0" smtClean="0"/>
+            <a:endParaRPr lang="en-US" sz="1200" dirty="0"/>
           </a:p>
         </p:txBody>
       </p:sp>
@@ -4553,7 +4550,7 @@
           <a:p>
             <a:pPr algn="ctr"/>
             <a:r>
-              <a:rPr lang="en-US" sz="1200" b="1" dirty="0" smtClean="0">
+              <a:rPr lang="en-US" sz="1200" b="1" dirty="0">
                 <a:solidFill>
                   <a:schemeClr val="tx1"/>
                 </a:solidFill>
@@ -4567,7 +4564,7 @@
               <a:buChar char="•"/>
             </a:pPr>
             <a:r>
-              <a:rPr lang="en-US" sz="1200" dirty="0" smtClean="0">
+              <a:rPr lang="en-US" sz="1200" dirty="0">
                 <a:solidFill>
                   <a:schemeClr val="tx1"/>
                 </a:solidFill>
@@ -4575,7 +4572,7 @@
               <a:t>./</a:t>
             </a:r>
             <a:r>
-              <a:rPr lang="en-US" sz="1200" dirty="0" err="1" smtClean="0">
+              <a:rPr lang="en-US" sz="1200" dirty="0" err="1">
                 <a:solidFill>
                   <a:schemeClr val="tx1"/>
                 </a:solidFill>
@@ -4583,7 +4580,7 @@
               <a:t>waf</a:t>
             </a:r>
             <a:r>
-              <a:rPr lang="en-US" sz="1200" dirty="0" smtClean="0">
+              <a:rPr lang="en-US" sz="1200" dirty="0">
                 <a:solidFill>
                   <a:schemeClr val="tx1"/>
                 </a:solidFill>
@@ -4597,7 +4594,7 @@
               <a:buChar char="•"/>
             </a:pPr>
             <a:r>
-              <a:rPr lang="en-US" sz="1200" dirty="0" smtClean="0">
+              <a:rPr lang="en-US" sz="1200" dirty="0">
                 <a:solidFill>
                   <a:schemeClr val="tx1"/>
                 </a:solidFill>
@@ -4605,7 +4602,7 @@
               <a:t>./</a:t>
             </a:r>
             <a:r>
-              <a:rPr lang="en-US" sz="1200" dirty="0" err="1" smtClean="0">
+              <a:rPr lang="en-US" sz="1200" dirty="0" err="1">
                 <a:solidFill>
                   <a:schemeClr val="tx1"/>
                 </a:solidFill>
@@ -4613,7 +4610,7 @@
               <a:t>waf</a:t>
             </a:r>
             <a:r>
-              <a:rPr lang="en-US" sz="1200" dirty="0" smtClean="0">
+              <a:rPr lang="en-US" sz="1200" dirty="0">
                 <a:solidFill>
                   <a:schemeClr val="tx1"/>
                 </a:solidFill>
@@ -4621,7 +4618,7 @@
               <a:t> --run tap-matrix-</a:t>
             </a:r>
             <a:r>
-              <a:rPr lang="en-US" sz="1200" dirty="0" err="1" smtClean="0">
+              <a:rPr lang="en-US" sz="1200" dirty="0" err="1">
                 <a:solidFill>
                   <a:schemeClr val="tx1"/>
                 </a:solidFill>
@@ -4629,7 +4626,7 @@
               <a:t>sst</a:t>
             </a:r>
             <a:r>
-              <a:rPr lang="en-US" sz="1200" dirty="0" smtClean="0">
+              <a:rPr lang="en-US" sz="1200" dirty="0">
                 <a:solidFill>
                   <a:schemeClr val="tx1"/>
                 </a:solidFill>
@@ -4637,7 +4634,7 @@
               <a:t> --command-template="%s $LXC/</a:t>
             </a:r>
             <a:r>
-              <a:rPr lang="en-US" sz="1200" dirty="0" err="1" smtClean="0">
+              <a:rPr lang="en-US" sz="1200" dirty="0" err="1">
                 <a:solidFill>
                   <a:schemeClr val="tx1"/>
                 </a:solidFill>
@@ -4645,7 +4642,7 @@
               <a:t>tapConfigs.txt</a:t>
             </a:r>
             <a:r>
-              <a:rPr lang="en-US" sz="1200" dirty="0" smtClean="0">
+              <a:rPr lang="en-US" sz="1200" dirty="0">
                 <a:solidFill>
                   <a:schemeClr val="tx1"/>
                 </a:solidFill>
@@ -4659,7 +4656,7 @@
               <a:buChar char="•"/>
             </a:pPr>
             <a:r>
-              <a:rPr lang="en-US" sz="1200" dirty="0" smtClean="0">
+              <a:rPr lang="en-US" sz="1200" dirty="0">
                 <a:solidFill>
                   <a:schemeClr val="tx1"/>
                 </a:solidFill>
@@ -4667,7 +4664,7 @@
               <a:t>./</a:t>
             </a:r>
             <a:r>
-              <a:rPr lang="en-US" sz="1200" dirty="0" err="1" smtClean="0">
+              <a:rPr lang="en-US" sz="1200" dirty="0" err="1">
                 <a:solidFill>
                   <a:schemeClr val="tx1"/>
                 </a:solidFill>
@@ -4675,7 +4672,7 @@
               <a:t>waf</a:t>
             </a:r>
             <a:r>
-              <a:rPr lang="en-US" sz="1200" dirty="0" smtClean="0">
+              <a:rPr lang="en-US" sz="1200" dirty="0">
                 <a:solidFill>
                   <a:schemeClr val="tx1"/>
                 </a:solidFill>
@@ -4683,7 +4680,7 @@
               <a:t> --run tap-mixed-</a:t>
             </a:r>
             <a:r>
-              <a:rPr lang="en-US" sz="1200" dirty="0" err="1" smtClean="0">
+              <a:rPr lang="en-US" sz="1200" dirty="0" err="1">
                 <a:solidFill>
                   <a:schemeClr val="tx1"/>
                 </a:solidFill>
@@ -4691,7 +4688,7 @@
               <a:t>sst</a:t>
             </a:r>
             <a:r>
-              <a:rPr lang="en-US" sz="1200" dirty="0" smtClean="0">
+              <a:rPr lang="en-US" sz="1200" dirty="0">
                 <a:solidFill>
                   <a:schemeClr val="tx1"/>
                 </a:solidFill>
@@ -4699,7 +4696,7 @@
               <a:t> --command-template="%s $LXC/</a:t>
             </a:r>
             <a:r>
-              <a:rPr lang="en-US" sz="1200" dirty="0" err="1" smtClean="0">
+              <a:rPr lang="en-US" sz="1200" dirty="0" err="1">
                 <a:solidFill>
                   <a:schemeClr val="tx1"/>
                 </a:solidFill>
@@ -4707,18 +4704,13 @@
               <a:t>tapConfigs.txt</a:t>
             </a:r>
             <a:r>
-              <a:rPr lang="en-US" sz="1200" dirty="0" smtClean="0">
+              <a:rPr lang="en-US" sz="1200" dirty="0">
                 <a:solidFill>
                   <a:schemeClr val="tx1"/>
                 </a:solidFill>
               </a:rPr>
               <a:t>"</a:t>
             </a:r>
-            <a:endParaRPr lang="en-US" sz="1200" dirty="0">
-              <a:solidFill>
-                <a:schemeClr val="tx1"/>
-              </a:solidFill>
-            </a:endParaRPr>
           </a:p>
         </p:txBody>
       </p:sp>
@@ -4762,6 +4754,7 @@
         <p:nvCxnSpPr>
           <p:cNvPr id="123" name="Straight Arrow Connector 122"/>
           <p:cNvCxnSpPr>
+            <a:cxnSpLocks/>
             <a:stCxn id="7" idx="3"/>
             <a:endCxn id="82" idx="2"/>
           </p:cNvCxnSpPr>
@@ -4770,7 +4763,7 @@
         <p:spPr>
           <a:xfrm flipV="1">
             <a:off x="6220224" y="1048448"/>
-            <a:ext cx="360926" cy="897111"/>
+            <a:ext cx="360926" cy="895138"/>
           </a:xfrm>
           <a:prstGeom prst="straightConnector1">
             <a:avLst/>
@@ -4798,6 +4791,7 @@
         <p:nvCxnSpPr>
           <p:cNvPr id="126" name="Straight Arrow Connector 125"/>
           <p:cNvCxnSpPr>
+            <a:cxnSpLocks/>
             <a:stCxn id="7" idx="3"/>
             <a:endCxn id="85" idx="2"/>
           </p:cNvCxnSpPr>
@@ -4806,7 +4800,7 @@
         <p:spPr>
           <a:xfrm flipV="1">
             <a:off x="6220224" y="1445326"/>
-            <a:ext cx="360926" cy="500233"/>
+            <a:ext cx="360926" cy="498260"/>
           </a:xfrm>
           <a:prstGeom prst="straightConnector1">
             <a:avLst/>
@@ -4834,6 +4828,7 @@
         <p:nvCxnSpPr>
           <p:cNvPr id="129" name="Straight Arrow Connector 128"/>
           <p:cNvCxnSpPr>
+            <a:cxnSpLocks/>
             <a:stCxn id="7" idx="3"/>
             <a:endCxn id="83" idx="2"/>
           </p:cNvCxnSpPr>
@@ -4842,7 +4837,7 @@
         <p:spPr>
           <a:xfrm flipV="1">
             <a:off x="6220224" y="1858802"/>
-            <a:ext cx="360926" cy="86757"/>
+            <a:ext cx="360926" cy="84784"/>
           </a:xfrm>
           <a:prstGeom prst="straightConnector1">
             <a:avLst/>
@@ -4870,6 +4865,7 @@
         <p:nvCxnSpPr>
           <p:cNvPr id="132" name="Straight Arrow Connector 131"/>
           <p:cNvCxnSpPr>
+            <a:cxnSpLocks/>
             <a:stCxn id="7" idx="3"/>
             <a:endCxn id="84" idx="2"/>
           </p:cNvCxnSpPr>
@@ -4877,8 +4873,8 @@
         </p:nvCxnSpPr>
         <p:spPr>
           <a:xfrm>
-            <a:off x="6220224" y="1945559"/>
-            <a:ext cx="360926" cy="338336"/>
+            <a:off x="6220224" y="1943586"/>
+            <a:ext cx="360926" cy="340309"/>
           </a:xfrm>
           <a:prstGeom prst="straightConnector1">
             <a:avLst/>
@@ -4945,7 +4941,7 @@
           <a:p>
             <a:pPr algn="ctr"/>
             <a:r>
-              <a:rPr lang="en-US" sz="1200" b="1" dirty="0" smtClean="0">
+              <a:rPr lang="en-US" sz="1200" b="1" dirty="0">
                 <a:solidFill>
                   <a:schemeClr val="tx1"/>
                 </a:solidFill>
@@ -4956,7 +4952,7 @@
           <a:p>
             <a:pPr algn="ctr"/>
             <a:r>
-              <a:rPr lang="en-US" sz="1200" b="1" dirty="0" smtClean="0">
+              <a:rPr lang="en-US" sz="1200" b="1" dirty="0">
                 <a:solidFill>
                   <a:schemeClr val="tx1"/>
                 </a:solidFill>
@@ -4964,14 +4960,14 @@
               <a:t>start-</a:t>
             </a:r>
             <a:r>
-              <a:rPr lang="en-US" sz="1200" b="1" dirty="0" err="1" smtClean="0">
+              <a:rPr lang="en-US" sz="1200" b="1" dirty="0" err="1">
                 <a:solidFill>
                   <a:schemeClr val="tx1"/>
                 </a:solidFill>
               </a:rPr>
               <a:t>exp.sh</a:t>
             </a:r>
-            <a:endParaRPr lang="en-US" sz="1200" b="1" dirty="0" smtClean="0">
+            <a:endParaRPr lang="en-US" sz="1200" b="1" dirty="0">
               <a:solidFill>
                 <a:schemeClr val="tx1"/>
               </a:solidFill>
@@ -4980,7 +4976,7 @@
           <a:p>
             <a:pPr algn="ctr"/>
             <a:r>
-              <a:rPr lang="en-US" sz="1200" b="1" dirty="0" smtClean="0">
+              <a:rPr lang="en-US" sz="1200" b="1" dirty="0">
                 <a:solidFill>
                   <a:schemeClr val="tx1"/>
                 </a:solidFill>
@@ -4988,14 +4984,14 @@
               <a:t>stop-</a:t>
             </a:r>
             <a:r>
-              <a:rPr lang="en-US" sz="1200" b="1" dirty="0" err="1" smtClean="0">
+              <a:rPr lang="en-US" sz="1200" b="1" dirty="0" err="1">
                 <a:solidFill>
                   <a:schemeClr val="tx1"/>
                 </a:solidFill>
               </a:rPr>
               <a:t>all.sh</a:t>
             </a:r>
-            <a:endParaRPr lang="en-US" sz="1200" b="1" dirty="0" smtClean="0">
+            <a:endParaRPr lang="en-US" sz="1200" b="1" dirty="0">
               <a:solidFill>
                 <a:schemeClr val="tx1"/>
               </a:solidFill>
@@ -5004,14 +5000,14 @@
           <a:p>
             <a:pPr algn="ctr"/>
             <a:r>
-              <a:rPr lang="en-US" sz="1200" b="1" dirty="0" err="1" smtClean="0">
+              <a:rPr lang="en-US" sz="1200" b="1" dirty="0" err="1">
                 <a:solidFill>
                   <a:schemeClr val="tx1"/>
                 </a:solidFill>
               </a:rPr>
               <a:t>cleanAll.sh</a:t>
             </a:r>
-            <a:endParaRPr lang="en-US" sz="1200" b="1" dirty="0" smtClean="0">
+            <a:endParaRPr lang="en-US" sz="1200" b="1" dirty="0">
               <a:solidFill>
                 <a:schemeClr val="tx1"/>
               </a:solidFill>
@@ -5023,7 +5019,7 @@
               <a:buChar char="•"/>
             </a:pPr>
             <a:r>
-              <a:rPr lang="en-US" sz="1200" dirty="0" smtClean="0">
+              <a:rPr lang="en-US" sz="1200" dirty="0">
                 <a:solidFill>
                   <a:schemeClr val="tx1"/>
                 </a:solidFill>
@@ -5031,7 +5027,7 @@
               <a:t>$EXEC/</a:t>
             </a:r>
             <a:r>
-              <a:rPr lang="en-US" sz="1200" dirty="0" err="1" smtClean="0">
+              <a:rPr lang="en-US" sz="1200" dirty="0" err="1">
                 <a:solidFill>
                   <a:schemeClr val="tx1"/>
                 </a:solidFill>
@@ -5039,7 +5035,7 @@
               <a:t>auth_execution</a:t>
             </a:r>
             <a:r>
-              <a:rPr lang="en-US" sz="1200" dirty="0" smtClean="0">
+              <a:rPr lang="en-US" sz="1200" dirty="0">
                 <a:solidFill>
                   <a:schemeClr val="tx1"/>
                 </a:solidFill>
@@ -5053,7 +5049,7 @@
               <a:buChar char="•"/>
             </a:pPr>
             <a:r>
-              <a:rPr lang="en-US" sz="1200" dirty="0" smtClean="0">
+              <a:rPr lang="en-US" sz="1200" dirty="0">
                 <a:solidFill>
                   <a:schemeClr val="tx1"/>
                 </a:solidFill>
@@ -5061,7 +5057,7 @@
               <a:t>$EXEC/</a:t>
             </a:r>
             <a:r>
-              <a:rPr lang="en-US" sz="1200" dirty="0" err="1" smtClean="0">
+              <a:rPr lang="en-US" sz="1200" dirty="0" err="1">
                 <a:solidFill>
                   <a:schemeClr val="tx1"/>
                 </a:solidFill>
@@ -5069,7 +5065,7 @@
               <a:t>server_execution</a:t>
             </a:r>
             <a:r>
-              <a:rPr lang="en-US" sz="1200" dirty="0" smtClean="0">
+              <a:rPr lang="en-US" sz="1200" dirty="0">
                 <a:solidFill>
                   <a:schemeClr val="tx1"/>
                 </a:solidFill>
@@ -5083,7 +5079,7 @@
               <a:buChar char="•"/>
             </a:pPr>
             <a:r>
-              <a:rPr lang="en-US" sz="1200" dirty="0" smtClean="0">
+              <a:rPr lang="en-US" sz="1200" dirty="0">
                 <a:solidFill>
                   <a:schemeClr val="tx1"/>
                 </a:solidFill>
@@ -5091,7 +5087,7 @@
               <a:t>$EXEC/</a:t>
             </a:r>
             <a:r>
-              <a:rPr lang="en-US" sz="1200" dirty="0" err="1" smtClean="0">
+              <a:rPr lang="en-US" sz="1200" dirty="0" err="1">
                 <a:solidFill>
                   <a:schemeClr val="tx1"/>
                 </a:solidFill>
@@ -5099,7 +5095,7 @@
               <a:t>client_execution</a:t>
             </a:r>
             <a:r>
-              <a:rPr lang="en-US" sz="1200" dirty="0" smtClean="0">
+              <a:rPr lang="en-US" sz="1200" dirty="0">
                 <a:solidFill>
                   <a:schemeClr val="tx1"/>
                 </a:solidFill>
@@ -5331,7 +5327,7 @@
           <a:p>
             <a:pPr algn="ctr"/>
             <a:r>
-              <a:rPr lang="en-US" sz="1200" b="1" dirty="0" smtClean="0">
+              <a:rPr lang="en-US" sz="1200" b="1" dirty="0">
                 <a:solidFill>
                   <a:schemeClr val="tx1"/>
                 </a:solidFill>
@@ -5342,14 +5338,14 @@
           <a:p>
             <a:pPr algn="ctr"/>
             <a:r>
-              <a:rPr lang="en-US" sz="1200" b="1" dirty="0" err="1" smtClean="0">
+              <a:rPr lang="en-US" sz="1200" b="1" dirty="0" err="1">
                 <a:solidFill>
                   <a:schemeClr val="tx1"/>
                 </a:solidFill>
               </a:rPr>
               <a:t>copyResults.sh</a:t>
             </a:r>
-            <a:endParaRPr lang="en-US" sz="1200" b="1" dirty="0" smtClean="0">
+            <a:endParaRPr lang="en-US" sz="1200" b="1" dirty="0">
               <a:solidFill>
                 <a:schemeClr val="tx1"/>
               </a:solidFill>
@@ -5475,7 +5471,7 @@
           <a:p>
             <a:pPr algn="ctr"/>
             <a:r>
-              <a:rPr lang="en-US" sz="1200" b="1" dirty="0" smtClean="0">
+              <a:rPr lang="en-US" sz="1200" b="1" dirty="0">
                 <a:solidFill>
                   <a:schemeClr val="tx1"/>
                 </a:solidFill>
@@ -5486,14 +5482,14 @@
           <a:p>
             <a:pPr algn="ctr"/>
             <a:r>
-              <a:rPr lang="en-US" sz="1200" b="1" dirty="0" err="1" smtClean="0">
+              <a:rPr lang="en-US" sz="1200" b="1" dirty="0" err="1">
                 <a:solidFill>
                   <a:schemeClr val="tx1"/>
                 </a:solidFill>
               </a:rPr>
               <a:t>analyzeResult.sh</a:t>
             </a:r>
-            <a:endParaRPr lang="en-US" sz="1200" b="1" dirty="0" smtClean="0">
+            <a:endParaRPr lang="en-US" sz="1200" b="1" dirty="0">
               <a:solidFill>
                 <a:schemeClr val="tx1"/>
               </a:solidFill>
@@ -5505,14 +5501,14 @@
               <a:buChar char="•"/>
             </a:pPr>
             <a:r>
-              <a:rPr lang="en-US" sz="1200" dirty="0" err="1" smtClean="0">
+              <a:rPr lang="en-US" sz="1200" dirty="0" err="1">
                 <a:solidFill>
                   <a:schemeClr val="tx1"/>
                 </a:solidFill>
               </a:rPr>
               <a:t>packetAnalyzer.js</a:t>
             </a:r>
-            <a:endParaRPr lang="en-US" sz="1200" dirty="0" smtClean="0">
+            <a:endParaRPr lang="en-US" sz="1200" dirty="0">
               <a:solidFill>
                 <a:schemeClr val="tx1"/>
               </a:solidFill>
@@ -5524,14 +5520,14 @@
               <a:buChar char="•"/>
             </a:pPr>
             <a:r>
-              <a:rPr lang="en-US" sz="1200" dirty="0" err="1" smtClean="0">
+              <a:rPr lang="en-US" sz="1200" dirty="0" err="1">
                 <a:solidFill>
                   <a:schemeClr val="tx1"/>
                 </a:solidFill>
               </a:rPr>
               <a:t>availabilityAnalyzer.js</a:t>
             </a:r>
-            <a:endParaRPr lang="en-US" sz="1200" dirty="0" smtClean="0">
+            <a:endParaRPr lang="en-US" sz="1200" dirty="0">
               <a:solidFill>
                 <a:schemeClr val="tx1"/>
               </a:solidFill>
@@ -5615,14 +5611,14 @@
           <a:p>
             <a:pPr algn="ctr"/>
             <a:r>
-              <a:rPr lang="en-US" sz="1200" dirty="0" smtClean="0"/>
+              <a:rPr lang="en-US" sz="1200" dirty="0"/>
               <a:t>$NS3/*.</a:t>
             </a:r>
             <a:r>
-              <a:rPr lang="en-US" sz="1200" dirty="0" err="1" smtClean="0"/>
+              <a:rPr lang="en-US" sz="1200" dirty="0" err="1"/>
               <a:t>pcap</a:t>
             </a:r>
-            <a:endParaRPr lang="en-US" sz="1200" dirty="0" smtClean="0"/>
+            <a:endParaRPr lang="en-US" sz="1200" dirty="0"/>
           </a:p>
         </p:txBody>
       </p:sp>
@@ -5663,21 +5659,21 @@
           <a:p>
             <a:pPr algn="ctr"/>
             <a:r>
-              <a:rPr lang="en-US" sz="1200" dirty="0" smtClean="0"/>
+              <a:rPr lang="en-US" sz="1200" dirty="0"/>
               <a:t>$EXEC/*_</a:t>
             </a:r>
             <a:r>
-              <a:rPr lang="en-US" sz="1200" smtClean="0"/>
+              <a:rPr lang="en-US" sz="1200"/>
               <a:t>execution/*/</a:t>
             </a:r>
           </a:p>
           <a:p>
             <a:pPr algn="ctr"/>
             <a:r>
-              <a:rPr lang="en-US" sz="1200" dirty="0" err="1" smtClean="0"/>
+              <a:rPr lang="en-US" sz="1200" dirty="0" err="1"/>
               <a:t>nohup.out</a:t>
             </a:r>
-            <a:endParaRPr lang="en-US" sz="1200" dirty="0" smtClean="0"/>
+            <a:endParaRPr lang="en-US" sz="1200" dirty="0"/>
           </a:p>
         </p:txBody>
       </p:sp>
@@ -5718,7 +5714,7 @@
           <a:p>
             <a:pPr algn="ctr"/>
             <a:r>
-              <a:rPr lang="en-US" sz="1200" dirty="0" smtClean="0"/>
+              <a:rPr lang="en-US" sz="1200" dirty="0"/>
               <a:t>$CCS/results/$DATE/analysis</a:t>
             </a:r>
           </a:p>
@@ -5726,25 +5722,17 @@
             <a:pPr algn="ctr"/>
             <a:r>
               <a:rPr lang="en-US" sz="1200" dirty="0" err="1"/>
-              <a:t>p</a:t>
-            </a:r>
-            <a:r>
-              <a:rPr lang="en-US" sz="1200" dirty="0" err="1" smtClean="0"/>
-              <a:t>acket.txt</a:t>
-            </a:r>
-            <a:endParaRPr lang="en-US" sz="1200" dirty="0" smtClean="0"/>
+              <a:t>packet.txt</a:t>
+            </a:r>
+            <a:endParaRPr lang="en-US" sz="1200" dirty="0"/>
           </a:p>
           <a:p>
             <a:pPr algn="ctr"/>
             <a:r>
               <a:rPr lang="en-US" sz="1200" dirty="0" err="1"/>
-              <a:t>a</a:t>
-            </a:r>
-            <a:r>
-              <a:rPr lang="en-US" sz="1200" dirty="0" err="1" smtClean="0"/>
-              <a:t>vailability.txt</a:t>
-            </a:r>
-            <a:endParaRPr lang="en-US" sz="1200" dirty="0" smtClean="0"/>
+              <a:t>availability.txt</a:t>
+            </a:r>
+            <a:endParaRPr lang="en-US" sz="1200" dirty="0"/>
           </a:p>
         </p:txBody>
       </p:sp>
@@ -5785,40 +5773,40 @@
           <a:p>
             <a:pPr algn="ctr"/>
             <a:r>
-              <a:rPr lang="en-US" sz="1200" dirty="0" smtClean="0"/>
+              <a:rPr lang="en-US" sz="1200" dirty="0"/>
               <a:t>$CCS/results/$DATE/</a:t>
             </a:r>
             <a:r>
-              <a:rPr lang="en-US" sz="1200" dirty="0" err="1" smtClean="0"/>
+              <a:rPr lang="en-US" sz="1200" dirty="0" err="1"/>
               <a:t>configs</a:t>
             </a:r>
             <a:r>
-              <a:rPr lang="en-US" sz="1200" dirty="0" smtClean="0"/>
+              <a:rPr lang="en-US" sz="1200" dirty="0"/>
               <a:t>/</a:t>
             </a:r>
           </a:p>
           <a:p>
             <a:pPr algn="ctr"/>
             <a:r>
-              <a:rPr lang="en-US" sz="1200" dirty="0" smtClean="0"/>
+              <a:rPr lang="en-US" sz="1200" dirty="0"/>
               <a:t>ns3Exp.graph</a:t>
             </a:r>
           </a:p>
           <a:p>
             <a:pPr algn="ctr"/>
             <a:r>
-              <a:rPr lang="en-US" sz="1200" dirty="0" err="1" smtClean="0"/>
+              <a:rPr lang="en-US" sz="1200" dirty="0" err="1"/>
               <a:t>devList.txt</a:t>
             </a:r>
-            <a:endParaRPr lang="en-US" sz="1200" dirty="0" smtClean="0"/>
+            <a:endParaRPr lang="en-US" sz="1200" dirty="0"/>
           </a:p>
           <a:p>
             <a:pPr algn="ctr"/>
             <a:r>
-              <a:rPr lang="en-US" sz="1200" dirty="0" err="1" smtClean="0"/>
+              <a:rPr lang="en-US" sz="1200" dirty="0" err="1"/>
               <a:t>commCosts.txt</a:t>
             </a:r>
-            <a:endParaRPr lang="en-US" sz="1200" dirty="0" smtClean="0"/>
+            <a:endParaRPr lang="en-US" sz="1200" dirty="0"/>
           </a:p>
         </p:txBody>
       </p:sp>
@@ -5859,29 +5847,29 @@
           <a:p>
             <a:pPr algn="ctr"/>
             <a:r>
-              <a:rPr lang="en-US" sz="1200" dirty="0" smtClean="0"/>
+              <a:rPr lang="en-US" sz="1200" dirty="0"/>
               <a:t>$CCS/results/$DATE/</a:t>
             </a:r>
             <a:r>
-              <a:rPr lang="en-US" sz="1200" dirty="0" err="1" smtClean="0"/>
+              <a:rPr lang="en-US" sz="1200" dirty="0" err="1"/>
               <a:t>pcap</a:t>
             </a:r>
             <a:r>
-              <a:rPr lang="en-US" sz="1200" dirty="0" smtClean="0"/>
+              <a:rPr lang="en-US" sz="1200" dirty="0"/>
               <a:t>/</a:t>
             </a:r>
           </a:p>
           <a:p>
             <a:pPr algn="ctr"/>
             <a:r>
-              <a:rPr lang="en-US" sz="1200" dirty="0" smtClean="0"/>
+              <a:rPr lang="en-US" sz="1200" dirty="0"/>
               <a:t>*.</a:t>
             </a:r>
             <a:r>
-              <a:rPr lang="en-US" sz="1200" dirty="0" err="1" smtClean="0"/>
+              <a:rPr lang="en-US" sz="1200" dirty="0" err="1"/>
               <a:t>pcap</a:t>
             </a:r>
-            <a:endParaRPr lang="en-US" sz="1200" dirty="0" smtClean="0"/>
+            <a:endParaRPr lang="en-US" sz="1200" dirty="0"/>
           </a:p>
         </p:txBody>
       </p:sp>
@@ -6010,7 +5998,7 @@
         </p:nvSpPr>
         <p:spPr>
           <a:xfrm>
-            <a:off x="1538679" y="-620625"/>
+            <a:off x="963128" y="-620625"/>
             <a:ext cx="1526012" cy="472138"/>
           </a:xfrm>
           <a:prstGeom prst="rect">
@@ -6042,7 +6030,7 @@
           <a:p>
             <a:pPr algn="ctr"/>
             <a:r>
-              <a:rPr lang="en-US" sz="1200" b="1" dirty="0" smtClean="0">
+              <a:rPr lang="en-US" sz="1200" b="1" dirty="0">
                 <a:solidFill>
                   <a:schemeClr val="tx1"/>
                 </a:solidFill>
@@ -6050,7 +6038,7 @@
               <a:t>Macro in Floorplans (*.</a:t>
             </a:r>
             <a:r>
-              <a:rPr lang="en-US" sz="1200" b="1" dirty="0" err="1" smtClean="0">
+              <a:rPr lang="en-US" sz="1200" b="1" dirty="0" err="1">
                 <a:solidFill>
                   <a:schemeClr val="tx1"/>
                 </a:solidFill>
@@ -6058,7 +6046,7 @@
               <a:t>pptx</a:t>
             </a:r>
             <a:r>
-              <a:rPr lang="en-US" sz="1200" b="1" dirty="0" smtClean="0">
+              <a:rPr lang="en-US" sz="1200" b="1" dirty="0">
                 <a:solidFill>
                   <a:schemeClr val="tx1"/>
                 </a:solidFill>
@@ -6072,15 +6060,16 @@
         <p:nvCxnSpPr>
           <p:cNvPr id="52" name="Straight Arrow Connector 51"/>
           <p:cNvCxnSpPr>
+            <a:cxnSpLocks/>
             <a:stCxn id="49" idx="2"/>
             <a:endCxn id="65" idx="3"/>
           </p:cNvCxnSpPr>
           <p:nvPr/>
         </p:nvCxnSpPr>
         <p:spPr>
-          <a:xfrm>
-            <a:off x="2301685" y="-148487"/>
-            <a:ext cx="0" cy="230698"/>
+          <a:xfrm flipH="1">
+            <a:off x="1720717" y="-148487"/>
+            <a:ext cx="5417" cy="230698"/>
           </a:xfrm>
           <a:prstGeom prst="straightConnector1">
             <a:avLst/>
@@ -6141,14 +6130,14 @@
           <a:p>
             <a:pPr algn="ctr"/>
             <a:r>
-              <a:rPr lang="en-US" sz="1200" dirty="0" smtClean="0"/>
+              <a:rPr lang="en-US" sz="1200" dirty="0"/>
               <a:t>$ENTITY/</a:t>
             </a:r>
             <a:r>
-              <a:rPr lang="en-US" sz="1200" dirty="0" err="1" smtClean="0"/>
+              <a:rPr lang="en-US" sz="1200" dirty="0" err="1"/>
               <a:t>autoClient.js</a:t>
             </a:r>
-            <a:endParaRPr lang="en-US" sz="1200" dirty="0" smtClean="0"/>
+            <a:endParaRPr lang="en-US" sz="1200" dirty="0"/>
           </a:p>
         </p:txBody>
       </p:sp>
@@ -6190,25 +6179,21 @@
             <a:pPr algn="ctr"/>
             <a:r>
               <a:rPr lang="en-US" sz="1200" dirty="0"/>
-              <a:t>$</a:t>
-            </a:r>
-            <a:r>
-              <a:rPr lang="en-US" sz="1200" dirty="0" smtClean="0"/>
-              <a:t>CCS/</a:t>
-            </a:r>
-            <a:r>
-              <a:rPr lang="en-US" sz="1200" dirty="0" err="1" smtClean="0"/>
+              <a:t>$CCS/</a:t>
+            </a:r>
+            <a:r>
+              <a:rPr lang="en-US" sz="1200" dirty="0" err="1"/>
               <a:t>expOptions</a:t>
             </a:r>
             <a:r>
-              <a:rPr lang="en-US" sz="1200" dirty="0" smtClean="0"/>
+              <a:rPr lang="en-US" sz="1200" dirty="0"/>
               <a:t>/</a:t>
             </a:r>
             <a:r>
-              <a:rPr lang="en-US" sz="1200" dirty="0" err="1" smtClean="0"/>
+              <a:rPr lang="en-US" sz="1200" dirty="0" err="1"/>
               <a:t>expEntity.option</a:t>
             </a:r>
-            <a:endParaRPr lang="en-US" sz="1200" dirty="0" smtClean="0"/>
+            <a:endParaRPr lang="en-US" sz="1200" dirty="0"/>
           </a:p>
         </p:txBody>
       </p:sp>
@@ -6249,14 +6234,14 @@
           <a:p>
             <a:pPr algn="ctr"/>
             <a:r>
-              <a:rPr lang="en-US" sz="1200" dirty="0" smtClean="0"/>
+              <a:rPr lang="en-US" sz="1200" dirty="0"/>
               <a:t>$ENTITY/</a:t>
             </a:r>
             <a:r>
-              <a:rPr lang="en-US" sz="1200" dirty="0" err="1" smtClean="0"/>
+              <a:rPr lang="en-US" sz="1200" dirty="0" err="1"/>
               <a:t>echoServer.js</a:t>
             </a:r>
-            <a:endParaRPr lang="en-US" sz="1200" dirty="0" smtClean="0"/>
+            <a:endParaRPr lang="en-US" sz="1200" dirty="0"/>
           </a:p>
         </p:txBody>
       </p:sp>
@@ -6376,8 +6361,8 @@
         </p:nvSpPr>
         <p:spPr>
           <a:xfrm>
-            <a:off x="1433294" y="82211"/>
-            <a:ext cx="1736782" cy="598046"/>
+            <a:off x="801272" y="82211"/>
+            <a:ext cx="1838890" cy="598046"/>
           </a:xfrm>
           <a:prstGeom prst="snip1Rect">
             <a:avLst>
@@ -6405,8 +6390,16 @@
           <a:p>
             <a:pPr algn="ctr"/>
             <a:r>
-              <a:rPr lang="en-US" sz="1200" b="1" dirty="0" smtClean="0"/>
-              <a:t>cory5th.txt</a:t>
+              <a:rPr lang="en-US" sz="1200" dirty="0"/>
+              <a:t>$CCS/</a:t>
+            </a:r>
+            <a:r>
+              <a:rPr lang="en-US" sz="1200" dirty="0" err="1"/>
+              <a:t>floorPlans</a:t>
+            </a:r>
+            <a:r>
+              <a:rPr lang="en-US" sz="1200" dirty="0"/>
+              <a:t>/cory5th.txt</a:t>
             </a:r>
           </a:p>
           <a:p>
@@ -6415,16 +6408,15 @@
               <a:buChar char="•"/>
             </a:pPr>
             <a:r>
-              <a:rPr lang="en-US" sz="1200" dirty="0" smtClean="0"/>
+              <a:rPr lang="en-US" sz="1200" dirty="0"/>
               <a:t>Pairs of</a:t>
             </a:r>
           </a:p>
           <a:p>
             <a:r>
-              <a:rPr lang="en-US" sz="1200" dirty="0" smtClean="0"/>
+              <a:rPr lang="en-US" sz="1200" dirty="0"/>
               <a:t>[entity name : coordinate]</a:t>
             </a:r>
-            <a:endParaRPr lang="en-US" sz="1200" dirty="0"/>
           </a:p>
         </p:txBody>
       </p:sp>
@@ -6436,7 +6428,7 @@
         </p:nvSpPr>
         <p:spPr>
           <a:xfrm>
-            <a:off x="1655945" y="913669"/>
+            <a:off x="1725725" y="913669"/>
             <a:ext cx="1291480" cy="466767"/>
           </a:xfrm>
           <a:prstGeom prst="rect">
@@ -6470,7 +6462,7 @@
           <a:p>
             <a:pPr algn="ctr"/>
             <a:r>
-              <a:rPr lang="en-US" sz="1200" b="1" dirty="0" smtClean="0">
+              <a:rPr lang="en-US" sz="1200" b="1" dirty="0">
                 <a:solidFill>
                   <a:schemeClr val="tx1"/>
                 </a:solidFill>
@@ -6481,7 +6473,7 @@
           <a:p>
             <a:pPr algn="ctr"/>
             <a:r>
-              <a:rPr lang="en-US" sz="1200" b="1" dirty="0" err="1" smtClean="0">
+              <a:rPr lang="en-US" sz="1200" b="1" dirty="0" err="1">
                 <a:solidFill>
                   <a:schemeClr val="tx1"/>
                 </a:solidFill>
@@ -6500,6 +6492,7 @@
         <p:nvCxnSpPr>
           <p:cNvPr id="87" name="Straight Arrow Connector 86"/>
           <p:cNvCxnSpPr>
+            <a:cxnSpLocks/>
             <a:stCxn id="86" idx="2"/>
             <a:endCxn id="101" idx="3"/>
           </p:cNvCxnSpPr>
@@ -6507,8 +6500,8 @@
         </p:nvCxnSpPr>
         <p:spPr>
           <a:xfrm>
-            <a:off x="2301685" y="1380436"/>
-            <a:ext cx="6300" cy="225592"/>
+            <a:off x="2371465" y="1380436"/>
+            <a:ext cx="0" cy="225592"/>
           </a:xfrm>
           <a:prstGeom prst="straightConnector1">
             <a:avLst/>
@@ -6540,8 +6533,8 @@
         </p:nvSpPr>
         <p:spPr>
           <a:xfrm>
-            <a:off x="1720076" y="1606028"/>
-            <a:ext cx="1175817" cy="505547"/>
+            <a:off x="1802594" y="1606028"/>
+            <a:ext cx="1137741" cy="505547"/>
           </a:xfrm>
           <a:prstGeom prst="snip1Rect">
             <a:avLst>
@@ -6569,15 +6562,15 @@
           <a:p>
             <a:pPr algn="ctr"/>
             <a:r>
-              <a:rPr lang="en-US" sz="1200" dirty="0" smtClean="0"/>
+              <a:rPr lang="en-US" sz="1200" dirty="0"/>
               <a:t>$CCS/</a:t>
             </a:r>
             <a:r>
-              <a:rPr lang="en-US" sz="1200" dirty="0" err="1" smtClean="0"/>
+              <a:rPr lang="en-US" sz="1200" dirty="0" err="1"/>
               <a:t>floorPlans</a:t>
             </a:r>
             <a:r>
-              <a:rPr lang="en-US" sz="1200" dirty="0" smtClean="0"/>
+              <a:rPr lang="en-US" sz="1200" dirty="0"/>
               <a:t>/</a:t>
             </a:r>
           </a:p>
@@ -6594,13 +6587,14 @@
         <p:nvCxnSpPr>
           <p:cNvPr id="107" name="Straight Arrow Connector 106"/>
           <p:cNvCxnSpPr>
+            <a:cxnSpLocks/>
             <a:stCxn id="101" idx="1"/>
           </p:cNvCxnSpPr>
           <p:nvPr/>
         </p:nvCxnSpPr>
         <p:spPr>
           <a:xfrm>
-            <a:off x="2307985" y="2111575"/>
+            <a:off x="2371465" y="2111575"/>
             <a:ext cx="0" cy="242301"/>
           </a:xfrm>
           <a:prstGeom prst="straightConnector1">
@@ -6629,6 +6623,7 @@
         <p:nvCxnSpPr>
           <p:cNvPr id="114" name="Straight Arrow Connector 113"/>
           <p:cNvCxnSpPr>
+            <a:cxnSpLocks/>
             <a:stCxn id="65" idx="1"/>
             <a:endCxn id="86" idx="0"/>
           </p:cNvCxnSpPr>
@@ -6636,8 +6631,8 @@
         </p:nvCxnSpPr>
         <p:spPr>
           <a:xfrm>
-            <a:off x="2301685" y="680257"/>
-            <a:ext cx="0" cy="233412"/>
+            <a:off x="1720717" y="680257"/>
+            <a:ext cx="650748" cy="233412"/>
           </a:xfrm>
           <a:prstGeom prst="straightConnector1">
             <a:avLst/>
@@ -6669,7 +6664,7 @@
         </p:nvCxnSpPr>
         <p:spPr>
           <a:xfrm>
-            <a:off x="1059506" y="2111575"/>
+            <a:off x="1149830" y="2111575"/>
             <a:ext cx="0" cy="242301"/>
           </a:xfrm>
           <a:prstGeom prst="straightConnector1">
@@ -6702,7 +6697,7 @@
         </p:nvSpPr>
         <p:spPr>
           <a:xfrm>
-            <a:off x="1503390" y="1758920"/>
+            <a:off x="1593714" y="1758920"/>
             <a:ext cx="197173" cy="184666"/>
           </a:xfrm>
           <a:prstGeom prst="rect">
@@ -6717,13 +6712,358 @@
           <a:lstStyle/>
           <a:p>
             <a:r>
-              <a:rPr lang="en-US" sz="1200" b="1" dirty="0" smtClean="0"/>
+              <a:rPr lang="en-US" sz="1200" b="1" dirty="0"/>
               <a:t>OR</a:t>
             </a:r>
-            <a:endParaRPr lang="en-US" sz="1200" b="1" dirty="0"/>
-          </a:p>
-        </p:txBody>
-      </p:sp>
+          </a:p>
+        </p:txBody>
+      </p:sp>
+      <p:sp>
+        <p:nvSpPr>
+          <p:cNvPr id="74" name="Snip Single Corner Rectangle 73">
+            <a:extLst>
+              <a:ext uri="{FF2B5EF4-FFF2-40B4-BE49-F238E27FC236}">
+                <a16:creationId xmlns:a16="http://schemas.microsoft.com/office/drawing/2014/main" id="{8D02ACBA-C7A8-DB4A-908A-0CD444812BA7}"/>
+              </a:ext>
+            </a:extLst>
+          </p:cNvPr>
+          <p:cNvSpPr/>
+          <p:nvPr/>
+        </p:nvSpPr>
+        <p:spPr>
+          <a:xfrm>
+            <a:off x="2746577" y="-164738"/>
+            <a:ext cx="1741551" cy="850381"/>
+          </a:xfrm>
+          <a:prstGeom prst="snip1Rect">
+            <a:avLst>
+              <a:gd name="adj" fmla="val 15368"/>
+            </a:avLst>
+          </a:prstGeom>
+        </p:spPr>
+        <p:style>
+          <a:lnRef idx="2">
+            <a:schemeClr val="dk1"/>
+          </a:lnRef>
+          <a:fillRef idx="1">
+            <a:schemeClr val="lt1"/>
+          </a:fillRef>
+          <a:effectRef idx="0">
+            <a:schemeClr val="dk1"/>
+          </a:effectRef>
+          <a:fontRef idx="minor">
+            <a:schemeClr val="dk1"/>
+          </a:fontRef>
+        </p:style>
+        <p:txBody>
+          <a:bodyPr lIns="45720" tIns="0" rIns="0" bIns="0" rtlCol="0" anchor="ctr"/>
+          <a:lstStyle/>
+          <a:p>
+            <a:pPr algn="ctr"/>
+            <a:r>
+              <a:rPr lang="en-US" sz="1200" dirty="0"/>
+              <a:t>$CCS/</a:t>
+            </a:r>
+            <a:r>
+              <a:rPr lang="en-US" sz="1200" dirty="0" err="1"/>
+              <a:t>floorPlans</a:t>
+            </a:r>
+            <a:r>
+              <a:rPr lang="en-US" sz="1200" dirty="0"/>
+              <a:t>/</a:t>
+            </a:r>
+          </a:p>
+          <a:p>
+            <a:r>
+              <a:rPr lang="en-US" sz="1200" dirty="0"/>
+              <a:t>cory5thAssignments.json</a:t>
+            </a:r>
+          </a:p>
+          <a:p>
+            <a:r>
+              <a:rPr lang="en-US" sz="1200" dirty="0"/>
+              <a:t>cory5thAuthTrusts.json</a:t>
+            </a:r>
+            <a:br>
+              <a:rPr lang="en-US" sz="1200" dirty="0"/>
+            </a:br>
+            <a:r>
+              <a:rPr lang="en-US" sz="1200" dirty="0"/>
+              <a:t>cory5thAuthCapacity.json</a:t>
+            </a:r>
+          </a:p>
+        </p:txBody>
+      </p:sp>
+      <p:cxnSp>
+        <p:nvCxnSpPr>
+          <p:cNvPr id="79" name="Straight Arrow Connector 78">
+            <a:extLst>
+              <a:ext uri="{FF2B5EF4-FFF2-40B4-BE49-F238E27FC236}">
+                <a16:creationId xmlns:a16="http://schemas.microsoft.com/office/drawing/2014/main" id="{031767F4-BFCA-9549-9A2E-92087F980548}"/>
+              </a:ext>
+            </a:extLst>
+          </p:cNvPr>
+          <p:cNvCxnSpPr>
+            <a:cxnSpLocks/>
+            <a:stCxn id="74" idx="1"/>
+            <a:endCxn id="86" idx="0"/>
+          </p:cNvCxnSpPr>
+          <p:nvPr/>
+        </p:nvCxnSpPr>
+        <p:spPr>
+          <a:xfrm flipH="1">
+            <a:off x="2371465" y="685643"/>
+            <a:ext cx="1245888" cy="228026"/>
+          </a:xfrm>
+          <a:prstGeom prst="straightConnector1">
+            <a:avLst/>
+          </a:prstGeom>
+          <a:ln w="57150">
+            <a:tailEnd type="triangle"/>
+          </a:ln>
+        </p:spPr>
+        <p:style>
+          <a:lnRef idx="1">
+            <a:schemeClr val="accent1"/>
+          </a:lnRef>
+          <a:fillRef idx="0">
+            <a:schemeClr val="accent1"/>
+          </a:fillRef>
+          <a:effectRef idx="0">
+            <a:schemeClr val="accent1"/>
+          </a:effectRef>
+          <a:fontRef idx="minor">
+            <a:schemeClr val="tx1"/>
+          </a:fontRef>
+        </p:style>
+      </p:cxnSp>
+      <p:sp>
+        <p:nvSpPr>
+          <p:cNvPr id="88" name="Snip Single Corner Rectangle 87">
+            <a:extLst>
+              <a:ext uri="{FF2B5EF4-FFF2-40B4-BE49-F238E27FC236}">
+                <a16:creationId xmlns:a16="http://schemas.microsoft.com/office/drawing/2014/main" id="{69901E54-330E-6A40-820F-84DC32479CCB}"/>
+              </a:ext>
+            </a:extLst>
+          </p:cNvPr>
+          <p:cNvSpPr/>
+          <p:nvPr/>
+        </p:nvSpPr>
+        <p:spPr>
+          <a:xfrm>
+            <a:off x="4735920" y="552470"/>
+            <a:ext cx="1137741" cy="505547"/>
+          </a:xfrm>
+          <a:prstGeom prst="snip1Rect">
+            <a:avLst>
+              <a:gd name="adj" fmla="val 15368"/>
+            </a:avLst>
+          </a:prstGeom>
+        </p:spPr>
+        <p:style>
+          <a:lnRef idx="2">
+            <a:schemeClr val="dk1"/>
+          </a:lnRef>
+          <a:fillRef idx="1">
+            <a:schemeClr val="lt1"/>
+          </a:fillRef>
+          <a:effectRef idx="0">
+            <a:schemeClr val="dk1"/>
+          </a:effectRef>
+          <a:fontRef idx="minor">
+            <a:schemeClr val="dk1"/>
+          </a:fontRef>
+        </p:style>
+        <p:txBody>
+          <a:bodyPr lIns="45720" tIns="0" rIns="0" bIns="0" rtlCol="0" anchor="ctr"/>
+          <a:lstStyle/>
+          <a:p>
+            <a:pPr algn="ctr"/>
+            <a:r>
+              <a:rPr lang="en-US" sz="1200" dirty="0"/>
+              <a:t>$CCS/</a:t>
+            </a:r>
+            <a:r>
+              <a:rPr lang="en-US" sz="1200" dirty="0" err="1"/>
+              <a:t>floorPlans</a:t>
+            </a:r>
+            <a:r>
+              <a:rPr lang="en-US" sz="1200" dirty="0"/>
+              <a:t>/</a:t>
+            </a:r>
+          </a:p>
+          <a:p>
+            <a:pPr algn="ctr"/>
+            <a:r>
+              <a:rPr lang="en-US" sz="1200" dirty="0"/>
+              <a:t>cory5th.json</a:t>
+            </a:r>
+          </a:p>
+        </p:txBody>
+      </p:sp>
+      <p:cxnSp>
+        <p:nvCxnSpPr>
+          <p:cNvPr id="91" name="Straight Arrow Connector 90">
+            <a:extLst>
+              <a:ext uri="{FF2B5EF4-FFF2-40B4-BE49-F238E27FC236}">
+                <a16:creationId xmlns:a16="http://schemas.microsoft.com/office/drawing/2014/main" id="{24590A28-95F6-264C-BF4E-48CB73360B15}"/>
+              </a:ext>
+            </a:extLst>
+          </p:cNvPr>
+          <p:cNvCxnSpPr>
+            <a:cxnSpLocks/>
+            <a:stCxn id="86" idx="3"/>
+            <a:endCxn id="88" idx="2"/>
+          </p:cNvCxnSpPr>
+          <p:nvPr/>
+        </p:nvCxnSpPr>
+        <p:spPr>
+          <a:xfrm flipV="1">
+            <a:off x="3017205" y="805244"/>
+            <a:ext cx="1718715" cy="341809"/>
+          </a:xfrm>
+          <a:prstGeom prst="straightConnector1">
+            <a:avLst/>
+          </a:prstGeom>
+          <a:ln w="57150">
+            <a:tailEnd type="triangle"/>
+          </a:ln>
+        </p:spPr>
+        <p:style>
+          <a:lnRef idx="1">
+            <a:schemeClr val="accent1"/>
+          </a:lnRef>
+          <a:fillRef idx="0">
+            <a:schemeClr val="accent1"/>
+          </a:fillRef>
+          <a:effectRef idx="0">
+            <a:schemeClr val="accent1"/>
+          </a:effectRef>
+          <a:fontRef idx="minor">
+            <a:schemeClr val="tx1"/>
+          </a:fontRef>
+        </p:style>
+      </p:cxnSp>
+      <p:sp>
+        <p:nvSpPr>
+          <p:cNvPr id="95" name="Rectangle 94">
+            <a:extLst>
+              <a:ext uri="{FF2B5EF4-FFF2-40B4-BE49-F238E27FC236}">
+                <a16:creationId xmlns:a16="http://schemas.microsoft.com/office/drawing/2014/main" id="{0D248B47-8B22-CB41-A72A-81023F8920E4}"/>
+              </a:ext>
+            </a:extLst>
+          </p:cNvPr>
+          <p:cNvSpPr/>
+          <p:nvPr/>
+        </p:nvSpPr>
+        <p:spPr>
+          <a:xfrm>
+            <a:off x="6518850" y="283568"/>
+            <a:ext cx="1847702" cy="389801"/>
+          </a:xfrm>
+          <a:prstGeom prst="rect">
+            <a:avLst/>
+          </a:prstGeom>
+          <a:solidFill>
+            <a:srgbClr val="837EA0"/>
+          </a:solidFill>
+        </p:spPr>
+        <p:style>
+          <a:lnRef idx="2">
+            <a:schemeClr val="accent5">
+              <a:shade val="50000"/>
+            </a:schemeClr>
+          </a:lnRef>
+          <a:fillRef idx="1">
+            <a:schemeClr val="accent5"/>
+          </a:fillRef>
+          <a:effectRef idx="0">
+            <a:schemeClr val="accent5"/>
+          </a:effectRef>
+          <a:fontRef idx="minor">
+            <a:schemeClr val="lt1"/>
+          </a:fontRef>
+        </p:style>
+        <p:txBody>
+          <a:bodyPr lIns="45720" tIns="0" rIns="0" bIns="0" rtlCol="0" anchor="ctr"/>
+          <a:lstStyle/>
+          <a:p>
+            <a:pPr algn="ctr"/>
+            <a:r>
+              <a:rPr lang="en-US" sz="1200" b="1" dirty="0">
+                <a:solidFill>
+                  <a:schemeClr val="tx1"/>
+                </a:solidFill>
+              </a:rPr>
+              <a:t>$IOT/</a:t>
+            </a:r>
+            <a:r>
+              <a:rPr lang="en-US" sz="1200" b="1" dirty="0" err="1">
+                <a:solidFill>
+                  <a:schemeClr val="tx1"/>
+                </a:solidFill>
+              </a:rPr>
+              <a:t>auth</a:t>
+            </a:r>
+            <a:r>
+              <a:rPr lang="en-US" sz="1200" b="1" dirty="0">
+                <a:solidFill>
+                  <a:schemeClr val="tx1"/>
+                </a:solidFill>
+              </a:rPr>
+              <a:t>/migration-solver</a:t>
+            </a:r>
+            <a:endParaRPr lang="en-US" sz="1200" dirty="0">
+              <a:solidFill>
+                <a:schemeClr val="tx1"/>
+              </a:solidFill>
+            </a:endParaRPr>
+          </a:p>
+        </p:txBody>
+      </p:sp>
+      <p:cxnSp>
+        <p:nvCxnSpPr>
+          <p:cNvPr id="96" name="Straight Arrow Connector 95">
+            <a:extLst>
+              <a:ext uri="{FF2B5EF4-FFF2-40B4-BE49-F238E27FC236}">
+                <a16:creationId xmlns:a16="http://schemas.microsoft.com/office/drawing/2014/main" id="{8091B29B-0CDB-3A42-B710-374FC119204B}"/>
+              </a:ext>
+            </a:extLst>
+          </p:cNvPr>
+          <p:cNvCxnSpPr>
+            <a:cxnSpLocks/>
+            <a:stCxn id="88" idx="0"/>
+            <a:endCxn id="95" idx="1"/>
+          </p:cNvCxnSpPr>
+          <p:nvPr/>
+        </p:nvCxnSpPr>
+        <p:spPr>
+          <a:xfrm flipV="1">
+            <a:off x="5873661" y="478469"/>
+            <a:ext cx="645189" cy="326775"/>
+          </a:xfrm>
+          <a:prstGeom prst="straightConnector1">
+            <a:avLst/>
+          </a:prstGeom>
+          <a:ln w="57150">
+            <a:tailEnd type="triangle"/>
+          </a:ln>
+        </p:spPr>
+        <p:style>
+          <a:lnRef idx="1">
+            <a:schemeClr val="accent1"/>
+          </a:lnRef>
+          <a:fillRef idx="0">
+            <a:schemeClr val="accent1"/>
+          </a:fillRef>
+          <a:effectRef idx="0">
+            <a:schemeClr val="accent1"/>
+          </a:effectRef>
+          <a:fontRef idx="minor">
+            <a:schemeClr val="tx1"/>
+          </a:fontRef>
+        </p:style>
+      </p:cxnSp>
     </p:spTree>
     <p:extLst>
       <p:ext uri="{BB962C8B-B14F-4D97-AF65-F5344CB8AC3E}">

</xml_diff>

<commit_message>
updated figure for experiment flow
</commit_message>
<xml_diff>
--- a/experiments/ccs2017/figures/exp_flow.pptx
+++ b/experiments/ccs2017/figures/exp_flow.pptx
@@ -197,7 +197,7 @@
           <a:p>
             <a:fld id="{6258ECF3-EDD8-D04A-90B6-1BE14B16AF69}" type="datetimeFigureOut">
               <a:rPr lang="en-US" smtClean="0"/>
-              <a:t>2/25/18</a:t>
+              <a:t>3/18/18</a:t>
             </a:fld>
             <a:endParaRPr lang="en-US"/>
           </a:p>
@@ -677,7 +677,7 @@
           <a:p>
             <a:fld id="{53D6C1FA-00A9-4142-A80A-0CB384F9F4AC}" type="datetimeFigureOut">
               <a:rPr lang="en-US" smtClean="0"/>
-              <a:t>2/25/18</a:t>
+              <a:t>3/18/18</a:t>
             </a:fld>
             <a:endParaRPr lang="en-US"/>
           </a:p>
@@ -845,7 +845,7 @@
           <a:p>
             <a:fld id="{53D6C1FA-00A9-4142-A80A-0CB384F9F4AC}" type="datetimeFigureOut">
               <a:rPr lang="en-US" smtClean="0"/>
-              <a:t>2/25/18</a:t>
+              <a:t>3/18/18</a:t>
             </a:fld>
             <a:endParaRPr lang="en-US"/>
           </a:p>
@@ -1023,7 +1023,7 @@
           <a:p>
             <a:fld id="{53D6C1FA-00A9-4142-A80A-0CB384F9F4AC}" type="datetimeFigureOut">
               <a:rPr lang="en-US" smtClean="0"/>
-              <a:t>2/25/18</a:t>
+              <a:t>3/18/18</a:t>
             </a:fld>
             <a:endParaRPr lang="en-US"/>
           </a:p>
@@ -1191,7 +1191,7 @@
           <a:p>
             <a:fld id="{53D6C1FA-00A9-4142-A80A-0CB384F9F4AC}" type="datetimeFigureOut">
               <a:rPr lang="en-US" smtClean="0"/>
-              <a:t>2/25/18</a:t>
+              <a:t>3/18/18</a:t>
             </a:fld>
             <a:endParaRPr lang="en-US"/>
           </a:p>
@@ -1436,7 +1436,7 @@
           <a:p>
             <a:fld id="{53D6C1FA-00A9-4142-A80A-0CB384F9F4AC}" type="datetimeFigureOut">
               <a:rPr lang="en-US" smtClean="0"/>
-              <a:t>2/25/18</a:t>
+              <a:t>3/18/18</a:t>
             </a:fld>
             <a:endParaRPr lang="en-US"/>
           </a:p>
@@ -1665,7 +1665,7 @@
           <a:p>
             <a:fld id="{53D6C1FA-00A9-4142-A80A-0CB384F9F4AC}" type="datetimeFigureOut">
               <a:rPr lang="en-US" smtClean="0"/>
-              <a:t>2/25/18</a:t>
+              <a:t>3/18/18</a:t>
             </a:fld>
             <a:endParaRPr lang="en-US"/>
           </a:p>
@@ -2029,7 +2029,7 @@
           <a:p>
             <a:fld id="{53D6C1FA-00A9-4142-A80A-0CB384F9F4AC}" type="datetimeFigureOut">
               <a:rPr lang="en-US" smtClean="0"/>
-              <a:t>2/25/18</a:t>
+              <a:t>3/18/18</a:t>
             </a:fld>
             <a:endParaRPr lang="en-US"/>
           </a:p>
@@ -2146,7 +2146,7 @@
           <a:p>
             <a:fld id="{53D6C1FA-00A9-4142-A80A-0CB384F9F4AC}" type="datetimeFigureOut">
               <a:rPr lang="en-US" smtClean="0"/>
-              <a:t>2/25/18</a:t>
+              <a:t>3/18/18</a:t>
             </a:fld>
             <a:endParaRPr lang="en-US"/>
           </a:p>
@@ -2241,7 +2241,7 @@
           <a:p>
             <a:fld id="{53D6C1FA-00A9-4142-A80A-0CB384F9F4AC}" type="datetimeFigureOut">
               <a:rPr lang="en-US" smtClean="0"/>
-              <a:t>2/25/18</a:t>
+              <a:t>3/18/18</a:t>
             </a:fld>
             <a:endParaRPr lang="en-US"/>
           </a:p>
@@ -2516,7 +2516,7 @@
           <a:p>
             <a:fld id="{53D6C1FA-00A9-4142-A80A-0CB384F9F4AC}" type="datetimeFigureOut">
               <a:rPr lang="en-US" smtClean="0"/>
-              <a:t>2/25/18</a:t>
+              <a:t>3/18/18</a:t>
             </a:fld>
             <a:endParaRPr lang="en-US"/>
           </a:p>
@@ -2768,7 +2768,7 @@
           <a:p>
             <a:fld id="{53D6C1FA-00A9-4142-A80A-0CB384F9F4AC}" type="datetimeFigureOut">
               <a:rPr lang="en-US" smtClean="0"/>
-              <a:t>2/25/18</a:t>
+              <a:t>3/18/18</a:t>
             </a:fld>
             <a:endParaRPr lang="en-US"/>
           </a:p>
@@ -2979,7 +2979,7 @@
           <a:p>
             <a:fld id="{53D6C1FA-00A9-4142-A80A-0CB384F9F4AC}" type="datetimeFigureOut">
               <a:rPr lang="en-US" smtClean="0"/>
-              <a:t>2/25/18</a:t>
+              <a:t>3/18/18</a:t>
             </a:fld>
             <a:endParaRPr lang="en-US"/>
           </a:p>
@@ -3594,7 +3594,7 @@
         </p:nvSpPr>
         <p:spPr>
           <a:xfrm>
-            <a:off x="4470707" y="1390117"/>
+            <a:off x="4470707" y="1525943"/>
             <a:ext cx="1749517" cy="1106938"/>
           </a:xfrm>
           <a:prstGeom prst="rect">
@@ -4106,9 +4106,9 @@
           <p:nvPr/>
         </p:nvCxnSpPr>
         <p:spPr>
-          <a:xfrm flipV="1">
-            <a:off x="4193601" y="1943586"/>
-            <a:ext cx="277106" cy="134464"/>
+          <a:xfrm>
+            <a:off x="4193601" y="2078050"/>
+            <a:ext cx="277106" cy="1362"/>
           </a:xfrm>
           <a:prstGeom prst="straightConnector1">
             <a:avLst/>
@@ -4763,7 +4763,7 @@
         <p:spPr>
           <a:xfrm flipV="1">
             <a:off x="6220224" y="1048448"/>
-            <a:ext cx="360926" cy="895138"/>
+            <a:ext cx="360926" cy="1030964"/>
           </a:xfrm>
           <a:prstGeom prst="straightConnector1">
             <a:avLst/>
@@ -4800,7 +4800,7 @@
         <p:spPr>
           <a:xfrm flipV="1">
             <a:off x="6220224" y="1445326"/>
-            <a:ext cx="360926" cy="498260"/>
+            <a:ext cx="360926" cy="634086"/>
           </a:xfrm>
           <a:prstGeom prst="straightConnector1">
             <a:avLst/>
@@ -4837,7 +4837,7 @@
         <p:spPr>
           <a:xfrm flipV="1">
             <a:off x="6220224" y="1858802"/>
-            <a:ext cx="360926" cy="84784"/>
+            <a:ext cx="360926" cy="220610"/>
           </a:xfrm>
           <a:prstGeom prst="straightConnector1">
             <a:avLst/>
@@ -4873,8 +4873,8 @@
         </p:nvCxnSpPr>
         <p:spPr>
           <a:xfrm>
-            <a:off x="6220224" y="1943586"/>
-            <a:ext cx="360926" cy="340309"/>
+            <a:off x="6220224" y="2079412"/>
+            <a:ext cx="360926" cy="204483"/>
           </a:xfrm>
           <a:prstGeom prst="straightConnector1">
             <a:avLst/>
@@ -5998,7 +5998,7 @@
         </p:nvSpPr>
         <p:spPr>
           <a:xfrm>
-            <a:off x="963128" y="-620625"/>
+            <a:off x="963128" y="-1702109"/>
             <a:ext cx="1526012" cy="472138"/>
           </a:xfrm>
           <a:prstGeom prst="rect">
@@ -6068,7 +6068,7 @@
         </p:nvCxnSpPr>
         <p:spPr>
           <a:xfrm flipH="1">
-            <a:off x="1720717" y="-148487"/>
+            <a:off x="1720717" y="-1229971"/>
             <a:ext cx="5417" cy="230698"/>
           </a:xfrm>
           <a:prstGeom prst="straightConnector1">
@@ -6361,7 +6361,7 @@
         </p:nvSpPr>
         <p:spPr>
           <a:xfrm>
-            <a:off x="801272" y="82211"/>
+            <a:off x="801272" y="-999273"/>
             <a:ext cx="1838890" cy="598046"/>
           </a:xfrm>
           <a:prstGeom prst="snip1Rect">
@@ -6428,7 +6428,7 @@
         </p:nvSpPr>
         <p:spPr>
           <a:xfrm>
-            <a:off x="1725725" y="913669"/>
+            <a:off x="1725725" y="530475"/>
             <a:ext cx="1291480" cy="466767"/>
           </a:xfrm>
           <a:prstGeom prst="rect">
@@ -6500,8 +6500,8 @@
         </p:nvCxnSpPr>
         <p:spPr>
           <a:xfrm>
-            <a:off x="2371465" y="1380436"/>
-            <a:ext cx="0" cy="225592"/>
+            <a:off x="2371465" y="997242"/>
+            <a:ext cx="0" cy="608786"/>
           </a:xfrm>
           <a:prstGeom prst="straightConnector1">
             <a:avLst/>
@@ -6631,8 +6631,8 @@
         </p:nvCxnSpPr>
         <p:spPr>
           <a:xfrm>
-            <a:off x="1720717" y="680257"/>
-            <a:ext cx="650748" cy="233412"/>
+            <a:off x="1720717" y="-401227"/>
+            <a:ext cx="650748" cy="931702"/>
           </a:xfrm>
           <a:prstGeom prst="straightConnector1">
             <a:avLst/>
@@ -6732,7 +6732,7 @@
         </p:nvSpPr>
         <p:spPr>
           <a:xfrm>
-            <a:off x="2746577" y="-164738"/>
+            <a:off x="2746577" y="-1246222"/>
             <a:ext cx="1741551" cy="850381"/>
           </a:xfrm>
           <a:prstGeom prst="snip1Rect">
@@ -6812,8 +6812,8 @@
         </p:nvCxnSpPr>
         <p:spPr>
           <a:xfrm flipH="1">
-            <a:off x="2371465" y="685643"/>
-            <a:ext cx="1245888" cy="228026"/>
+            <a:off x="2371465" y="-395841"/>
+            <a:ext cx="1245888" cy="926316"/>
           </a:xfrm>
           <a:prstGeom prst="straightConnector1">
             <a:avLst/>
@@ -6851,7 +6851,7 @@
         </p:nvSpPr>
         <p:spPr>
           <a:xfrm>
-            <a:off x="4735920" y="552470"/>
+            <a:off x="3887446" y="-140746"/>
             <a:ext cx="1137741" cy="505547"/>
           </a:xfrm>
           <a:prstGeom prst="snip1Rect">
@@ -6919,8 +6919,8 @@
         </p:nvCxnSpPr>
         <p:spPr>
           <a:xfrm flipV="1">
-            <a:off x="3017205" y="805244"/>
-            <a:ext cx="1718715" cy="341809"/>
+            <a:off x="3017205" y="112028"/>
+            <a:ext cx="870241" cy="651831"/>
           </a:xfrm>
           <a:prstGeom prst="straightConnector1">
             <a:avLst/>
@@ -6958,8 +6958,8 @@
         </p:nvSpPr>
         <p:spPr>
           <a:xfrm>
-            <a:off x="6518850" y="283568"/>
-            <a:ext cx="1847702" cy="389801"/>
+            <a:off x="5417070" y="-82873"/>
+            <a:ext cx="1124098" cy="389801"/>
           </a:xfrm>
           <a:prstGeom prst="rect">
             <a:avLst/>
@@ -7011,7 +7011,18 @@
                   <a:schemeClr val="tx1"/>
                 </a:solidFill>
               </a:rPr>
-              <a:t>/migration-solver</a:t>
+              <a:t>/</a:t>
+            </a:r>
+          </a:p>
+          <a:p>
+            <a:pPr algn="ctr"/>
+            <a:r>
+              <a:rPr lang="en-US" sz="1200" b="1" dirty="0">
+                <a:solidFill>
+                  <a:schemeClr val="tx1"/>
+                </a:solidFill>
+              </a:rPr>
+              <a:t>migration-solver</a:t>
             </a:r>
             <a:endParaRPr lang="en-US" sz="1200" dirty="0">
               <a:solidFill>
@@ -7038,9 +7049,277 @@
           <p:nvPr/>
         </p:nvCxnSpPr>
         <p:spPr>
-          <a:xfrm flipV="1">
-            <a:off x="5873661" y="478469"/>
-            <a:ext cx="645189" cy="326775"/>
+          <a:xfrm>
+            <a:off x="5025187" y="112028"/>
+            <a:ext cx="391883" cy="0"/>
+          </a:xfrm>
+          <a:prstGeom prst="straightConnector1">
+            <a:avLst/>
+          </a:prstGeom>
+          <a:ln w="57150">
+            <a:tailEnd type="triangle"/>
+          </a:ln>
+        </p:spPr>
+        <p:style>
+          <a:lnRef idx="1">
+            <a:schemeClr val="accent1"/>
+          </a:lnRef>
+          <a:fillRef idx="0">
+            <a:schemeClr val="accent1"/>
+          </a:fillRef>
+          <a:effectRef idx="0">
+            <a:schemeClr val="accent1"/>
+          </a:effectRef>
+          <a:fontRef idx="minor">
+            <a:schemeClr val="tx1"/>
+          </a:fontRef>
+        </p:style>
+      </p:cxnSp>
+      <p:sp>
+        <p:nvSpPr>
+          <p:cNvPr id="90" name="Snip Single Corner Rectangle 89">
+            <a:extLst>
+              <a:ext uri="{FF2B5EF4-FFF2-40B4-BE49-F238E27FC236}">
+                <a16:creationId xmlns:a16="http://schemas.microsoft.com/office/drawing/2014/main" id="{1DEEA0DC-8DBA-A740-8AD8-38C00444D322}"/>
+              </a:ext>
+            </a:extLst>
+          </p:cNvPr>
+          <p:cNvSpPr/>
+          <p:nvPr/>
+        </p:nvSpPr>
+        <p:spPr>
+          <a:xfrm>
+            <a:off x="4377903" y="484263"/>
+            <a:ext cx="1945371" cy="400535"/>
+          </a:xfrm>
+          <a:prstGeom prst="snip1Rect">
+            <a:avLst>
+              <a:gd name="adj" fmla="val 15368"/>
+            </a:avLst>
+          </a:prstGeom>
+        </p:spPr>
+        <p:style>
+          <a:lnRef idx="2">
+            <a:schemeClr val="dk1"/>
+          </a:lnRef>
+          <a:fillRef idx="1">
+            <a:schemeClr val="lt1"/>
+          </a:fillRef>
+          <a:effectRef idx="0">
+            <a:schemeClr val="dk1"/>
+          </a:effectRef>
+          <a:fontRef idx="minor">
+            <a:schemeClr val="dk1"/>
+          </a:fontRef>
+        </p:style>
+        <p:txBody>
+          <a:bodyPr lIns="45720" tIns="0" rIns="0" bIns="0" rtlCol="0" anchor="ctr"/>
+          <a:lstStyle/>
+          <a:p>
+            <a:pPr algn="ctr"/>
+            <a:r>
+              <a:rPr lang="en-US" sz="1200" dirty="0"/>
+              <a:t>$IOT/</a:t>
+            </a:r>
+            <a:r>
+              <a:rPr lang="en-US" sz="1200" dirty="0" err="1"/>
+              <a:t>auth</a:t>
+            </a:r>
+            <a:r>
+              <a:rPr lang="en-US" sz="1200" dirty="0"/>
+              <a:t>/migration-solver/</a:t>
+            </a:r>
+          </a:p>
+          <a:p>
+            <a:pPr algn="ctr"/>
+            <a:r>
+              <a:rPr lang="en-US" sz="1200" dirty="0"/>
+              <a:t>results/cory5th_plan.json</a:t>
+            </a:r>
+          </a:p>
+        </p:txBody>
+      </p:sp>
+      <p:cxnSp>
+        <p:nvCxnSpPr>
+          <p:cNvPr id="93" name="Straight Arrow Connector 92">
+            <a:extLst>
+              <a:ext uri="{FF2B5EF4-FFF2-40B4-BE49-F238E27FC236}">
+                <a16:creationId xmlns:a16="http://schemas.microsoft.com/office/drawing/2014/main" id="{F4CA391D-DF48-B246-B511-70E5953454F3}"/>
+              </a:ext>
+            </a:extLst>
+          </p:cNvPr>
+          <p:cNvCxnSpPr>
+            <a:cxnSpLocks/>
+            <a:stCxn id="95" idx="2"/>
+            <a:endCxn id="90" idx="3"/>
+          </p:cNvCxnSpPr>
+          <p:nvPr/>
+        </p:nvCxnSpPr>
+        <p:spPr>
+          <a:xfrm flipH="1">
+            <a:off x="5350589" y="306928"/>
+            <a:ext cx="628530" cy="177335"/>
+          </a:xfrm>
+          <a:prstGeom prst="straightConnector1">
+            <a:avLst/>
+          </a:prstGeom>
+          <a:ln w="57150">
+            <a:tailEnd type="triangle"/>
+          </a:ln>
+        </p:spPr>
+        <p:style>
+          <a:lnRef idx="1">
+            <a:schemeClr val="accent1"/>
+          </a:lnRef>
+          <a:fillRef idx="0">
+            <a:schemeClr val="accent1"/>
+          </a:fillRef>
+          <a:effectRef idx="0">
+            <a:schemeClr val="accent1"/>
+          </a:effectRef>
+          <a:fontRef idx="minor">
+            <a:schemeClr val="tx1"/>
+          </a:fontRef>
+        </p:style>
+      </p:cxnSp>
+      <p:sp>
+        <p:nvSpPr>
+          <p:cNvPr id="130" name="Rectangle 129">
+            <a:extLst>
+              <a:ext uri="{FF2B5EF4-FFF2-40B4-BE49-F238E27FC236}">
+                <a16:creationId xmlns:a16="http://schemas.microsoft.com/office/drawing/2014/main" id="{A8CE9A60-9F0D-5540-BD29-166E0E1514CC}"/>
+              </a:ext>
+            </a:extLst>
+          </p:cNvPr>
+          <p:cNvSpPr/>
+          <p:nvPr/>
+        </p:nvSpPr>
+        <p:spPr>
+          <a:xfrm>
+            <a:off x="3474766" y="1037952"/>
+            <a:ext cx="1714776" cy="389801"/>
+          </a:xfrm>
+          <a:prstGeom prst="rect">
+            <a:avLst/>
+          </a:prstGeom>
+          <a:solidFill>
+            <a:schemeClr val="accent6">
+              <a:lumMod val="20000"/>
+              <a:lumOff val="80000"/>
+            </a:schemeClr>
+          </a:solidFill>
+        </p:spPr>
+        <p:style>
+          <a:lnRef idx="2">
+            <a:schemeClr val="accent5">
+              <a:shade val="50000"/>
+            </a:schemeClr>
+          </a:lnRef>
+          <a:fillRef idx="1">
+            <a:schemeClr val="accent5"/>
+          </a:fillRef>
+          <a:effectRef idx="0">
+            <a:schemeClr val="accent5"/>
+          </a:effectRef>
+          <a:fontRef idx="minor">
+            <a:schemeClr val="lt1"/>
+          </a:fontRef>
+        </p:style>
+        <p:txBody>
+          <a:bodyPr lIns="45720" tIns="0" rIns="0" bIns="0" rtlCol="0" anchor="ctr"/>
+          <a:lstStyle/>
+          <a:p>
+            <a:pPr algn="ctr"/>
+            <a:r>
+              <a:rPr lang="en-US" sz="1200" b="1" dirty="0">
+                <a:solidFill>
+                  <a:schemeClr val="tx1"/>
+                </a:solidFill>
+              </a:rPr>
+              <a:t>$CONF/</a:t>
+            </a:r>
+          </a:p>
+          <a:p>
+            <a:pPr algn="ctr"/>
+            <a:r>
+              <a:rPr lang="en-US" sz="1200" b="1" dirty="0" err="1">
+                <a:solidFill>
+                  <a:schemeClr val="tx1"/>
+                </a:solidFill>
+              </a:rPr>
+              <a:t>integrateMigrationPlan.js</a:t>
+            </a:r>
+            <a:endParaRPr lang="en-US" sz="1200" dirty="0">
+              <a:solidFill>
+                <a:schemeClr val="tx1"/>
+              </a:solidFill>
+            </a:endParaRPr>
+          </a:p>
+        </p:txBody>
+      </p:sp>
+      <p:cxnSp>
+        <p:nvCxnSpPr>
+          <p:cNvPr id="134" name="Straight Arrow Connector 133">
+            <a:extLst>
+              <a:ext uri="{FF2B5EF4-FFF2-40B4-BE49-F238E27FC236}">
+                <a16:creationId xmlns:a16="http://schemas.microsoft.com/office/drawing/2014/main" id="{CBC03069-C87B-6A4F-B547-4264911A1D4A}"/>
+              </a:ext>
+            </a:extLst>
+          </p:cNvPr>
+          <p:cNvCxnSpPr>
+            <a:cxnSpLocks/>
+            <a:stCxn id="90" idx="1"/>
+            <a:endCxn id="130" idx="0"/>
+          </p:cNvCxnSpPr>
+          <p:nvPr/>
+        </p:nvCxnSpPr>
+        <p:spPr>
+          <a:xfrm flipH="1">
+            <a:off x="4332154" y="884798"/>
+            <a:ext cx="1018435" cy="153154"/>
+          </a:xfrm>
+          <a:prstGeom prst="straightConnector1">
+            <a:avLst/>
+          </a:prstGeom>
+          <a:ln w="57150">
+            <a:tailEnd type="triangle"/>
+          </a:ln>
+        </p:spPr>
+        <p:style>
+          <a:lnRef idx="1">
+            <a:schemeClr val="accent1"/>
+          </a:lnRef>
+          <a:fillRef idx="0">
+            <a:schemeClr val="accent1"/>
+          </a:fillRef>
+          <a:effectRef idx="0">
+            <a:schemeClr val="accent1"/>
+          </a:effectRef>
+          <a:fontRef idx="minor">
+            <a:schemeClr val="tx1"/>
+          </a:fontRef>
+        </p:style>
+      </p:cxnSp>
+      <p:cxnSp>
+        <p:nvCxnSpPr>
+          <p:cNvPr id="137" name="Straight Arrow Connector 136">
+            <a:extLst>
+              <a:ext uri="{FF2B5EF4-FFF2-40B4-BE49-F238E27FC236}">
+                <a16:creationId xmlns:a16="http://schemas.microsoft.com/office/drawing/2014/main" id="{13EFB659-FFB0-F548-B487-859A69CB4342}"/>
+              </a:ext>
+            </a:extLst>
+          </p:cNvPr>
+          <p:cNvCxnSpPr>
+            <a:cxnSpLocks/>
+            <a:stCxn id="130" idx="2"/>
+            <a:endCxn id="8" idx="3"/>
+          </p:cNvCxnSpPr>
+          <p:nvPr/>
+        </p:nvCxnSpPr>
+        <p:spPr>
+          <a:xfrm flipH="1">
+            <a:off x="3692887" y="1427753"/>
+            <a:ext cx="639267" cy="263060"/>
           </a:xfrm>
           <a:prstGeom prst="straightConnector1">
             <a:avLst/>

</xml_diff>

<commit_message>
Update experiment flow figure with runExperiment.sh.sh & runMultipleExperiments.sh.
</commit_message>
<xml_diff>
--- a/experiments/ccs2017/figures/exp_flow.pptx
+++ b/experiments/ccs2017/figures/exp_flow.pptx
@@ -197,7 +197,7 @@
           <a:p>
             <a:fld id="{6258ECF3-EDD8-D04A-90B6-1BE14B16AF69}" type="datetimeFigureOut">
               <a:rPr lang="en-US" smtClean="0"/>
-              <a:t>3/18/18</a:t>
+              <a:t>8/3/19</a:t>
             </a:fld>
             <a:endParaRPr lang="en-US"/>
           </a:p>
@@ -677,7 +677,7 @@
           <a:p>
             <a:fld id="{53D6C1FA-00A9-4142-A80A-0CB384F9F4AC}" type="datetimeFigureOut">
               <a:rPr lang="en-US" smtClean="0"/>
-              <a:t>3/18/18</a:t>
+              <a:t>8/3/19</a:t>
             </a:fld>
             <a:endParaRPr lang="en-US"/>
           </a:p>
@@ -845,7 +845,7 @@
           <a:p>
             <a:fld id="{53D6C1FA-00A9-4142-A80A-0CB384F9F4AC}" type="datetimeFigureOut">
               <a:rPr lang="en-US" smtClean="0"/>
-              <a:t>3/18/18</a:t>
+              <a:t>8/3/19</a:t>
             </a:fld>
             <a:endParaRPr lang="en-US"/>
           </a:p>
@@ -1023,7 +1023,7 @@
           <a:p>
             <a:fld id="{53D6C1FA-00A9-4142-A80A-0CB384F9F4AC}" type="datetimeFigureOut">
               <a:rPr lang="en-US" smtClean="0"/>
-              <a:t>3/18/18</a:t>
+              <a:t>8/3/19</a:t>
             </a:fld>
             <a:endParaRPr lang="en-US"/>
           </a:p>
@@ -1191,7 +1191,7 @@
           <a:p>
             <a:fld id="{53D6C1FA-00A9-4142-A80A-0CB384F9F4AC}" type="datetimeFigureOut">
               <a:rPr lang="en-US" smtClean="0"/>
-              <a:t>3/18/18</a:t>
+              <a:t>8/3/19</a:t>
             </a:fld>
             <a:endParaRPr lang="en-US"/>
           </a:p>
@@ -1436,7 +1436,7 @@
           <a:p>
             <a:fld id="{53D6C1FA-00A9-4142-A80A-0CB384F9F4AC}" type="datetimeFigureOut">
               <a:rPr lang="en-US" smtClean="0"/>
-              <a:t>3/18/18</a:t>
+              <a:t>8/3/19</a:t>
             </a:fld>
             <a:endParaRPr lang="en-US"/>
           </a:p>
@@ -1665,7 +1665,7 @@
           <a:p>
             <a:fld id="{53D6C1FA-00A9-4142-A80A-0CB384F9F4AC}" type="datetimeFigureOut">
               <a:rPr lang="en-US" smtClean="0"/>
-              <a:t>3/18/18</a:t>
+              <a:t>8/3/19</a:t>
             </a:fld>
             <a:endParaRPr lang="en-US"/>
           </a:p>
@@ -2029,7 +2029,7 @@
           <a:p>
             <a:fld id="{53D6C1FA-00A9-4142-A80A-0CB384F9F4AC}" type="datetimeFigureOut">
               <a:rPr lang="en-US" smtClean="0"/>
-              <a:t>3/18/18</a:t>
+              <a:t>8/3/19</a:t>
             </a:fld>
             <a:endParaRPr lang="en-US"/>
           </a:p>
@@ -2146,7 +2146,7 @@
           <a:p>
             <a:fld id="{53D6C1FA-00A9-4142-A80A-0CB384F9F4AC}" type="datetimeFigureOut">
               <a:rPr lang="en-US" smtClean="0"/>
-              <a:t>3/18/18</a:t>
+              <a:t>8/3/19</a:t>
             </a:fld>
             <a:endParaRPr lang="en-US"/>
           </a:p>
@@ -2241,7 +2241,7 @@
           <a:p>
             <a:fld id="{53D6C1FA-00A9-4142-A80A-0CB384F9F4AC}" type="datetimeFigureOut">
               <a:rPr lang="en-US" smtClean="0"/>
-              <a:t>3/18/18</a:t>
+              <a:t>8/3/19</a:t>
             </a:fld>
             <a:endParaRPr lang="en-US"/>
           </a:p>
@@ -2516,7 +2516,7 @@
           <a:p>
             <a:fld id="{53D6C1FA-00A9-4142-A80A-0CB384F9F4AC}" type="datetimeFigureOut">
               <a:rPr lang="en-US" smtClean="0"/>
-              <a:t>3/18/18</a:t>
+              <a:t>8/3/19</a:t>
             </a:fld>
             <a:endParaRPr lang="en-US"/>
           </a:p>
@@ -2768,7 +2768,7 @@
           <a:p>
             <a:fld id="{53D6C1FA-00A9-4142-A80A-0CB384F9F4AC}" type="datetimeFigureOut">
               <a:rPr lang="en-US" smtClean="0"/>
-              <a:t>3/18/18</a:t>
+              <a:t>8/3/19</a:t>
             </a:fld>
             <a:endParaRPr lang="en-US"/>
           </a:p>
@@ -2979,7 +2979,7 @@
           <a:p>
             <a:fld id="{53D6C1FA-00A9-4142-A80A-0CB384F9F4AC}" type="datetimeFigureOut">
               <a:rPr lang="en-US" smtClean="0"/>
-              <a:t>3/18/18</a:t>
+              <a:t>8/3/19</a:t>
             </a:fld>
             <a:endParaRPr lang="en-US"/>
           </a:p>
@@ -7343,6 +7343,256 @@
           </a:fontRef>
         </p:style>
       </p:cxnSp>
+      <p:sp>
+        <p:nvSpPr>
+          <p:cNvPr id="2" name="L-Shape 1">
+            <a:extLst>
+              <a:ext uri="{FF2B5EF4-FFF2-40B4-BE49-F238E27FC236}">
+                <a16:creationId xmlns:a16="http://schemas.microsoft.com/office/drawing/2014/main" id="{259DFAC7-AA4D-044A-BEC1-150C8611289C}"/>
+              </a:ext>
+            </a:extLst>
+          </p:cNvPr>
+          <p:cNvSpPr/>
+          <p:nvPr/>
+        </p:nvSpPr>
+        <p:spPr>
+          <a:xfrm flipH="1">
+            <a:off x="6381270" y="1858803"/>
+            <a:ext cx="5053084" cy="4380114"/>
+          </a:xfrm>
+          <a:prstGeom prst="corner">
+            <a:avLst>
+              <a:gd name="adj1" fmla="val 16379"/>
+              <a:gd name="adj2" fmla="val 65462"/>
+            </a:avLst>
+          </a:prstGeom>
+          <a:noFill/>
+          <a:ln w="38100"/>
+        </p:spPr>
+        <p:style>
+          <a:lnRef idx="2">
+            <a:schemeClr val="accent1">
+              <a:shade val="50000"/>
+            </a:schemeClr>
+          </a:lnRef>
+          <a:fillRef idx="1">
+            <a:schemeClr val="accent1"/>
+          </a:fillRef>
+          <a:effectRef idx="0">
+            <a:schemeClr val="accent1"/>
+          </a:effectRef>
+          <a:fontRef idx="minor">
+            <a:schemeClr val="lt1"/>
+          </a:fontRef>
+        </p:style>
+        <p:txBody>
+          <a:bodyPr rtlCol="0" anchor="ctr"/>
+          <a:lstStyle/>
+          <a:p>
+            <a:pPr algn="ctr"/>
+            <a:endParaRPr lang="en-US"/>
+          </a:p>
+        </p:txBody>
+      </p:sp>
+      <p:sp>
+        <p:nvSpPr>
+          <p:cNvPr id="17" name="Circular Arrow 16">
+            <a:extLst>
+              <a:ext uri="{FF2B5EF4-FFF2-40B4-BE49-F238E27FC236}">
+                <a16:creationId xmlns:a16="http://schemas.microsoft.com/office/drawing/2014/main" id="{B6A8E1BB-C8EC-974D-80A8-966E9FBD5D7F}"/>
+              </a:ext>
+            </a:extLst>
+          </p:cNvPr>
+          <p:cNvSpPr/>
+          <p:nvPr/>
+        </p:nvSpPr>
+        <p:spPr>
+          <a:xfrm>
+            <a:off x="8989255" y="1407517"/>
+            <a:ext cx="467894" cy="438482"/>
+          </a:xfrm>
+          <a:prstGeom prst="circularArrow">
+            <a:avLst>
+              <a:gd name="adj1" fmla="val 7370"/>
+              <a:gd name="adj2" fmla="val 1142312"/>
+              <a:gd name="adj3" fmla="val 20567349"/>
+              <a:gd name="adj4" fmla="val 5523156"/>
+              <a:gd name="adj5" fmla="val 17126"/>
+            </a:avLst>
+          </a:prstGeom>
+          <a:solidFill>
+            <a:schemeClr val="accent1">
+              <a:lumMod val="75000"/>
+            </a:schemeClr>
+          </a:solidFill>
+          <a:ln>
+            <a:solidFill>
+              <a:schemeClr val="accent1">
+                <a:lumMod val="75000"/>
+              </a:schemeClr>
+            </a:solidFill>
+          </a:ln>
+        </p:spPr>
+        <p:style>
+          <a:lnRef idx="2">
+            <a:schemeClr val="accent1">
+              <a:shade val="50000"/>
+            </a:schemeClr>
+          </a:lnRef>
+          <a:fillRef idx="1">
+            <a:schemeClr val="accent1"/>
+          </a:fillRef>
+          <a:effectRef idx="0">
+            <a:schemeClr val="accent1"/>
+          </a:effectRef>
+          <a:fontRef idx="minor">
+            <a:schemeClr val="lt1"/>
+          </a:fontRef>
+        </p:style>
+        <p:txBody>
+          <a:bodyPr rtlCol="0" anchor="ctr"/>
+          <a:lstStyle/>
+          <a:p>
+            <a:pPr algn="ctr"/>
+            <a:endParaRPr lang="en-US">
+              <a:solidFill>
+                <a:schemeClr val="tx1"/>
+              </a:solidFill>
+            </a:endParaRPr>
+          </a:p>
+        </p:txBody>
+      </p:sp>
+      <p:sp>
+        <p:nvSpPr>
+          <p:cNvPr id="92" name="Snip Single Corner Rectangle 91">
+            <a:extLst>
+              <a:ext uri="{FF2B5EF4-FFF2-40B4-BE49-F238E27FC236}">
+                <a16:creationId xmlns:a16="http://schemas.microsoft.com/office/drawing/2014/main" id="{FABFAF91-B55E-8644-BBDF-F6FB9D67CE18}"/>
+              </a:ext>
+            </a:extLst>
+          </p:cNvPr>
+          <p:cNvSpPr/>
+          <p:nvPr/>
+        </p:nvSpPr>
+        <p:spPr>
+          <a:xfrm>
+            <a:off x="9209742" y="1635817"/>
+            <a:ext cx="1612890" cy="221874"/>
+          </a:xfrm>
+          <a:prstGeom prst="snip1Rect">
+            <a:avLst>
+              <a:gd name="adj" fmla="val 15368"/>
+            </a:avLst>
+          </a:prstGeom>
+          <a:ln w="38100">
+            <a:solidFill>
+              <a:schemeClr val="accent1">
+                <a:lumMod val="75000"/>
+              </a:schemeClr>
+            </a:solidFill>
+          </a:ln>
+        </p:spPr>
+        <p:style>
+          <a:lnRef idx="2">
+            <a:schemeClr val="dk1"/>
+          </a:lnRef>
+          <a:fillRef idx="1">
+            <a:schemeClr val="lt1"/>
+          </a:fillRef>
+          <a:effectRef idx="0">
+            <a:schemeClr val="dk1"/>
+          </a:effectRef>
+          <a:fontRef idx="minor">
+            <a:schemeClr val="dk1"/>
+          </a:fontRef>
+        </p:style>
+        <p:txBody>
+          <a:bodyPr lIns="45720" tIns="0" rIns="0" bIns="0" rtlCol="0" anchor="ctr"/>
+          <a:lstStyle/>
+          <a:p>
+            <a:pPr algn="ctr"/>
+            <a:r>
+              <a:rPr lang="en-US" sz="1200" dirty="0">
+                <a:solidFill>
+                  <a:schemeClr val="tx1"/>
+                </a:solidFill>
+              </a:rPr>
+              <a:t>$CCS/</a:t>
+            </a:r>
+            <a:r>
+              <a:rPr lang="en-US" sz="1200" dirty="0" err="1">
+                <a:solidFill>
+                  <a:schemeClr val="tx1"/>
+                </a:solidFill>
+              </a:rPr>
+              <a:t>runExperiment.sh</a:t>
+            </a:r>
+            <a:endParaRPr lang="en-US" sz="1200" dirty="0">
+              <a:solidFill>
+                <a:schemeClr val="tx1"/>
+              </a:solidFill>
+            </a:endParaRPr>
+          </a:p>
+        </p:txBody>
+      </p:sp>
+      <p:sp>
+        <p:nvSpPr>
+          <p:cNvPr id="94" name="Snip Single Corner Rectangle 93">
+            <a:extLst>
+              <a:ext uri="{FF2B5EF4-FFF2-40B4-BE49-F238E27FC236}">
+                <a16:creationId xmlns:a16="http://schemas.microsoft.com/office/drawing/2014/main" id="{FF512BCD-E0C3-A94E-AFBE-EEEF9DD6ABB5}"/>
+              </a:ext>
+            </a:extLst>
+          </p:cNvPr>
+          <p:cNvSpPr/>
+          <p:nvPr/>
+        </p:nvSpPr>
+        <p:spPr>
+          <a:xfrm>
+            <a:off x="8909537" y="1200672"/>
+            <a:ext cx="2141417" cy="234364"/>
+          </a:xfrm>
+          <a:prstGeom prst="snip1Rect">
+            <a:avLst>
+              <a:gd name="adj" fmla="val 15368"/>
+            </a:avLst>
+          </a:prstGeom>
+        </p:spPr>
+        <p:style>
+          <a:lnRef idx="2">
+            <a:schemeClr val="dk1"/>
+          </a:lnRef>
+          <a:fillRef idx="1">
+            <a:schemeClr val="lt1"/>
+          </a:fillRef>
+          <a:effectRef idx="0">
+            <a:schemeClr val="dk1"/>
+          </a:effectRef>
+          <a:fontRef idx="minor">
+            <a:schemeClr val="dk1"/>
+          </a:fontRef>
+        </p:style>
+        <p:txBody>
+          <a:bodyPr lIns="45720" tIns="0" rIns="0" bIns="0" rtlCol="0" anchor="ctr"/>
+          <a:lstStyle/>
+          <a:p>
+            <a:pPr algn="ctr"/>
+            <a:r>
+              <a:rPr lang="en-US" sz="1200" dirty="0">
+                <a:solidFill>
+                  <a:schemeClr val="tx1"/>
+                </a:solidFill>
+              </a:rPr>
+              <a:t>$CCS/</a:t>
+            </a:r>
+            <a:r>
+              <a:rPr lang="en-US" sz="1200" dirty="0" err="1"/>
+              <a:t>runMultipleExperiments.sh</a:t>
+            </a:r>
+            <a:endParaRPr lang="en-US" sz="1200" dirty="0"/>
+          </a:p>
+        </p:txBody>
+      </p:sp>
     </p:spTree>
     <p:extLst>
       <p:ext uri="{BB962C8B-B14F-4D97-AF65-F5344CB8AC3E}">

</xml_diff>

<commit_message>
Update diagram for experiments
</commit_message>
<xml_diff>
--- a/experiments/ccs2017/figures/exp_flow.pptx
+++ b/experiments/ccs2017/figures/exp_flow.pptx
@@ -197,7 +197,7 @@
           <a:p>
             <a:fld id="{6258ECF3-EDD8-D04A-90B6-1BE14B16AF69}" type="datetimeFigureOut">
               <a:rPr lang="en-US" smtClean="0"/>
-              <a:t>8/3/19</a:t>
+              <a:t>8/10/19</a:t>
             </a:fld>
             <a:endParaRPr lang="en-US"/>
           </a:p>
@@ -677,7 +677,7 @@
           <a:p>
             <a:fld id="{53D6C1FA-00A9-4142-A80A-0CB384F9F4AC}" type="datetimeFigureOut">
               <a:rPr lang="en-US" smtClean="0"/>
-              <a:t>8/3/19</a:t>
+              <a:t>8/10/19</a:t>
             </a:fld>
             <a:endParaRPr lang="en-US"/>
           </a:p>
@@ -845,7 +845,7 @@
           <a:p>
             <a:fld id="{53D6C1FA-00A9-4142-A80A-0CB384F9F4AC}" type="datetimeFigureOut">
               <a:rPr lang="en-US" smtClean="0"/>
-              <a:t>8/3/19</a:t>
+              <a:t>8/10/19</a:t>
             </a:fld>
             <a:endParaRPr lang="en-US"/>
           </a:p>
@@ -1023,7 +1023,7 @@
           <a:p>
             <a:fld id="{53D6C1FA-00A9-4142-A80A-0CB384F9F4AC}" type="datetimeFigureOut">
               <a:rPr lang="en-US" smtClean="0"/>
-              <a:t>8/3/19</a:t>
+              <a:t>8/10/19</a:t>
             </a:fld>
             <a:endParaRPr lang="en-US"/>
           </a:p>
@@ -1191,7 +1191,7 @@
           <a:p>
             <a:fld id="{53D6C1FA-00A9-4142-A80A-0CB384F9F4AC}" type="datetimeFigureOut">
               <a:rPr lang="en-US" smtClean="0"/>
-              <a:t>8/3/19</a:t>
+              <a:t>8/10/19</a:t>
             </a:fld>
             <a:endParaRPr lang="en-US"/>
           </a:p>
@@ -1436,7 +1436,7 @@
           <a:p>
             <a:fld id="{53D6C1FA-00A9-4142-A80A-0CB384F9F4AC}" type="datetimeFigureOut">
               <a:rPr lang="en-US" smtClean="0"/>
-              <a:t>8/3/19</a:t>
+              <a:t>8/10/19</a:t>
             </a:fld>
             <a:endParaRPr lang="en-US"/>
           </a:p>
@@ -1665,7 +1665,7 @@
           <a:p>
             <a:fld id="{53D6C1FA-00A9-4142-A80A-0CB384F9F4AC}" type="datetimeFigureOut">
               <a:rPr lang="en-US" smtClean="0"/>
-              <a:t>8/3/19</a:t>
+              <a:t>8/10/19</a:t>
             </a:fld>
             <a:endParaRPr lang="en-US"/>
           </a:p>
@@ -2029,7 +2029,7 @@
           <a:p>
             <a:fld id="{53D6C1FA-00A9-4142-A80A-0CB384F9F4AC}" type="datetimeFigureOut">
               <a:rPr lang="en-US" smtClean="0"/>
-              <a:t>8/3/19</a:t>
+              <a:t>8/10/19</a:t>
             </a:fld>
             <a:endParaRPr lang="en-US"/>
           </a:p>
@@ -2146,7 +2146,7 @@
           <a:p>
             <a:fld id="{53D6C1FA-00A9-4142-A80A-0CB384F9F4AC}" type="datetimeFigureOut">
               <a:rPr lang="en-US" smtClean="0"/>
-              <a:t>8/3/19</a:t>
+              <a:t>8/10/19</a:t>
             </a:fld>
             <a:endParaRPr lang="en-US"/>
           </a:p>
@@ -2241,7 +2241,7 @@
           <a:p>
             <a:fld id="{53D6C1FA-00A9-4142-A80A-0CB384F9F4AC}" type="datetimeFigureOut">
               <a:rPr lang="en-US" smtClean="0"/>
-              <a:t>8/3/19</a:t>
+              <a:t>8/10/19</a:t>
             </a:fld>
             <a:endParaRPr lang="en-US"/>
           </a:p>
@@ -2516,7 +2516,7 @@
           <a:p>
             <a:fld id="{53D6C1FA-00A9-4142-A80A-0CB384F9F4AC}" type="datetimeFigureOut">
               <a:rPr lang="en-US" smtClean="0"/>
-              <a:t>8/3/19</a:t>
+              <a:t>8/10/19</a:t>
             </a:fld>
             <a:endParaRPr lang="en-US"/>
           </a:p>
@@ -2768,7 +2768,7 @@
           <a:p>
             <a:fld id="{53D6C1FA-00A9-4142-A80A-0CB384F9F4AC}" type="datetimeFigureOut">
               <a:rPr lang="en-US" smtClean="0"/>
-              <a:t>8/3/19</a:t>
+              <a:t>8/10/19</a:t>
             </a:fld>
             <a:endParaRPr lang="en-US"/>
           </a:p>
@@ -2979,7 +2979,7 @@
           <a:p>
             <a:fld id="{53D6C1FA-00A9-4142-A80A-0CB384F9F4AC}" type="datetimeFigureOut">
               <a:rPr lang="en-US" smtClean="0"/>
-              <a:t>8/3/19</a:t>
+              <a:t>8/10/19</a:t>
             </a:fld>
             <a:endParaRPr lang="en-US"/>
           </a:p>
@@ -5439,7 +5439,7 @@
         </p:nvSpPr>
         <p:spPr>
           <a:xfrm>
-            <a:off x="1580520" y="5511554"/>
+            <a:off x="1419349" y="5511554"/>
             <a:ext cx="1612891" cy="727363"/>
           </a:xfrm>
           <a:prstGeom prst="rect">
@@ -5539,15 +5539,15 @@
         <p:nvCxnSpPr>
           <p:cNvPr id="237" name="Straight Arrow Connector 236"/>
           <p:cNvCxnSpPr>
-            <a:stCxn id="255" idx="2"/>
+            <a:cxnSpLocks/>
             <a:endCxn id="236" idx="3"/>
           </p:cNvCxnSpPr>
           <p:nvPr/>
         </p:nvCxnSpPr>
         <p:spPr>
           <a:xfrm flipH="1">
-            <a:off x="3193411" y="5436809"/>
-            <a:ext cx="806446" cy="438427"/>
+            <a:off x="3032240" y="5635735"/>
+            <a:ext cx="962882" cy="239501"/>
           </a:xfrm>
           <a:prstGeom prst="straightConnector1">
             <a:avLst/>
@@ -5685,7 +5685,7 @@
         </p:nvSpPr>
         <p:spPr>
           <a:xfrm>
-            <a:off x="1354521" y="6582084"/>
+            <a:off x="1193350" y="6582084"/>
             <a:ext cx="2086082" cy="665763"/>
           </a:xfrm>
           <a:prstGeom prst="snip1Rect">
@@ -5923,8 +5923,8 @@
         </p:nvCxnSpPr>
         <p:spPr>
           <a:xfrm flipH="1" flipV="1">
-            <a:off x="3193411" y="5875236"/>
-            <a:ext cx="806446" cy="386214"/>
+            <a:off x="3032240" y="5875236"/>
+            <a:ext cx="967617" cy="386214"/>
           </a:xfrm>
           <a:prstGeom prst="straightConnector1">
             <a:avLst/>
@@ -5962,7 +5962,7 @@
         </p:nvCxnSpPr>
         <p:spPr>
           <a:xfrm>
-            <a:off x="2386966" y="6238917"/>
+            <a:off x="2225795" y="6238917"/>
             <a:ext cx="10596" cy="343167"/>
           </a:xfrm>
           <a:prstGeom prst="straightConnector1">
@@ -7590,6 +7590,308 @@
               <a:t>runMultipleExperiments.sh</a:t>
             </a:r>
             <a:endParaRPr lang="en-US" sz="1200" dirty="0"/>
+          </a:p>
+        </p:txBody>
+      </p:sp>
+      <p:sp>
+        <p:nvSpPr>
+          <p:cNvPr id="97" name="Rectangle 96">
+            <a:extLst>
+              <a:ext uri="{FF2B5EF4-FFF2-40B4-BE49-F238E27FC236}">
+                <a16:creationId xmlns:a16="http://schemas.microsoft.com/office/drawing/2014/main" id="{A6BC4033-BAC3-304C-87AF-04E5F0DC0B58}"/>
+              </a:ext>
+            </a:extLst>
+          </p:cNvPr>
+          <p:cNvSpPr/>
+          <p:nvPr/>
+        </p:nvSpPr>
+        <p:spPr>
+          <a:xfrm>
+            <a:off x="1190926" y="4762081"/>
+            <a:ext cx="2086081" cy="576460"/>
+          </a:xfrm>
+          <a:prstGeom prst="rect">
+            <a:avLst/>
+          </a:prstGeom>
+          <a:solidFill>
+            <a:srgbClr val="B0BEDB"/>
+          </a:solidFill>
+        </p:spPr>
+        <p:style>
+          <a:lnRef idx="2">
+            <a:schemeClr val="accent5">
+              <a:shade val="50000"/>
+            </a:schemeClr>
+          </a:lnRef>
+          <a:fillRef idx="1">
+            <a:schemeClr val="accent5"/>
+          </a:fillRef>
+          <a:effectRef idx="0">
+            <a:schemeClr val="accent5"/>
+          </a:effectRef>
+          <a:fontRef idx="minor">
+            <a:schemeClr val="lt1"/>
+          </a:fontRef>
+        </p:style>
+        <p:txBody>
+          <a:bodyPr lIns="45720" tIns="0" rIns="0" bIns="0" rtlCol="0" anchor="ctr"/>
+          <a:lstStyle/>
+          <a:p>
+            <a:pPr algn="ctr"/>
+            <a:r>
+              <a:rPr lang="en-US" sz="1200" b="1" dirty="0">
+                <a:solidFill>
+                  <a:schemeClr val="tx1"/>
+                </a:solidFill>
+              </a:rPr>
+              <a:t>$CCS/</a:t>
+            </a:r>
+          </a:p>
+          <a:p>
+            <a:pPr algn="ctr"/>
+            <a:r>
+              <a:rPr lang="en-US" sz="1200" b="1" dirty="0" err="1">
+                <a:solidFill>
+                  <a:schemeClr val="tx1"/>
+                </a:solidFill>
+              </a:rPr>
+              <a:t>analyzeMultipleResults.sh</a:t>
+            </a:r>
+            <a:endParaRPr lang="en-US" sz="1200" b="1" dirty="0">
+              <a:solidFill>
+                <a:schemeClr val="tx1"/>
+              </a:solidFill>
+            </a:endParaRPr>
+          </a:p>
+          <a:p>
+            <a:pPr marL="171450" indent="-171450">
+              <a:buFont typeface="Arial" charset="0"/>
+              <a:buChar char="•"/>
+            </a:pPr>
+            <a:r>
+              <a:rPr lang="en-US" sz="1200" dirty="0" err="1">
+                <a:solidFill>
+                  <a:schemeClr val="tx1"/>
+                </a:solidFill>
+              </a:rPr>
+              <a:t>multipleAvailabilityAnalyzer.js</a:t>
+            </a:r>
+            <a:endParaRPr lang="en-US" sz="1200" dirty="0">
+              <a:solidFill>
+                <a:schemeClr val="tx1"/>
+              </a:solidFill>
+            </a:endParaRPr>
+          </a:p>
+        </p:txBody>
+      </p:sp>
+      <p:cxnSp>
+        <p:nvCxnSpPr>
+          <p:cNvPr id="98" name="Straight Arrow Connector 97">
+            <a:extLst>
+              <a:ext uri="{FF2B5EF4-FFF2-40B4-BE49-F238E27FC236}">
+                <a16:creationId xmlns:a16="http://schemas.microsoft.com/office/drawing/2014/main" id="{71A846EE-6CA6-184D-84BE-1CA59286145C}"/>
+              </a:ext>
+            </a:extLst>
+          </p:cNvPr>
+          <p:cNvCxnSpPr>
+            <a:cxnSpLocks/>
+          </p:cNvCxnSpPr>
+          <p:nvPr/>
+        </p:nvCxnSpPr>
+        <p:spPr>
+          <a:xfrm flipH="1" flipV="1">
+            <a:off x="3269573" y="5050311"/>
+            <a:ext cx="722850" cy="386498"/>
+          </a:xfrm>
+          <a:prstGeom prst="straightConnector1">
+            <a:avLst/>
+          </a:prstGeom>
+          <a:ln w="41275">
+            <a:solidFill>
+              <a:srgbClr val="FF0000"/>
+            </a:solidFill>
+            <a:tailEnd type="triangle"/>
+          </a:ln>
+        </p:spPr>
+        <p:style>
+          <a:lnRef idx="1">
+            <a:schemeClr val="accent1"/>
+          </a:lnRef>
+          <a:fillRef idx="0">
+            <a:schemeClr val="accent1"/>
+          </a:fillRef>
+          <a:effectRef idx="0">
+            <a:schemeClr val="accent1"/>
+          </a:effectRef>
+          <a:fontRef idx="minor">
+            <a:schemeClr val="tx1"/>
+          </a:fontRef>
+        </p:style>
+      </p:cxnSp>
+      <p:cxnSp>
+        <p:nvCxnSpPr>
+          <p:cNvPr id="99" name="Straight Arrow Connector 98">
+            <a:extLst>
+              <a:ext uri="{FF2B5EF4-FFF2-40B4-BE49-F238E27FC236}">
+                <a16:creationId xmlns:a16="http://schemas.microsoft.com/office/drawing/2014/main" id="{379CCD63-F857-D740-A0B7-354970D5B2EE}"/>
+              </a:ext>
+            </a:extLst>
+          </p:cNvPr>
+          <p:cNvCxnSpPr>
+            <a:cxnSpLocks/>
+          </p:cNvCxnSpPr>
+          <p:nvPr/>
+        </p:nvCxnSpPr>
+        <p:spPr>
+          <a:xfrm flipH="1" flipV="1">
+            <a:off x="3272272" y="4942773"/>
+            <a:ext cx="722850" cy="377533"/>
+          </a:xfrm>
+          <a:prstGeom prst="straightConnector1">
+            <a:avLst/>
+          </a:prstGeom>
+          <a:ln w="41275">
+            <a:solidFill>
+              <a:srgbClr val="FF0000"/>
+            </a:solidFill>
+            <a:tailEnd type="triangle"/>
+          </a:ln>
+        </p:spPr>
+        <p:style>
+          <a:lnRef idx="1">
+            <a:schemeClr val="accent1"/>
+          </a:lnRef>
+          <a:fillRef idx="0">
+            <a:schemeClr val="accent1"/>
+          </a:fillRef>
+          <a:effectRef idx="0">
+            <a:schemeClr val="accent1"/>
+          </a:effectRef>
+          <a:fontRef idx="minor">
+            <a:schemeClr val="tx1"/>
+          </a:fontRef>
+        </p:style>
+      </p:cxnSp>
+      <p:cxnSp>
+        <p:nvCxnSpPr>
+          <p:cNvPr id="102" name="Straight Arrow Connector 101">
+            <a:extLst>
+              <a:ext uri="{FF2B5EF4-FFF2-40B4-BE49-F238E27FC236}">
+                <a16:creationId xmlns:a16="http://schemas.microsoft.com/office/drawing/2014/main" id="{433161F4-786B-C040-8179-E56F61F0ABA6}"/>
+              </a:ext>
+            </a:extLst>
+          </p:cNvPr>
+          <p:cNvCxnSpPr>
+            <a:cxnSpLocks/>
+          </p:cNvCxnSpPr>
+          <p:nvPr/>
+        </p:nvCxnSpPr>
+        <p:spPr>
+          <a:xfrm flipH="1" flipV="1">
+            <a:off x="3274361" y="5158739"/>
+            <a:ext cx="722850" cy="377533"/>
+          </a:xfrm>
+          <a:prstGeom prst="straightConnector1">
+            <a:avLst/>
+          </a:prstGeom>
+          <a:ln w="41275">
+            <a:solidFill>
+              <a:srgbClr val="FF0000"/>
+            </a:solidFill>
+            <a:tailEnd type="triangle"/>
+          </a:ln>
+        </p:spPr>
+        <p:style>
+          <a:lnRef idx="1">
+            <a:schemeClr val="accent1"/>
+          </a:lnRef>
+          <a:fillRef idx="0">
+            <a:schemeClr val="accent1"/>
+          </a:fillRef>
+          <a:effectRef idx="0">
+            <a:schemeClr val="accent1"/>
+          </a:effectRef>
+          <a:fontRef idx="minor">
+            <a:schemeClr val="tx1"/>
+          </a:fontRef>
+        </p:style>
+      </p:cxnSp>
+      <p:cxnSp>
+        <p:nvCxnSpPr>
+          <p:cNvPr id="103" name="Straight Arrow Connector 102">
+            <a:extLst>
+              <a:ext uri="{FF2B5EF4-FFF2-40B4-BE49-F238E27FC236}">
+                <a16:creationId xmlns:a16="http://schemas.microsoft.com/office/drawing/2014/main" id="{DC24AA16-9FBF-534E-B73B-D1218CED2925}"/>
+              </a:ext>
+            </a:extLst>
+          </p:cNvPr>
+          <p:cNvCxnSpPr>
+            <a:cxnSpLocks/>
+          </p:cNvCxnSpPr>
+          <p:nvPr/>
+        </p:nvCxnSpPr>
+        <p:spPr>
+          <a:xfrm flipH="1" flipV="1">
+            <a:off x="3275175" y="4842414"/>
+            <a:ext cx="722850" cy="377533"/>
+          </a:xfrm>
+          <a:prstGeom prst="straightConnector1">
+            <a:avLst/>
+          </a:prstGeom>
+          <a:ln w="41275">
+            <a:solidFill>
+              <a:srgbClr val="FF0000"/>
+            </a:solidFill>
+            <a:tailEnd type="triangle"/>
+          </a:ln>
+        </p:spPr>
+        <p:style>
+          <a:lnRef idx="1">
+            <a:schemeClr val="accent1"/>
+          </a:lnRef>
+          <a:fillRef idx="0">
+            <a:schemeClr val="accent1"/>
+          </a:fillRef>
+          <a:effectRef idx="0">
+            <a:schemeClr val="accent1"/>
+          </a:effectRef>
+          <a:fontRef idx="minor">
+            <a:schemeClr val="tx1"/>
+          </a:fontRef>
+        </p:style>
+      </p:cxnSp>
+      <p:sp>
+        <p:nvSpPr>
+          <p:cNvPr id="22" name="TextBox 21">
+            <a:extLst>
+              <a:ext uri="{FF2B5EF4-FFF2-40B4-BE49-F238E27FC236}">
+                <a16:creationId xmlns:a16="http://schemas.microsoft.com/office/drawing/2014/main" id="{0E1643C8-D708-614D-BABA-0F9D6CA3C132}"/>
+              </a:ext>
+            </a:extLst>
+          </p:cNvPr>
+          <p:cNvSpPr txBox="1"/>
+          <p:nvPr/>
+        </p:nvSpPr>
+        <p:spPr>
+          <a:xfrm>
+            <a:off x="1230646" y="4514450"/>
+            <a:ext cx="2006640" cy="276999"/>
+          </a:xfrm>
+          <a:prstGeom prst="rect">
+            <a:avLst/>
+          </a:prstGeom>
+          <a:noFill/>
+        </p:spPr>
+        <p:txBody>
+          <a:bodyPr wrap="none" rtlCol="0">
+            <a:spAutoFit/>
+          </a:bodyPr>
+          <a:lstStyle/>
+          <a:p>
+            <a:r>
+              <a:rPr lang="en-US" sz="1200" dirty="0"/>
+              <a:t>For analyzing multiple results</a:t>
+            </a:r>
           </a:p>
         </p:txBody>
       </p:sp>

</xml_diff>